<commit_message>
Added overview, approach and data to slides
shooting for a 10 minute presentation, will continue to add slides for
analysis and results as I have them
</commit_message>
<xml_diff>
--- a/slides/hackathon.pptx
+++ b/slides/hackathon.pptx
@@ -6,7 +6,9 @@
   </p:sldMasterIdLst>
   <p:sldIdLst>
     <p:sldId id="256" r:id="rId2"/>
-    <p:sldId id="258" r:id="rId3"/>
+    <p:sldId id="259" r:id="rId3"/>
+    <p:sldId id="260" r:id="rId4"/>
+    <p:sldId id="258" r:id="rId5"/>
   </p:sldIdLst>
   <p:sldSz cx="12192000" cy="6858000"/>
   <p:notesSz cx="6858000" cy="9144000"/>
@@ -404,12 +406,12 @@
         </c:dLbls>
         <c:gapWidth val="65"/>
         <c:shape val="box"/>
-        <c:axId val="280990480"/>
-        <c:axId val="280992720"/>
+        <c:axId val="135828800"/>
+        <c:axId val="135829360"/>
         <c:axId val="0"/>
       </c:bar3DChart>
       <c:catAx>
-        <c:axId val="280990480"/>
+        <c:axId val="135828800"/>
         <c:scaling>
           <c:orientation val="minMax"/>
         </c:scaling>
@@ -452,7 +454,7 @@
             <a:endParaRPr lang="en-US"/>
           </a:p>
         </c:txPr>
-        <c:crossAx val="280992720"/>
+        <c:crossAx val="135829360"/>
         <c:crosses val="autoZero"/>
         <c:auto val="1"/>
         <c:lblAlgn val="ctr"/>
@@ -460,7 +462,7 @@
         <c:noMultiLvlLbl val="0"/>
       </c:catAx>
       <c:valAx>
-        <c:axId val="280992720"/>
+        <c:axId val="135829360"/>
         <c:scaling>
           <c:orientation val="minMax"/>
         </c:scaling>
@@ -511,7 +513,7 @@
             <a:endParaRPr lang="en-US"/>
           </a:p>
         </c:txPr>
-        <c:crossAx val="280990480"/>
+        <c:crossAx val="135828800"/>
         <c:crosses val="autoZero"/>
         <c:crossBetween val="between"/>
       </c:valAx>
@@ -1333,7 +1335,7 @@
           <a:p>
             <a:fld id="{218E6659-4E52-41AA-BAE0-215C54DE2D3C}" type="datetimeFigureOut">
               <a:rPr lang="en-US" smtClean="0"/>
-              <a:t>3/6/2015</a:t>
+              <a:t>3/7/2015</a:t>
             </a:fld>
             <a:endParaRPr lang="en-US"/>
           </a:p>
@@ -1503,7 +1505,7 @@
           <a:p>
             <a:fld id="{218E6659-4E52-41AA-BAE0-215C54DE2D3C}" type="datetimeFigureOut">
               <a:rPr lang="en-US" smtClean="0"/>
-              <a:t>3/6/2015</a:t>
+              <a:t>3/7/2015</a:t>
             </a:fld>
             <a:endParaRPr lang="en-US"/>
           </a:p>
@@ -1683,7 +1685,7 @@
           <a:p>
             <a:fld id="{218E6659-4E52-41AA-BAE0-215C54DE2D3C}" type="datetimeFigureOut">
               <a:rPr lang="en-US" smtClean="0"/>
-              <a:t>3/6/2015</a:t>
+              <a:t>3/7/2015</a:t>
             </a:fld>
             <a:endParaRPr lang="en-US"/>
           </a:p>
@@ -1853,7 +1855,7 @@
           <a:p>
             <a:fld id="{218E6659-4E52-41AA-BAE0-215C54DE2D3C}" type="datetimeFigureOut">
               <a:rPr lang="en-US" smtClean="0"/>
-              <a:t>3/6/2015</a:t>
+              <a:t>3/7/2015</a:t>
             </a:fld>
             <a:endParaRPr lang="en-US"/>
           </a:p>
@@ -2099,7 +2101,7 @@
           <a:p>
             <a:fld id="{218E6659-4E52-41AA-BAE0-215C54DE2D3C}" type="datetimeFigureOut">
               <a:rPr lang="en-US" smtClean="0"/>
-              <a:t>3/6/2015</a:t>
+              <a:t>3/7/2015</a:t>
             </a:fld>
             <a:endParaRPr lang="en-US"/>
           </a:p>
@@ -2331,7 +2333,7 @@
           <a:p>
             <a:fld id="{218E6659-4E52-41AA-BAE0-215C54DE2D3C}" type="datetimeFigureOut">
               <a:rPr lang="en-US" smtClean="0"/>
-              <a:t>3/6/2015</a:t>
+              <a:t>3/7/2015</a:t>
             </a:fld>
             <a:endParaRPr lang="en-US"/>
           </a:p>
@@ -2698,7 +2700,7 @@
           <a:p>
             <a:fld id="{218E6659-4E52-41AA-BAE0-215C54DE2D3C}" type="datetimeFigureOut">
               <a:rPr lang="en-US" smtClean="0"/>
-              <a:t>3/6/2015</a:t>
+              <a:t>3/7/2015</a:t>
             </a:fld>
             <a:endParaRPr lang="en-US"/>
           </a:p>
@@ -2816,7 +2818,7 @@
           <a:p>
             <a:fld id="{218E6659-4E52-41AA-BAE0-215C54DE2D3C}" type="datetimeFigureOut">
               <a:rPr lang="en-US" smtClean="0"/>
-              <a:t>3/6/2015</a:t>
+              <a:t>3/7/2015</a:t>
             </a:fld>
             <a:endParaRPr lang="en-US"/>
           </a:p>
@@ -2911,7 +2913,7 @@
           <a:p>
             <a:fld id="{218E6659-4E52-41AA-BAE0-215C54DE2D3C}" type="datetimeFigureOut">
               <a:rPr lang="en-US" smtClean="0"/>
-              <a:t>3/6/2015</a:t>
+              <a:t>3/7/2015</a:t>
             </a:fld>
             <a:endParaRPr lang="en-US"/>
           </a:p>
@@ -3188,7 +3190,7 @@
           <a:p>
             <a:fld id="{218E6659-4E52-41AA-BAE0-215C54DE2D3C}" type="datetimeFigureOut">
               <a:rPr lang="en-US" smtClean="0"/>
-              <a:t>3/6/2015</a:t>
+              <a:t>3/7/2015</a:t>
             </a:fld>
             <a:endParaRPr lang="en-US"/>
           </a:p>
@@ -3441,7 +3443,7 @@
           <a:p>
             <a:fld id="{218E6659-4E52-41AA-BAE0-215C54DE2D3C}" type="datetimeFigureOut">
               <a:rPr lang="en-US" smtClean="0"/>
-              <a:t>3/6/2015</a:t>
+              <a:t>3/7/2015</a:t>
             </a:fld>
             <a:endParaRPr lang="en-US"/>
           </a:p>
@@ -3654,7 +3656,7 @@
           <a:p>
             <a:fld id="{218E6659-4E52-41AA-BAE0-215C54DE2D3C}" type="datetimeFigureOut">
               <a:rPr lang="en-US" smtClean="0"/>
-              <a:t>3/6/2015</a:t>
+              <a:t>3/7/2015</a:t>
             </a:fld>
             <a:endParaRPr lang="en-US"/>
           </a:p>
@@ -4141,6 +4143,342 @@
             <p:ph type="title"/>
           </p:nvPr>
         </p:nvSpPr>
+        <p:spPr/>
+        <p:txBody>
+          <a:bodyPr/>
+          <a:lstStyle/>
+          <a:p>
+            <a:r>
+              <a:rPr lang="en-US" dirty="0" smtClean="0"/>
+              <a:t>Project Overview</a:t>
+            </a:r>
+            <a:endParaRPr lang="en-US" dirty="0"/>
+          </a:p>
+        </p:txBody>
+      </p:sp>
+      <p:sp>
+        <p:nvSpPr>
+          <p:cNvPr id="3" name="Content Placeholder 2"/>
+          <p:cNvSpPr>
+            <a:spLocks noGrp="1"/>
+          </p:cNvSpPr>
+          <p:nvPr>
+            <p:ph idx="1"/>
+          </p:nvPr>
+        </p:nvSpPr>
+        <p:spPr/>
+        <p:txBody>
+          <a:bodyPr>
+            <a:normAutofit fontScale="92500" lnSpcReduction="10000"/>
+          </a:bodyPr>
+          <a:lstStyle/>
+          <a:p>
+            <a:r>
+              <a:rPr lang="en-US" dirty="0" smtClean="0"/>
+              <a:t>General Concept</a:t>
+            </a:r>
+          </a:p>
+          <a:p>
+            <a:pPr lvl="1"/>
+            <a:r>
+              <a:rPr lang="en-US" dirty="0" smtClean="0"/>
+              <a:t>Look at daily changes in the values of financial instruments and indices using concepts from Information Theory </a:t>
+            </a:r>
+          </a:p>
+          <a:p>
+            <a:pPr lvl="2"/>
+            <a:r>
+              <a:rPr lang="en-US" dirty="0" smtClean="0"/>
+              <a:t>Surprise (Entropy, Uncertainty)</a:t>
+            </a:r>
+          </a:p>
+          <a:p>
+            <a:pPr lvl="2"/>
+            <a:r>
+              <a:rPr lang="en-US" dirty="0" smtClean="0"/>
+              <a:t>Distance (</a:t>
+            </a:r>
+            <a:r>
+              <a:rPr lang="en-US" dirty="0" err="1" smtClean="0"/>
+              <a:t>Kullback</a:t>
+            </a:r>
+            <a:r>
+              <a:rPr lang="en-US" dirty="0" smtClean="0"/>
+              <a:t>–</a:t>
+            </a:r>
+            <a:r>
+              <a:rPr lang="en-US" dirty="0" err="1" smtClean="0"/>
+              <a:t>Leibler</a:t>
+            </a:r>
+            <a:r>
+              <a:rPr lang="en-US" dirty="0" smtClean="0"/>
+              <a:t> </a:t>
+            </a:r>
+            <a:r>
+              <a:rPr lang="en-US" dirty="0"/>
+              <a:t>divergence, Jensen–Shannon </a:t>
+            </a:r>
+            <a:r>
+              <a:rPr lang="en-US" dirty="0" smtClean="0"/>
+              <a:t>divergence)</a:t>
+            </a:r>
+          </a:p>
+          <a:p>
+            <a:r>
+              <a:rPr lang="en-US" dirty="0" smtClean="0"/>
+              <a:t>Research Questions</a:t>
+            </a:r>
+          </a:p>
+          <a:p>
+            <a:pPr lvl="1"/>
+            <a:r>
+              <a:rPr lang="en-US" dirty="0" smtClean="0"/>
+              <a:t>How does the measure of surprise vary between different types of instruments, geographic regions, market sectors or time periods?</a:t>
+            </a:r>
+          </a:p>
+          <a:p>
+            <a:pPr lvl="1"/>
+            <a:r>
+              <a:rPr lang="en-US" dirty="0" smtClean="0"/>
+              <a:t>What interesting patterns become apparent if we calculate and map the distance between instruments, regions, sectors, </a:t>
+            </a:r>
+            <a:r>
+              <a:rPr lang="en-US" dirty="0" err="1" smtClean="0"/>
+              <a:t>etc</a:t>
+            </a:r>
+            <a:r>
+              <a:rPr lang="en-US" dirty="0" smtClean="0"/>
+              <a:t>?</a:t>
+            </a:r>
+          </a:p>
+          <a:p>
+            <a:r>
+              <a:rPr lang="en-US" dirty="0" smtClean="0"/>
+              <a:t>Approach</a:t>
+            </a:r>
+          </a:p>
+          <a:p>
+            <a:pPr lvl="1"/>
+            <a:r>
+              <a:rPr lang="en-US" dirty="0" smtClean="0"/>
+              <a:t>Exploratory – gather data, perform preliminary analysis, delve more deeply where interesting patterns are observed (as time allows)</a:t>
+            </a:r>
+            <a:endParaRPr lang="en-US" dirty="0"/>
+          </a:p>
+        </p:txBody>
+      </p:sp>
+    </p:spTree>
+    <p:extLst>
+      <p:ext uri="{BB962C8B-B14F-4D97-AF65-F5344CB8AC3E}">
+        <p14:creationId xmlns:p14="http://schemas.microsoft.com/office/powerpoint/2010/main" val="1744193904"/>
+      </p:ext>
+    </p:extLst>
+  </p:cSld>
+  <p:clrMapOvr>
+    <a:masterClrMapping/>
+  </p:clrMapOvr>
+</p:sld>
+</file>
+
+<file path=ppt/slides/slide3.xml><?xml version="1.0" encoding="utf-8"?>
+<p:sld xmlns:a="http://schemas.openxmlformats.org/drawingml/2006/main" xmlns:r="http://schemas.openxmlformats.org/officeDocument/2006/relationships" xmlns:p="http://schemas.openxmlformats.org/presentationml/2006/main">
+  <p:cSld>
+    <p:spTree>
+      <p:nvGrpSpPr>
+        <p:cNvPr id="1" name=""/>
+        <p:cNvGrpSpPr/>
+        <p:nvPr/>
+      </p:nvGrpSpPr>
+      <p:grpSpPr>
+        <a:xfrm>
+          <a:off x="0" y="0"/>
+          <a:ext cx="0" cy="0"/>
+          <a:chOff x="0" y="0"/>
+          <a:chExt cx="0" cy="0"/>
+        </a:xfrm>
+      </p:grpSpPr>
+      <p:sp>
+        <p:nvSpPr>
+          <p:cNvPr id="2" name="Title 1"/>
+          <p:cNvSpPr>
+            <a:spLocks noGrp="1"/>
+          </p:cNvSpPr>
+          <p:nvPr>
+            <p:ph type="title"/>
+          </p:nvPr>
+        </p:nvSpPr>
+        <p:spPr/>
+        <p:txBody>
+          <a:bodyPr/>
+          <a:lstStyle/>
+          <a:p>
+            <a:r>
+              <a:rPr lang="en-US" dirty="0" smtClean="0"/>
+              <a:t>The Data</a:t>
+            </a:r>
+            <a:endParaRPr lang="en-US" dirty="0"/>
+          </a:p>
+        </p:txBody>
+      </p:sp>
+      <p:sp>
+        <p:nvSpPr>
+          <p:cNvPr id="3" name="Content Placeholder 2"/>
+          <p:cNvSpPr>
+            <a:spLocks noGrp="1"/>
+          </p:cNvSpPr>
+          <p:nvPr>
+            <p:ph idx="1"/>
+          </p:nvPr>
+        </p:nvSpPr>
+        <p:spPr/>
+        <p:txBody>
+          <a:bodyPr/>
+          <a:lstStyle/>
+          <a:p>
+            <a:r>
+              <a:rPr lang="en-US" dirty="0" smtClean="0"/>
+              <a:t>Historical data for many equities, commodities and market indices is </a:t>
+            </a:r>
+            <a:r>
+              <a:rPr lang="en-US" dirty="0"/>
+              <a:t>available through Yahoo Finance</a:t>
+            </a:r>
+            <a:r>
+              <a:rPr lang="en-US" dirty="0" smtClean="0"/>
+              <a:t>, it is free and trivially easy to access</a:t>
+            </a:r>
+          </a:p>
+          <a:p>
+            <a:r>
+              <a:rPr lang="en-US" dirty="0" smtClean="0"/>
+              <a:t>Example:</a:t>
+            </a:r>
+          </a:p>
+          <a:p>
+            <a:pPr lvl="1"/>
+            <a:r>
+              <a:rPr lang="en-US" dirty="0" smtClean="0"/>
+              <a:t>This command:</a:t>
+            </a:r>
+          </a:p>
+          <a:p>
+            <a:pPr lvl="1"/>
+            <a:r>
+              <a:rPr lang="en-US" sz="1600" dirty="0"/>
+              <a:t>http://real-chart.finance.yahoo.com/table.csv?s=%5E</a:t>
+            </a:r>
+            <a:r>
+              <a:rPr lang="en-US" sz="1600" dirty="0">
+                <a:solidFill>
+                  <a:srgbClr val="FF0000"/>
+                </a:solidFill>
+              </a:rPr>
+              <a:t>GSPC</a:t>
+            </a:r>
+            <a:r>
+              <a:rPr lang="en-US" sz="1600" dirty="0"/>
+              <a:t>&amp;d=2&amp;e=7&amp;f=</a:t>
+            </a:r>
+            <a:r>
+              <a:rPr lang="en-US" sz="1600" dirty="0">
+                <a:solidFill>
+                  <a:srgbClr val="FF0000"/>
+                </a:solidFill>
+              </a:rPr>
+              <a:t>2015</a:t>
+            </a:r>
+            <a:r>
+              <a:rPr lang="en-US" sz="1600" dirty="0"/>
+              <a:t>&amp;g=d&amp;a=0&amp;b=3&amp;c=</a:t>
+            </a:r>
+            <a:r>
+              <a:rPr lang="en-US" sz="1600" dirty="0">
+                <a:solidFill>
+                  <a:srgbClr val="FF0000"/>
+                </a:solidFill>
+              </a:rPr>
+              <a:t>1950</a:t>
+            </a:r>
+            <a:r>
+              <a:rPr lang="en-US" sz="1600" dirty="0"/>
+              <a:t>&amp;ignore=.csv</a:t>
+            </a:r>
+            <a:endParaRPr lang="en-US" sz="1600" dirty="0" smtClean="0"/>
+          </a:p>
+          <a:p>
+            <a:pPr lvl="1"/>
+            <a:r>
+              <a:rPr lang="en-US" dirty="0" smtClean="0"/>
+              <a:t>Requests a *.csv file for the ticker symbol GSPC (S&amp;P 500 index) from 1950 through the present</a:t>
+            </a:r>
+            <a:endParaRPr lang="en-US" dirty="0"/>
+          </a:p>
+        </p:txBody>
+      </p:sp>
+      <p:pic>
+        <p:nvPicPr>
+          <p:cNvPr id="4" name="Picture 3"/>
+          <p:cNvPicPr>
+            <a:picLocks noChangeAspect="1"/>
+          </p:cNvPicPr>
+          <p:nvPr/>
+        </p:nvPicPr>
+        <p:blipFill>
+          <a:blip r:embed="rId2"/>
+          <a:stretch>
+            <a:fillRect/>
+          </a:stretch>
+        </p:blipFill>
+        <p:spPr>
+          <a:xfrm>
+            <a:off x="3086100" y="4980894"/>
+            <a:ext cx="6019800" cy="1533525"/>
+          </a:xfrm>
+          <a:prstGeom prst="rect">
+            <a:avLst/>
+          </a:prstGeom>
+        </p:spPr>
+      </p:pic>
+    </p:spTree>
+    <p:extLst>
+      <p:ext uri="{BB962C8B-B14F-4D97-AF65-F5344CB8AC3E}">
+        <p14:creationId xmlns:p14="http://schemas.microsoft.com/office/powerpoint/2010/main" val="3239638272"/>
+      </p:ext>
+    </p:extLst>
+  </p:cSld>
+  <p:clrMapOvr>
+    <a:masterClrMapping/>
+  </p:clrMapOvr>
+</p:sld>
+</file>
+
+<file path=ppt/slides/slide4.xml><?xml version="1.0" encoding="utf-8"?>
+<p:sld xmlns:a="http://schemas.openxmlformats.org/drawingml/2006/main" xmlns:r="http://schemas.openxmlformats.org/officeDocument/2006/relationships" xmlns:p="http://schemas.openxmlformats.org/presentationml/2006/main">
+  <p:cSld>
+    <p:spTree>
+      <p:nvGrpSpPr>
+        <p:cNvPr id="1" name=""/>
+        <p:cNvGrpSpPr/>
+        <p:nvPr/>
+      </p:nvGrpSpPr>
+      <p:grpSpPr>
+        <a:xfrm>
+          <a:off x="0" y="0"/>
+          <a:ext cx="0" cy="0"/>
+          <a:chOff x="0" y="0"/>
+          <a:chExt cx="0" cy="0"/>
+        </a:xfrm>
+      </p:grpSpPr>
+      <p:sp>
+        <p:nvSpPr>
+          <p:cNvPr id="2" name="Title 1"/>
+          <p:cNvSpPr>
+            <a:spLocks noGrp="1"/>
+          </p:cNvSpPr>
+          <p:nvPr>
+            <p:ph type="title"/>
+          </p:nvPr>
+        </p:nvSpPr>
         <p:spPr>
           <a:xfrm>
             <a:off x="838200" y="127381"/>
@@ -4189,11 +4527,7 @@
           <a:p>
             <a:r>
               <a:rPr lang="en-US" dirty="0" smtClean="0"/>
-              <a:t>Looking at two decades of the S&amp;P 500 </a:t>
-            </a:r>
-            <a:r>
-              <a:rPr lang="en-US" dirty="0" smtClean="0"/>
-              <a:t>Index</a:t>
+              <a:t>Looking at two decades of the S&amp;P 500 Index</a:t>
             </a:r>
           </a:p>
           <a:p>
@@ -4202,7 +4536,6 @@
               <a:rPr lang="en-US" dirty="0" smtClean="0"/>
               <a:t>Looking only at daily gain or loss &gt; 1 standard deviation</a:t>
             </a:r>
-            <a:endParaRPr lang="en-US" dirty="0" smtClean="0"/>
           </a:p>
           <a:p>
             <a:r>
@@ -4226,15 +4559,7 @@
             </a:r>
             <a:r>
               <a:rPr lang="en-US" dirty="0" smtClean="0"/>
-              <a:t>&gt;</a:t>
-            </a:r>
-            <a:r>
-              <a:rPr lang="en-US" dirty="0" smtClean="0"/>
-              <a:t>Down has </a:t>
-            </a:r>
-            <a:r>
-              <a:rPr lang="en-US" dirty="0" smtClean="0"/>
-              <a:t>been replaced by </a:t>
+              <a:t>&gt;Down has been replaced by </a:t>
             </a:r>
             <a:r>
               <a:rPr lang="en-US" dirty="0"/>
@@ -4250,13 +4575,8 @@
             </a:r>
             <a:r>
               <a:rPr lang="en-US" dirty="0" smtClean="0"/>
-              <a:t>&gt;</a:t>
-            </a:r>
-            <a:r>
-              <a:rPr lang="en-US" dirty="0" smtClean="0"/>
-              <a:t>Up </a:t>
-            </a:r>
-            <a:endParaRPr lang="en-US" dirty="0" smtClean="0"/>
+              <a:t>&gt;Up </a:t>
+            </a:r>
           </a:p>
         </p:txBody>
       </p:sp>

</xml_diff>

<commit_message>
added slides on distributions and surprise
</commit_message>
<xml_diff>
--- a/slides/hackathon.pptx
+++ b/slides/hackathon.pptx
@@ -12,6 +12,8 @@
     <p:sldId id="258" r:id="rId6"/>
     <p:sldId id="263" r:id="rId7"/>
     <p:sldId id="264" r:id="rId8"/>
+    <p:sldId id="265" r:id="rId9"/>
+    <p:sldId id="266" r:id="rId10"/>
   </p:sldIdLst>
   <p:sldSz cx="12192000" cy="6858000"/>
   <p:notesSz cx="6858000" cy="9144000"/>
@@ -409,12 +411,12 @@
         </c:dLbls>
         <c:gapWidth val="65"/>
         <c:shape val="box"/>
-        <c:axId val="195023872"/>
-        <c:axId val="195024432"/>
+        <c:axId val="192617936"/>
+        <c:axId val="192618496"/>
         <c:axId val="0"/>
       </c:bar3DChart>
       <c:catAx>
-        <c:axId val="195023872"/>
+        <c:axId val="192617936"/>
         <c:scaling>
           <c:orientation val="minMax"/>
         </c:scaling>
@@ -457,7 +459,7 @@
             <a:endParaRPr lang="en-US"/>
           </a:p>
         </c:txPr>
-        <c:crossAx val="195024432"/>
+        <c:crossAx val="192618496"/>
         <c:crosses val="autoZero"/>
         <c:auto val="1"/>
         <c:lblAlgn val="ctr"/>
@@ -465,7 +467,7 @@
         <c:noMultiLvlLbl val="0"/>
       </c:catAx>
       <c:valAx>
-        <c:axId val="195024432"/>
+        <c:axId val="192618496"/>
         <c:scaling>
           <c:orientation val="minMax"/>
         </c:scaling>
@@ -516,7 +518,7 @@
             <a:endParaRPr lang="en-US"/>
           </a:p>
         </c:txPr>
-        <c:crossAx val="195023872"/>
+        <c:crossAx val="192617936"/>
         <c:crosses val="autoZero"/>
         <c:crossBetween val="between"/>
       </c:valAx>
@@ -1269,11 +1271,11 @@
           <c:showBubbleSize val="0"/>
         </c:dLbls>
         <c:smooth val="0"/>
-        <c:axId val="195504928"/>
-        <c:axId val="195505488"/>
+        <c:axId val="192621856"/>
+        <c:axId val="192622416"/>
       </c:lineChart>
       <c:catAx>
-        <c:axId val="195504928"/>
+        <c:axId val="192621856"/>
         <c:scaling>
           <c:orientation val="minMax"/>
         </c:scaling>
@@ -1316,7 +1318,7 @@
             <a:endParaRPr lang="en-US"/>
           </a:p>
         </c:txPr>
-        <c:crossAx val="195505488"/>
+        <c:crossAx val="192622416"/>
         <c:crosses val="autoZero"/>
         <c:auto val="1"/>
         <c:lblAlgn val="ctr"/>
@@ -1324,7 +1326,7 @@
         <c:noMultiLvlLbl val="0"/>
       </c:catAx>
       <c:valAx>
-        <c:axId val="195505488"/>
+        <c:axId val="192622416"/>
         <c:scaling>
           <c:orientation val="minMax"/>
         </c:scaling>
@@ -1375,7 +1377,1185 @@
             <a:endParaRPr lang="en-US"/>
           </a:p>
         </c:txPr>
-        <c:crossAx val="195504928"/>
+        <c:crossAx val="192621856"/>
+        <c:crosses val="autoZero"/>
+        <c:crossBetween val="between"/>
+      </c:valAx>
+      <c:spPr>
+        <a:noFill/>
+        <a:ln>
+          <a:noFill/>
+        </a:ln>
+        <a:effectLst/>
+      </c:spPr>
+    </c:plotArea>
+    <c:legend>
+      <c:legendPos val="b"/>
+      <c:layout/>
+      <c:overlay val="0"/>
+      <c:spPr>
+        <a:noFill/>
+        <a:ln>
+          <a:noFill/>
+        </a:ln>
+        <a:effectLst/>
+      </c:spPr>
+      <c:txPr>
+        <a:bodyPr rot="0" spcFirstLastPara="1" vertOverflow="ellipsis" vert="horz" wrap="square" anchor="ctr" anchorCtr="1"/>
+        <a:lstStyle/>
+        <a:p>
+          <a:pPr>
+            <a:defRPr sz="900" b="0" i="0" u="none" strike="noStrike" kern="1200" baseline="0">
+              <a:solidFill>
+                <a:schemeClr val="tx1">
+                  <a:lumMod val="65000"/>
+                  <a:lumOff val="35000"/>
+                </a:schemeClr>
+              </a:solidFill>
+              <a:latin typeface="+mn-lt"/>
+              <a:ea typeface="+mn-ea"/>
+              <a:cs typeface="+mn-cs"/>
+            </a:defRPr>
+          </a:pPr>
+          <a:endParaRPr lang="en-US"/>
+        </a:p>
+      </c:txPr>
+    </c:legend>
+    <c:plotVisOnly val="1"/>
+    <c:dispBlanksAs val="gap"/>
+    <c:showDLblsOverMax val="0"/>
+  </c:chart>
+  <c:spPr>
+    <a:noFill/>
+    <a:ln>
+      <a:noFill/>
+    </a:ln>
+    <a:effectLst/>
+  </c:spPr>
+  <c:txPr>
+    <a:bodyPr/>
+    <a:lstStyle/>
+    <a:p>
+      <a:pPr>
+        <a:defRPr/>
+      </a:pPr>
+      <a:endParaRPr lang="en-US"/>
+    </a:p>
+  </c:txPr>
+  <c:externalData r:id="rId3">
+    <c:autoUpdate val="0"/>
+  </c:externalData>
+</c:chartSpace>
+</file>
+
+<file path=ppt/charts/chart3.xml><?xml version="1.0" encoding="utf-8"?>
+<c:chartSpace xmlns:c="http://schemas.openxmlformats.org/drawingml/2006/chart" xmlns:a="http://schemas.openxmlformats.org/drawingml/2006/main" xmlns:r="http://schemas.openxmlformats.org/officeDocument/2006/relationships">
+  <c:date1904 val="0"/>
+  <c:lang val="en-US"/>
+  <c:roundedCorners val="0"/>
+  <mc:AlternateContent xmlns:mc="http://schemas.openxmlformats.org/markup-compatibility/2006">
+    <mc:Choice xmlns:c14="http://schemas.microsoft.com/office/drawing/2007/8/2/chart" Requires="c14">
+      <c14:style val="102"/>
+    </mc:Choice>
+    <mc:Fallback>
+      <c:style val="2"/>
+    </mc:Fallback>
+  </mc:AlternateContent>
+  <c:chart>
+    <c:title>
+      <c:tx>
+        <c:rich>
+          <a:bodyPr rot="0" spcFirstLastPara="1" vertOverflow="ellipsis" vert="horz" wrap="square" anchor="ctr" anchorCtr="1"/>
+          <a:lstStyle/>
+          <a:p>
+            <a:pPr>
+              <a:defRPr sz="1400" b="0" i="0" u="none" strike="noStrike" kern="1200" spc="0" baseline="0">
+                <a:solidFill>
+                  <a:schemeClr val="tx1">
+                    <a:lumMod val="65000"/>
+                    <a:lumOff val="35000"/>
+                  </a:schemeClr>
+                </a:solidFill>
+                <a:latin typeface="+mn-lt"/>
+                <a:ea typeface="+mn-ea"/>
+                <a:cs typeface="+mn-cs"/>
+              </a:defRPr>
+            </a:pPr>
+            <a:r>
+              <a:rPr lang="en-US" sz="1800" b="0" i="0" baseline="0">
+                <a:effectLst/>
+              </a:rPr>
+              <a:t>Daily Return Distributions of 4 Major Stock Indices</a:t>
+            </a:r>
+            <a:endParaRPr lang="en-US">
+              <a:effectLst/>
+            </a:endParaRPr>
+          </a:p>
+        </c:rich>
+      </c:tx>
+      <c:layout/>
+      <c:overlay val="0"/>
+      <c:spPr>
+        <a:noFill/>
+        <a:ln>
+          <a:noFill/>
+        </a:ln>
+        <a:effectLst/>
+      </c:spPr>
+      <c:txPr>
+        <a:bodyPr rot="0" spcFirstLastPara="1" vertOverflow="ellipsis" vert="horz" wrap="square" anchor="ctr" anchorCtr="1"/>
+        <a:lstStyle/>
+        <a:p>
+          <a:pPr>
+            <a:defRPr sz="1400" b="0" i="0" u="none" strike="noStrike" kern="1200" spc="0" baseline="0">
+              <a:solidFill>
+                <a:schemeClr val="tx1">
+                  <a:lumMod val="65000"/>
+                  <a:lumOff val="35000"/>
+                </a:schemeClr>
+              </a:solidFill>
+              <a:latin typeface="+mn-lt"/>
+              <a:ea typeface="+mn-ea"/>
+              <a:cs typeface="+mn-cs"/>
+            </a:defRPr>
+          </a:pPr>
+          <a:endParaRPr lang="en-US"/>
+        </a:p>
+      </c:txPr>
+    </c:title>
+    <c:autoTitleDeleted val="0"/>
+    <c:plotArea>
+      <c:layout/>
+      <c:lineChart>
+        <c:grouping val="standard"/>
+        <c:varyColors val="0"/>
+        <c:ser>
+          <c:idx val="0"/>
+          <c:order val="0"/>
+          <c:tx>
+            <c:v>BVSP (Sao Paulo)</c:v>
+          </c:tx>
+          <c:spPr>
+            <a:ln w="28575" cap="rnd">
+              <a:solidFill>
+                <a:schemeClr val="accent1"/>
+              </a:solidFill>
+              <a:round/>
+            </a:ln>
+            <a:effectLst/>
+          </c:spPr>
+          <c:marker>
+            <c:symbol val="none"/>
+          </c:marker>
+          <c:cat>
+            <c:numRef>
+              <c:f>chart!$G$4:$G$71</c:f>
+              <c:numCache>
+                <c:formatCode>General</c:formatCode>
+                <c:ptCount val="68"/>
+                <c:pt idx="0">
+                  <c:v>-4</c:v>
+                </c:pt>
+                <c:pt idx="8">
+                  <c:v>-3</c:v>
+                </c:pt>
+                <c:pt idx="16">
+                  <c:v>-2</c:v>
+                </c:pt>
+                <c:pt idx="24">
+                  <c:v>-1</c:v>
+                </c:pt>
+                <c:pt idx="32">
+                  <c:v>0</c:v>
+                </c:pt>
+                <c:pt idx="40">
+                  <c:v>1</c:v>
+                </c:pt>
+                <c:pt idx="48">
+                  <c:v>2</c:v>
+                </c:pt>
+                <c:pt idx="56">
+                  <c:v>3</c:v>
+                </c:pt>
+                <c:pt idx="63">
+                  <c:v>4</c:v>
+                </c:pt>
+              </c:numCache>
+            </c:numRef>
+          </c:cat>
+          <c:val>
+            <c:numRef>
+              <c:f>chart!$H$4:$H$71</c:f>
+              <c:numCache>
+                <c:formatCode>General</c:formatCode>
+                <c:ptCount val="68"/>
+                <c:pt idx="1">
+                  <c:v>7.993605115907274E-4</c:v>
+                </c:pt>
+                <c:pt idx="2">
+                  <c:v>7.993605115907274E-4</c:v>
+                </c:pt>
+                <c:pt idx="3">
+                  <c:v>7.993605115907274E-4</c:v>
+                </c:pt>
+                <c:pt idx="4">
+                  <c:v>7.993605115907274E-4</c:v>
+                </c:pt>
+                <c:pt idx="5">
+                  <c:v>7.993605115907274E-4</c:v>
+                </c:pt>
+                <c:pt idx="8">
+                  <c:v>7.993605115907274E-4</c:v>
+                </c:pt>
+                <c:pt idx="9">
+                  <c:v>7.993605115907274E-4</c:v>
+                </c:pt>
+                <c:pt idx="10">
+                  <c:v>3.9968025579536371E-3</c:v>
+                </c:pt>
+                <c:pt idx="11">
+                  <c:v>4.7961630695443642E-3</c:v>
+                </c:pt>
+                <c:pt idx="12">
+                  <c:v>3.9968025579536371E-3</c:v>
+                </c:pt>
+                <c:pt idx="13">
+                  <c:v>3.1974420463629096E-3</c:v>
+                </c:pt>
+                <c:pt idx="14">
+                  <c:v>1.5987210231814548E-3</c:v>
+                </c:pt>
+                <c:pt idx="15">
+                  <c:v>4.7961630695443642E-3</c:v>
+                </c:pt>
+                <c:pt idx="16">
+                  <c:v>7.1942446043165471E-3</c:v>
+                </c:pt>
+                <c:pt idx="17">
+                  <c:v>1.1990407673860911E-2</c:v>
+                </c:pt>
+                <c:pt idx="18">
+                  <c:v>5.5955235811350921E-3</c:v>
+                </c:pt>
+                <c:pt idx="19">
+                  <c:v>1.5987210231814548E-2</c:v>
+                </c:pt>
+                <c:pt idx="20">
+                  <c:v>1.5987210231814548E-2</c:v>
+                </c:pt>
+                <c:pt idx="21">
+                  <c:v>2.2382094324540368E-2</c:v>
+                </c:pt>
+                <c:pt idx="22">
+                  <c:v>1.5987210231814548E-2</c:v>
+                </c:pt>
+                <c:pt idx="23">
+                  <c:v>1.838529176658673E-2</c:v>
+                </c:pt>
+                <c:pt idx="24">
+                  <c:v>2.3181454836131096E-2</c:v>
+                </c:pt>
+                <c:pt idx="25">
+                  <c:v>2.8776978417266189E-2</c:v>
+                </c:pt>
+                <c:pt idx="26">
+                  <c:v>4.0767386091127102E-2</c:v>
+                </c:pt>
+                <c:pt idx="27">
+                  <c:v>3.5171862509992005E-2</c:v>
+                </c:pt>
+                <c:pt idx="28">
+                  <c:v>3.9968025579536368E-2</c:v>
+                </c:pt>
+                <c:pt idx="29">
+                  <c:v>5.0359712230215826E-2</c:v>
+                </c:pt>
+                <c:pt idx="30">
+                  <c:v>4.7961630695443645E-2</c:v>
+                </c:pt>
+                <c:pt idx="31">
+                  <c:v>5.2757793764988008E-2</c:v>
+                </c:pt>
+                <c:pt idx="32">
+                  <c:v>9.3525179856115109E-2</c:v>
+                </c:pt>
+                <c:pt idx="33">
+                  <c:v>5.8353317346123104E-2</c:v>
+                </c:pt>
+                <c:pt idx="34">
+                  <c:v>4.0767386091127102E-2</c:v>
+                </c:pt>
+                <c:pt idx="35">
+                  <c:v>4.5563549160671464E-2</c:v>
+                </c:pt>
+                <c:pt idx="36">
+                  <c:v>3.9168665067945641E-2</c:v>
+                </c:pt>
+                <c:pt idx="37">
+                  <c:v>3.5971223021582732E-2</c:v>
+                </c:pt>
+                <c:pt idx="38">
+                  <c:v>2.3181454836131096E-2</c:v>
+                </c:pt>
+                <c:pt idx="39">
+                  <c:v>2.8776978417266189E-2</c:v>
+                </c:pt>
+                <c:pt idx="40">
+                  <c:v>2.7977617905675458E-2</c:v>
+                </c:pt>
+                <c:pt idx="41">
+                  <c:v>2.3980815347721823E-2</c:v>
+                </c:pt>
+                <c:pt idx="42">
+                  <c:v>1.5987210231814548E-2</c:v>
+                </c:pt>
+                <c:pt idx="43">
+                  <c:v>1.9184652278177457E-2</c:v>
+                </c:pt>
+                <c:pt idx="44">
+                  <c:v>1.6786570743405275E-2</c:v>
+                </c:pt>
+                <c:pt idx="45">
+                  <c:v>1.0391686650679457E-2</c:v>
+                </c:pt>
+                <c:pt idx="46">
+                  <c:v>7.9936051159072742E-3</c:v>
+                </c:pt>
+                <c:pt idx="47">
+                  <c:v>5.5955235811350921E-3</c:v>
+                </c:pt>
+                <c:pt idx="48">
+                  <c:v>1.0391686650679457E-2</c:v>
+                </c:pt>
+                <c:pt idx="49">
+                  <c:v>7.1942446043165471E-3</c:v>
+                </c:pt>
+                <c:pt idx="50">
+                  <c:v>4.7961630695443642E-3</c:v>
+                </c:pt>
+                <c:pt idx="51">
+                  <c:v>3.9968025579536371E-3</c:v>
+                </c:pt>
+                <c:pt idx="52">
+                  <c:v>3.1974420463629096E-3</c:v>
+                </c:pt>
+                <c:pt idx="53">
+                  <c:v>7.993605115907274E-4</c:v>
+                </c:pt>
+                <c:pt idx="54">
+                  <c:v>1.5987210231814548E-3</c:v>
+                </c:pt>
+                <c:pt idx="55">
+                  <c:v>3.9968025579536371E-3</c:v>
+                </c:pt>
+                <c:pt idx="56">
+                  <c:v>2.3980815347721821E-3</c:v>
+                </c:pt>
+                <c:pt idx="57">
+                  <c:v>7.993605115907274E-4</c:v>
+                </c:pt>
+                <c:pt idx="58">
+                  <c:v>7.993605115907274E-4</c:v>
+                </c:pt>
+                <c:pt idx="60">
+                  <c:v>7.993605115907274E-4</c:v>
+                </c:pt>
+                <c:pt idx="61">
+                  <c:v>1.5987210231814548E-3</c:v>
+                </c:pt>
+                <c:pt idx="62">
+                  <c:v>7.993605115907274E-4</c:v>
+                </c:pt>
+                <c:pt idx="63">
+                  <c:v>7.993605115907274E-4</c:v>
+                </c:pt>
+                <c:pt idx="64">
+                  <c:v>7.993605115907274E-4</c:v>
+                </c:pt>
+              </c:numCache>
+            </c:numRef>
+          </c:val>
+          <c:smooth val="0"/>
+        </c:ser>
+        <c:ser>
+          <c:idx val="1"/>
+          <c:order val="1"/>
+          <c:tx>
+            <c:v>FTSE (London)</c:v>
+          </c:tx>
+          <c:spPr>
+            <a:ln w="28575" cap="rnd">
+              <a:solidFill>
+                <a:schemeClr val="accent2"/>
+              </a:solidFill>
+              <a:round/>
+            </a:ln>
+            <a:effectLst/>
+          </c:spPr>
+          <c:marker>
+            <c:symbol val="none"/>
+          </c:marker>
+          <c:cat>
+            <c:numRef>
+              <c:f>chart!$G$4:$G$71</c:f>
+              <c:numCache>
+                <c:formatCode>General</c:formatCode>
+                <c:ptCount val="68"/>
+                <c:pt idx="0">
+                  <c:v>-4</c:v>
+                </c:pt>
+                <c:pt idx="8">
+                  <c:v>-3</c:v>
+                </c:pt>
+                <c:pt idx="16">
+                  <c:v>-2</c:v>
+                </c:pt>
+                <c:pt idx="24">
+                  <c:v>-1</c:v>
+                </c:pt>
+                <c:pt idx="32">
+                  <c:v>0</c:v>
+                </c:pt>
+                <c:pt idx="40">
+                  <c:v>1</c:v>
+                </c:pt>
+                <c:pt idx="48">
+                  <c:v>2</c:v>
+                </c:pt>
+                <c:pt idx="56">
+                  <c:v>3</c:v>
+                </c:pt>
+                <c:pt idx="63">
+                  <c:v>4</c:v>
+                </c:pt>
+              </c:numCache>
+            </c:numRef>
+          </c:cat>
+          <c:val>
+            <c:numRef>
+              <c:f>chart!$I$4:$I$71</c:f>
+              <c:numCache>
+                <c:formatCode>General</c:formatCode>
+                <c:ptCount val="68"/>
+                <c:pt idx="2">
+                  <c:v>7.7101002313030066E-4</c:v>
+                </c:pt>
+                <c:pt idx="3">
+                  <c:v>7.7101002313030066E-4</c:v>
+                </c:pt>
+                <c:pt idx="9">
+                  <c:v>7.7101002313030066E-4</c:v>
+                </c:pt>
+                <c:pt idx="10">
+                  <c:v>1.5420200462606013E-3</c:v>
+                </c:pt>
+                <c:pt idx="12">
+                  <c:v>1.5420200462606013E-3</c:v>
+                </c:pt>
+                <c:pt idx="13">
+                  <c:v>1.5420200462606013E-3</c:v>
+                </c:pt>
+                <c:pt idx="14">
+                  <c:v>1.5420200462606013E-3</c:v>
+                </c:pt>
+                <c:pt idx="15">
+                  <c:v>2.3130300693909021E-3</c:v>
+                </c:pt>
+                <c:pt idx="16">
+                  <c:v>5.3970701619121047E-3</c:v>
+                </c:pt>
+                <c:pt idx="17">
+                  <c:v>3.8550501156515036E-3</c:v>
+                </c:pt>
+                <c:pt idx="18">
+                  <c:v>4.6260601387818042E-3</c:v>
+                </c:pt>
+                <c:pt idx="19">
+                  <c:v>5.3970701619121047E-3</c:v>
+                </c:pt>
+                <c:pt idx="20">
+                  <c:v>5.3970701619121047E-3</c:v>
+                </c:pt>
+                <c:pt idx="21">
+                  <c:v>8.4811102544333078E-3</c:v>
+                </c:pt>
+                <c:pt idx="22">
+                  <c:v>1.2336160370084811E-2</c:v>
+                </c:pt>
+                <c:pt idx="23">
+                  <c:v>1.5420200462606014E-2</c:v>
+                </c:pt>
+                <c:pt idx="24">
+                  <c:v>1.2336160370084811E-2</c:v>
+                </c:pt>
+                <c:pt idx="25">
+                  <c:v>2.081727062451812E-2</c:v>
+                </c:pt>
+                <c:pt idx="26">
+                  <c:v>3.6237471087124135E-2</c:v>
+                </c:pt>
+                <c:pt idx="27">
+                  <c:v>2.081727062451812E-2</c:v>
+                </c:pt>
+                <c:pt idx="28">
+                  <c:v>3.3153430994602932E-2</c:v>
+                </c:pt>
+                <c:pt idx="29">
+                  <c:v>5.3970701619121049E-2</c:v>
+                </c:pt>
+                <c:pt idx="30">
+                  <c:v>6.3993831919814961E-2</c:v>
+                </c:pt>
+                <c:pt idx="31">
+                  <c:v>7.0161912104857366E-2</c:v>
+                </c:pt>
+                <c:pt idx="32">
+                  <c:v>0.19429452582883577</c:v>
+                </c:pt>
+                <c:pt idx="33">
+                  <c:v>7.3245952197378561E-2</c:v>
+                </c:pt>
+                <c:pt idx="34">
+                  <c:v>7.0932922127987658E-2</c:v>
+                </c:pt>
+                <c:pt idx="35">
+                  <c:v>5.1657671549730146E-2</c:v>
+                </c:pt>
+                <c:pt idx="36">
+                  <c:v>5.1657671549730146E-2</c:v>
+                </c:pt>
+                <c:pt idx="37">
+                  <c:v>4.0092521202775636E-2</c:v>
+                </c:pt>
+                <c:pt idx="38">
+                  <c:v>2.9298380878951428E-2</c:v>
+                </c:pt>
+                <c:pt idx="39">
+                  <c:v>2.6214340786430222E-2</c:v>
+                </c:pt>
+                <c:pt idx="40">
+                  <c:v>1.7733230531996914E-2</c:v>
+                </c:pt>
+                <c:pt idx="41">
+                  <c:v>1.5420200462606014E-2</c:v>
+                </c:pt>
+                <c:pt idx="42">
+                  <c:v>6.1680801850424053E-3</c:v>
+                </c:pt>
+                <c:pt idx="43">
+                  <c:v>8.4811102544333078E-3</c:v>
+                </c:pt>
+                <c:pt idx="44">
+                  <c:v>8.4811102544333078E-3</c:v>
+                </c:pt>
+                <c:pt idx="45">
+                  <c:v>4.6260601387818042E-3</c:v>
+                </c:pt>
+                <c:pt idx="46">
+                  <c:v>3.0840400925212026E-3</c:v>
+                </c:pt>
+                <c:pt idx="47">
+                  <c:v>3.0840400925212026E-3</c:v>
+                </c:pt>
+                <c:pt idx="49">
+                  <c:v>2.3130300693909021E-3</c:v>
+                </c:pt>
+                <c:pt idx="50">
+                  <c:v>1.5420200462606013E-3</c:v>
+                </c:pt>
+                <c:pt idx="51">
+                  <c:v>2.3130300693909021E-3</c:v>
+                </c:pt>
+                <c:pt idx="52">
+                  <c:v>3.8550501156515036E-3</c:v>
+                </c:pt>
+                <c:pt idx="56">
+                  <c:v>7.7101002313030066E-4</c:v>
+                </c:pt>
+                <c:pt idx="58">
+                  <c:v>7.7101002313030066E-4</c:v>
+                </c:pt>
+                <c:pt idx="64">
+                  <c:v>7.7101002313030066E-4</c:v>
+                </c:pt>
+              </c:numCache>
+            </c:numRef>
+          </c:val>
+          <c:smooth val="0"/>
+        </c:ser>
+        <c:ser>
+          <c:idx val="2"/>
+          <c:order val="2"/>
+          <c:tx>
+            <c:v>Nikkei (Tokyo)</c:v>
+          </c:tx>
+          <c:spPr>
+            <a:ln w="28575" cap="rnd">
+              <a:solidFill>
+                <a:schemeClr val="accent3"/>
+              </a:solidFill>
+              <a:round/>
+            </a:ln>
+            <a:effectLst/>
+          </c:spPr>
+          <c:marker>
+            <c:symbol val="none"/>
+          </c:marker>
+          <c:cat>
+            <c:numRef>
+              <c:f>chart!$G$4:$G$71</c:f>
+              <c:numCache>
+                <c:formatCode>General</c:formatCode>
+                <c:ptCount val="68"/>
+                <c:pt idx="0">
+                  <c:v>-4</c:v>
+                </c:pt>
+                <c:pt idx="8">
+                  <c:v>-3</c:v>
+                </c:pt>
+                <c:pt idx="16">
+                  <c:v>-2</c:v>
+                </c:pt>
+                <c:pt idx="24">
+                  <c:v>-1</c:v>
+                </c:pt>
+                <c:pt idx="32">
+                  <c:v>0</c:v>
+                </c:pt>
+                <c:pt idx="40">
+                  <c:v>1</c:v>
+                </c:pt>
+                <c:pt idx="48">
+                  <c:v>2</c:v>
+                </c:pt>
+                <c:pt idx="56">
+                  <c:v>3</c:v>
+                </c:pt>
+                <c:pt idx="63">
+                  <c:v>4</c:v>
+                </c:pt>
+              </c:numCache>
+            </c:numRef>
+          </c:cat>
+          <c:val>
+            <c:numRef>
+              <c:f>chart!$J$4:$J$71</c:f>
+              <c:numCache>
+                <c:formatCode>General</c:formatCode>
+                <c:ptCount val="68"/>
+                <c:pt idx="5">
+                  <c:v>8.0710250201775622E-4</c:v>
+                </c:pt>
+                <c:pt idx="7">
+                  <c:v>8.0710250201775622E-4</c:v>
+                </c:pt>
+                <c:pt idx="8">
+                  <c:v>3.2284100080710249E-3</c:v>
+                </c:pt>
+                <c:pt idx="9">
+                  <c:v>8.0710250201775622E-4</c:v>
+                </c:pt>
+                <c:pt idx="11">
+                  <c:v>2.4213075060532689E-3</c:v>
+                </c:pt>
+                <c:pt idx="12">
+                  <c:v>1.6142050040355124E-3</c:v>
+                </c:pt>
+                <c:pt idx="13">
+                  <c:v>5.6497175141242938E-3</c:v>
+                </c:pt>
+                <c:pt idx="14">
+                  <c:v>3.2284100080710249E-3</c:v>
+                </c:pt>
+                <c:pt idx="15">
+                  <c:v>3.2284100080710249E-3</c:v>
+                </c:pt>
+                <c:pt idx="16">
+                  <c:v>5.6497175141242938E-3</c:v>
+                </c:pt>
+                <c:pt idx="17">
+                  <c:v>6.4568200161420498E-3</c:v>
+                </c:pt>
+                <c:pt idx="18">
+                  <c:v>9.6852300242130755E-3</c:v>
+                </c:pt>
+                <c:pt idx="19">
+                  <c:v>1.3720742534301856E-2</c:v>
+                </c:pt>
+                <c:pt idx="20">
+                  <c:v>1.1299435028248588E-2</c:v>
+                </c:pt>
+                <c:pt idx="21">
+                  <c:v>1.29136400322841E-2</c:v>
+                </c:pt>
+                <c:pt idx="22">
+                  <c:v>1.6142050040355124E-2</c:v>
+                </c:pt>
+                <c:pt idx="23">
+                  <c:v>2.9055690072639227E-2</c:v>
+                </c:pt>
+                <c:pt idx="24">
+                  <c:v>1.2106537530266344E-2</c:v>
+                </c:pt>
+                <c:pt idx="25">
+                  <c:v>3.1476997578692496E-2</c:v>
+                </c:pt>
+                <c:pt idx="26">
+                  <c:v>2.7441485068603711E-2</c:v>
+                </c:pt>
+                <c:pt idx="27">
+                  <c:v>3.1476997578692496E-2</c:v>
+                </c:pt>
+                <c:pt idx="28">
+                  <c:v>4.519774011299435E-2</c:v>
+                </c:pt>
+                <c:pt idx="29">
+                  <c:v>3.6319612590799029E-2</c:v>
+                </c:pt>
+                <c:pt idx="30">
+                  <c:v>4.519774011299435E-2</c:v>
+                </c:pt>
+                <c:pt idx="31">
+                  <c:v>5.8111380145278453E-2</c:v>
+                </c:pt>
+                <c:pt idx="32">
+                  <c:v>0.12590799031476999</c:v>
+                </c:pt>
+                <c:pt idx="33">
+                  <c:v>5.3268765133171914E-2</c:v>
+                </c:pt>
+                <c:pt idx="34">
+                  <c:v>4.1969330104923326E-2</c:v>
+                </c:pt>
+                <c:pt idx="35">
+                  <c:v>4.3583535108958835E-2</c:v>
+                </c:pt>
+                <c:pt idx="36">
+                  <c:v>4.1162227602905568E-2</c:v>
+                </c:pt>
+                <c:pt idx="37">
+                  <c:v>3.5512510088781278E-2</c:v>
+                </c:pt>
+                <c:pt idx="38">
+                  <c:v>3.470540758676352E-2</c:v>
+                </c:pt>
+                <c:pt idx="39">
+                  <c:v>3.7933817594834544E-2</c:v>
+                </c:pt>
+                <c:pt idx="40">
+                  <c:v>1.8563357546408393E-2</c:v>
+                </c:pt>
+                <c:pt idx="41">
+                  <c:v>2.4213075060532687E-2</c:v>
+                </c:pt>
+                <c:pt idx="42">
+                  <c:v>1.9370460048426151E-2</c:v>
+                </c:pt>
+                <c:pt idx="43">
+                  <c:v>2.0177562550443905E-2</c:v>
+                </c:pt>
+                <c:pt idx="44">
+                  <c:v>1.4527845036319613E-2</c:v>
+                </c:pt>
+                <c:pt idx="45">
+                  <c:v>1.4527845036319613E-2</c:v>
+                </c:pt>
+                <c:pt idx="46">
+                  <c:v>1.5334947538337369E-2</c:v>
+                </c:pt>
+                <c:pt idx="47">
+                  <c:v>7.2639225181598066E-3</c:v>
+                </c:pt>
+                <c:pt idx="48">
+                  <c:v>4.0355125100887809E-3</c:v>
+                </c:pt>
+                <c:pt idx="49">
+                  <c:v>1.0492332526230832E-2</c:v>
+                </c:pt>
+                <c:pt idx="50">
+                  <c:v>5.6497175141242938E-3</c:v>
+                </c:pt>
+                <c:pt idx="51">
+                  <c:v>4.0355125100887809E-3</c:v>
+                </c:pt>
+                <c:pt idx="52">
+                  <c:v>8.0710250201775622E-4</c:v>
+                </c:pt>
+                <c:pt idx="53">
+                  <c:v>1.6142050040355124E-3</c:v>
+                </c:pt>
+                <c:pt idx="54">
+                  <c:v>8.0710250201775622E-4</c:v>
+                </c:pt>
+                <c:pt idx="55">
+                  <c:v>8.0710250201775622E-4</c:v>
+                </c:pt>
+                <c:pt idx="56">
+                  <c:v>8.0710250201775622E-4</c:v>
+                </c:pt>
+                <c:pt idx="57">
+                  <c:v>8.0710250201775622E-4</c:v>
+                </c:pt>
+                <c:pt idx="60">
+                  <c:v>8.0710250201775622E-4</c:v>
+                </c:pt>
+                <c:pt idx="62">
+                  <c:v>8.0710250201775622E-4</c:v>
+                </c:pt>
+                <c:pt idx="63">
+                  <c:v>8.0710250201775622E-4</c:v>
+                </c:pt>
+                <c:pt idx="67">
+                  <c:v>8.0710250201775622E-4</c:v>
+                </c:pt>
+              </c:numCache>
+            </c:numRef>
+          </c:val>
+          <c:smooth val="0"/>
+        </c:ser>
+        <c:ser>
+          <c:idx val="3"/>
+          <c:order val="3"/>
+          <c:tx>
+            <c:v>NASDAQ (New York)</c:v>
+          </c:tx>
+          <c:spPr>
+            <a:ln w="28575" cap="rnd">
+              <a:solidFill>
+                <a:schemeClr val="accent4"/>
+              </a:solidFill>
+              <a:round/>
+            </a:ln>
+            <a:effectLst/>
+          </c:spPr>
+          <c:marker>
+            <c:symbol val="none"/>
+          </c:marker>
+          <c:cat>
+            <c:numRef>
+              <c:f>chart!$G$4:$G$71</c:f>
+              <c:numCache>
+                <c:formatCode>General</c:formatCode>
+                <c:ptCount val="68"/>
+                <c:pt idx="0">
+                  <c:v>-4</c:v>
+                </c:pt>
+                <c:pt idx="8">
+                  <c:v>-3</c:v>
+                </c:pt>
+                <c:pt idx="16">
+                  <c:v>-2</c:v>
+                </c:pt>
+                <c:pt idx="24">
+                  <c:v>-1</c:v>
+                </c:pt>
+                <c:pt idx="32">
+                  <c:v>0</c:v>
+                </c:pt>
+                <c:pt idx="40">
+                  <c:v>1</c:v>
+                </c:pt>
+                <c:pt idx="48">
+                  <c:v>2</c:v>
+                </c:pt>
+                <c:pt idx="56">
+                  <c:v>3</c:v>
+                </c:pt>
+                <c:pt idx="63">
+                  <c:v>4</c:v>
+                </c:pt>
+              </c:numCache>
+            </c:numRef>
+          </c:cat>
+          <c:val>
+            <c:numRef>
+              <c:f>chart!$K$4:$K$71</c:f>
+              <c:numCache>
+                <c:formatCode>General</c:formatCode>
+                <c:ptCount val="68"/>
+                <c:pt idx="0">
+                  <c:v>7.9491255961844202E-4</c:v>
+                </c:pt>
+                <c:pt idx="6">
+                  <c:v>1.589825119236884E-3</c:v>
+                </c:pt>
+                <c:pt idx="7">
+                  <c:v>1.589825119236884E-3</c:v>
+                </c:pt>
+                <c:pt idx="9">
+                  <c:v>7.9491255961844202E-4</c:v>
+                </c:pt>
+                <c:pt idx="10">
+                  <c:v>7.9491255961844202E-4</c:v>
+                </c:pt>
+                <c:pt idx="11">
+                  <c:v>1.589825119236884E-3</c:v>
+                </c:pt>
+                <c:pt idx="12">
+                  <c:v>1.589825119236884E-3</c:v>
+                </c:pt>
+                <c:pt idx="13">
+                  <c:v>2.3847376788553257E-3</c:v>
+                </c:pt>
+                <c:pt idx="14">
+                  <c:v>1.589825119236884E-3</c:v>
+                </c:pt>
+                <c:pt idx="15">
+                  <c:v>3.9745627980922096E-3</c:v>
+                </c:pt>
+                <c:pt idx="16">
+                  <c:v>3.9745627980922096E-3</c:v>
+                </c:pt>
+                <c:pt idx="17">
+                  <c:v>5.5643879173290934E-3</c:v>
+                </c:pt>
+                <c:pt idx="18">
+                  <c:v>4.7694753577106515E-3</c:v>
+                </c:pt>
+                <c:pt idx="19">
+                  <c:v>7.9491255961844191E-3</c:v>
+                </c:pt>
+                <c:pt idx="20">
+                  <c:v>1.0333863275039745E-2</c:v>
+                </c:pt>
+                <c:pt idx="21">
+                  <c:v>8.744038155802861E-3</c:v>
+                </c:pt>
+                <c:pt idx="22">
+                  <c:v>1.0333863275039745E-2</c:v>
+                </c:pt>
+                <c:pt idx="23">
+                  <c:v>1.6693163751987282E-2</c:v>
+                </c:pt>
+                <c:pt idx="24">
+                  <c:v>2.2257551669316374E-2</c:v>
+                </c:pt>
+                <c:pt idx="25">
+                  <c:v>1.987281399046105E-2</c:v>
+                </c:pt>
+                <c:pt idx="26">
+                  <c:v>2.2257551669316374E-2</c:v>
+                </c:pt>
+                <c:pt idx="27">
+                  <c:v>2.7027027027027029E-2</c:v>
+                </c:pt>
+                <c:pt idx="28">
+                  <c:v>3.0206677265500796E-2</c:v>
+                </c:pt>
+                <c:pt idx="29">
+                  <c:v>3.5771065182829888E-2</c:v>
+                </c:pt>
+                <c:pt idx="30">
+                  <c:v>5.7233704292527825E-2</c:v>
+                </c:pt>
+                <c:pt idx="31">
+                  <c:v>6.2003179650238473E-2</c:v>
+                </c:pt>
+                <c:pt idx="32">
+                  <c:v>0.16454689984101747</c:v>
+                </c:pt>
+                <c:pt idx="33">
+                  <c:v>7.2337042925278219E-2</c:v>
+                </c:pt>
+                <c:pt idx="34">
+                  <c:v>6.8362480127186015E-2</c:v>
+                </c:pt>
+                <c:pt idx="35">
+                  <c:v>5.9618441971383149E-2</c:v>
+                </c:pt>
+                <c:pt idx="36">
+                  <c:v>6.518282988871224E-2</c:v>
+                </c:pt>
+                <c:pt idx="37">
+                  <c:v>4.2130365659777423E-2</c:v>
+                </c:pt>
+                <c:pt idx="38">
+                  <c:v>2.6232114467408585E-2</c:v>
+                </c:pt>
+                <c:pt idx="39">
+                  <c:v>3.1796502384737677E-2</c:v>
+                </c:pt>
+                <c:pt idx="40">
+                  <c:v>2.2257551669316374E-2</c:v>
+                </c:pt>
+                <c:pt idx="41">
+                  <c:v>1.6693163751987282E-2</c:v>
+                </c:pt>
+                <c:pt idx="42">
+                  <c:v>1.192368839427663E-2</c:v>
+                </c:pt>
+                <c:pt idx="43">
+                  <c:v>1.2718600953895072E-2</c:v>
+                </c:pt>
+                <c:pt idx="44">
+                  <c:v>8.744038155802861E-3</c:v>
+                </c:pt>
+                <c:pt idx="45">
+                  <c:v>3.9745627980922096E-3</c:v>
+                </c:pt>
+                <c:pt idx="46">
+                  <c:v>7.1542130365659781E-3</c:v>
+                </c:pt>
+                <c:pt idx="47">
+                  <c:v>5.5643879173290934E-3</c:v>
+                </c:pt>
+                <c:pt idx="48">
+                  <c:v>7.9491255961844202E-4</c:v>
+                </c:pt>
+                <c:pt idx="49">
+                  <c:v>2.3847376788553257E-3</c:v>
+                </c:pt>
+                <c:pt idx="50">
+                  <c:v>7.9491255961844202E-4</c:v>
+                </c:pt>
+                <c:pt idx="51">
+                  <c:v>3.9745627980922096E-3</c:v>
+                </c:pt>
+                <c:pt idx="52">
+                  <c:v>1.589825119236884E-3</c:v>
+                </c:pt>
+                <c:pt idx="53">
+                  <c:v>1.589825119236884E-3</c:v>
+                </c:pt>
+                <c:pt idx="54">
+                  <c:v>1.589825119236884E-3</c:v>
+                </c:pt>
+                <c:pt idx="56">
+                  <c:v>7.9491255961844202E-4</c:v>
+                </c:pt>
+                <c:pt idx="59">
+                  <c:v>1.589825119236884E-3</c:v>
+                </c:pt>
+                <c:pt idx="61">
+                  <c:v>7.9491255961844202E-4</c:v>
+                </c:pt>
+                <c:pt idx="62">
+                  <c:v>7.9491255961844202E-4</c:v>
+                </c:pt>
+                <c:pt idx="65">
+                  <c:v>7.9491255961844202E-4</c:v>
+                </c:pt>
+              </c:numCache>
+            </c:numRef>
+          </c:val>
+          <c:smooth val="0"/>
+        </c:ser>
+        <c:dLbls>
+          <c:showLegendKey val="0"/>
+          <c:showVal val="0"/>
+          <c:showCatName val="0"/>
+          <c:showSerName val="0"/>
+          <c:showPercent val="0"/>
+          <c:showBubbleSize val="0"/>
+        </c:dLbls>
+        <c:smooth val="0"/>
+        <c:axId val="302917808"/>
+        <c:axId val="302918368"/>
+      </c:lineChart>
+      <c:catAx>
+        <c:axId val="302917808"/>
+        <c:scaling>
+          <c:orientation val="minMax"/>
+        </c:scaling>
+        <c:delete val="0"/>
+        <c:axPos val="b"/>
+        <c:numFmt formatCode="General" sourceLinked="1"/>
+        <c:majorTickMark val="none"/>
+        <c:minorTickMark val="none"/>
+        <c:tickLblPos val="nextTo"/>
+        <c:spPr>
+          <a:noFill/>
+          <a:ln w="9525" cap="flat" cmpd="sng" algn="ctr">
+            <a:solidFill>
+              <a:schemeClr val="tx1">
+                <a:lumMod val="15000"/>
+                <a:lumOff val="85000"/>
+              </a:schemeClr>
+            </a:solidFill>
+            <a:round/>
+          </a:ln>
+          <a:effectLst/>
+        </c:spPr>
+        <c:txPr>
+          <a:bodyPr rot="-60000000" spcFirstLastPara="1" vertOverflow="ellipsis" vert="horz" wrap="square" anchor="ctr" anchorCtr="1"/>
+          <a:lstStyle/>
+          <a:p>
+            <a:pPr>
+              <a:defRPr sz="900" b="0" i="0" u="none" strike="noStrike" kern="1200" baseline="0">
+                <a:solidFill>
+                  <a:schemeClr val="tx1">
+                    <a:lumMod val="65000"/>
+                    <a:lumOff val="35000"/>
+                  </a:schemeClr>
+                </a:solidFill>
+                <a:latin typeface="+mn-lt"/>
+                <a:ea typeface="+mn-ea"/>
+                <a:cs typeface="+mn-cs"/>
+              </a:defRPr>
+            </a:pPr>
+            <a:endParaRPr lang="en-US"/>
+          </a:p>
+        </c:txPr>
+        <c:crossAx val="302918368"/>
+        <c:crosses val="autoZero"/>
+        <c:auto val="1"/>
+        <c:lblAlgn val="ctr"/>
+        <c:lblOffset val="100"/>
+        <c:noMultiLvlLbl val="0"/>
+      </c:catAx>
+      <c:valAx>
+        <c:axId val="302918368"/>
+        <c:scaling>
+          <c:orientation val="minMax"/>
+        </c:scaling>
+        <c:delete val="0"/>
+        <c:axPos val="l"/>
+        <c:majorGridlines>
+          <c:spPr>
+            <a:ln w="9525" cap="flat" cmpd="sng" algn="ctr">
+              <a:solidFill>
+                <a:schemeClr val="tx1">
+                  <a:lumMod val="15000"/>
+                  <a:lumOff val="85000"/>
+                </a:schemeClr>
+              </a:solidFill>
+              <a:round/>
+            </a:ln>
+            <a:effectLst/>
+          </c:spPr>
+        </c:majorGridlines>
+        <c:numFmt formatCode="General" sourceLinked="1"/>
+        <c:majorTickMark val="none"/>
+        <c:minorTickMark val="none"/>
+        <c:tickLblPos val="nextTo"/>
+        <c:spPr>
+          <a:noFill/>
+          <a:ln>
+            <a:noFill/>
+          </a:ln>
+          <a:effectLst/>
+        </c:spPr>
+        <c:txPr>
+          <a:bodyPr rot="-60000000" spcFirstLastPara="1" vertOverflow="ellipsis" vert="horz" wrap="square" anchor="ctr" anchorCtr="1"/>
+          <a:lstStyle/>
+          <a:p>
+            <a:pPr>
+              <a:defRPr sz="900" b="0" i="0" u="none" strike="noStrike" kern="1200" baseline="0">
+                <a:solidFill>
+                  <a:schemeClr val="tx1">
+                    <a:lumMod val="65000"/>
+                    <a:lumOff val="35000"/>
+                  </a:schemeClr>
+                </a:solidFill>
+                <a:latin typeface="+mn-lt"/>
+                <a:ea typeface="+mn-ea"/>
+                <a:cs typeface="+mn-cs"/>
+              </a:defRPr>
+            </a:pPr>
+            <a:endParaRPr lang="en-US"/>
+          </a:p>
+        </c:txPr>
+        <c:crossAx val="302917808"/>
         <c:crosses val="autoZero"/>
         <c:crossBetween val="between"/>
       </c:valAx>
@@ -1484,6 +2664,46 @@
 </file>
 
 <file path=ppt/charts/colors2.xml><?xml version="1.0" encoding="utf-8"?>
+<cs:colorStyle xmlns:cs="http://schemas.microsoft.com/office/drawing/2012/chartStyle" xmlns:a="http://schemas.openxmlformats.org/drawingml/2006/main" meth="cycle" id="10">
+  <a:schemeClr val="accent1"/>
+  <a:schemeClr val="accent2"/>
+  <a:schemeClr val="accent3"/>
+  <a:schemeClr val="accent4"/>
+  <a:schemeClr val="accent5"/>
+  <a:schemeClr val="accent6"/>
+  <cs:variation/>
+  <cs:variation>
+    <a:lumMod val="60000"/>
+  </cs:variation>
+  <cs:variation>
+    <a:lumMod val="80000"/>
+    <a:lumOff val="20000"/>
+  </cs:variation>
+  <cs:variation>
+    <a:lumMod val="80000"/>
+  </cs:variation>
+  <cs:variation>
+    <a:lumMod val="60000"/>
+    <a:lumOff val="40000"/>
+  </cs:variation>
+  <cs:variation>
+    <a:lumMod val="50000"/>
+  </cs:variation>
+  <cs:variation>
+    <a:lumMod val="70000"/>
+    <a:lumOff val="30000"/>
+  </cs:variation>
+  <cs:variation>
+    <a:lumMod val="70000"/>
+  </cs:variation>
+  <cs:variation>
+    <a:lumMod val="50000"/>
+    <a:lumOff val="50000"/>
+  </cs:variation>
+</cs:colorStyle>
+</file>
+
+<file path=ppt/charts/colors3.xml><?xml version="1.0" encoding="utf-8"?>
 <cs:colorStyle xmlns:cs="http://schemas.microsoft.com/office/drawing/2012/chartStyle" xmlns:a="http://schemas.openxmlformats.org/drawingml/2006/main" meth="cycle" id="10">
   <a:schemeClr val="accent1"/>
   <a:schemeClr val="accent2"/>
@@ -2593,6 +3813,522 @@
 </cs:chartStyle>
 </file>
 
+<file path=ppt/charts/style3.xml><?xml version="1.0" encoding="utf-8"?>
+<cs:chartStyle xmlns:cs="http://schemas.microsoft.com/office/drawing/2012/chartStyle" xmlns:a="http://schemas.openxmlformats.org/drawingml/2006/main" id="227">
+  <cs:axisTitle>
+    <cs:lnRef idx="0"/>
+    <cs:fillRef idx="0"/>
+    <cs:effectRef idx="0"/>
+    <cs:fontRef idx="minor">
+      <a:schemeClr val="tx1">
+        <a:lumMod val="65000"/>
+        <a:lumOff val="35000"/>
+      </a:schemeClr>
+    </cs:fontRef>
+    <cs:defRPr sz="1000" kern="1200"/>
+  </cs:axisTitle>
+  <cs:categoryAxis>
+    <cs:lnRef idx="0"/>
+    <cs:fillRef idx="0"/>
+    <cs:effectRef idx="0"/>
+    <cs:fontRef idx="minor">
+      <a:schemeClr val="tx1">
+        <a:lumMod val="65000"/>
+        <a:lumOff val="35000"/>
+      </a:schemeClr>
+    </cs:fontRef>
+    <cs:spPr>
+      <a:ln w="9525" cap="flat" cmpd="sng" algn="ctr">
+        <a:solidFill>
+          <a:schemeClr val="tx1">
+            <a:lumMod val="15000"/>
+            <a:lumOff val="85000"/>
+          </a:schemeClr>
+        </a:solidFill>
+        <a:round/>
+      </a:ln>
+    </cs:spPr>
+    <cs:defRPr sz="900" kern="1200"/>
+  </cs:categoryAxis>
+  <cs:chartArea mods="allowNoFillOverride allowNoLineOverride">
+    <cs:lnRef idx="0"/>
+    <cs:fillRef idx="0"/>
+    <cs:effectRef idx="0"/>
+    <cs:fontRef idx="minor">
+      <a:schemeClr val="tx1"/>
+    </cs:fontRef>
+    <cs:spPr>
+      <a:solidFill>
+        <a:schemeClr val="bg1"/>
+      </a:solidFill>
+      <a:ln w="9525" cap="flat" cmpd="sng" algn="ctr">
+        <a:solidFill>
+          <a:schemeClr val="tx1">
+            <a:lumMod val="15000"/>
+            <a:lumOff val="85000"/>
+          </a:schemeClr>
+        </a:solidFill>
+        <a:round/>
+      </a:ln>
+    </cs:spPr>
+    <cs:defRPr sz="1000" kern="1200"/>
+  </cs:chartArea>
+  <cs:dataLabel>
+    <cs:lnRef idx="0"/>
+    <cs:fillRef idx="0"/>
+    <cs:effectRef idx="0"/>
+    <cs:fontRef idx="minor">
+      <a:schemeClr val="tx1">
+        <a:lumMod val="75000"/>
+        <a:lumOff val="25000"/>
+      </a:schemeClr>
+    </cs:fontRef>
+    <cs:defRPr sz="900" kern="1200"/>
+  </cs:dataLabel>
+  <cs:dataLabelCallout>
+    <cs:lnRef idx="0"/>
+    <cs:fillRef idx="0"/>
+    <cs:effectRef idx="0"/>
+    <cs:fontRef idx="minor">
+      <a:schemeClr val="dk1">
+        <a:lumMod val="65000"/>
+        <a:lumOff val="35000"/>
+      </a:schemeClr>
+    </cs:fontRef>
+    <cs:spPr>
+      <a:solidFill>
+        <a:schemeClr val="lt1"/>
+      </a:solidFill>
+      <a:ln>
+        <a:solidFill>
+          <a:schemeClr val="dk1">
+            <a:lumMod val="25000"/>
+            <a:lumOff val="75000"/>
+          </a:schemeClr>
+        </a:solidFill>
+      </a:ln>
+    </cs:spPr>
+    <cs:defRPr sz="900" kern="1200"/>
+    <cs:bodyPr rot="0" spcFirstLastPara="1" vertOverflow="clip" horzOverflow="clip" vert="horz" wrap="square" lIns="36576" tIns="18288" rIns="36576" bIns="18288" anchor="ctr" anchorCtr="1">
+      <a:spAutoFit/>
+    </cs:bodyPr>
+  </cs:dataLabelCallout>
+  <cs:dataPoint>
+    <cs:lnRef idx="0"/>
+    <cs:fillRef idx="1">
+      <cs:styleClr val="auto"/>
+    </cs:fillRef>
+    <cs:effectRef idx="0"/>
+    <cs:fontRef idx="minor">
+      <a:schemeClr val="tx1"/>
+    </cs:fontRef>
+    <cs:spPr>
+      <a:solidFill>
+        <a:schemeClr val="phClr"/>
+      </a:solidFill>
+    </cs:spPr>
+  </cs:dataPoint>
+  <cs:dataPoint3D>
+    <cs:lnRef idx="0"/>
+    <cs:fillRef idx="1">
+      <cs:styleClr val="auto"/>
+    </cs:fillRef>
+    <cs:effectRef idx="0"/>
+    <cs:fontRef idx="minor">
+      <a:schemeClr val="tx1"/>
+    </cs:fontRef>
+    <cs:spPr>
+      <a:solidFill>
+        <a:schemeClr val="phClr"/>
+      </a:solidFill>
+    </cs:spPr>
+  </cs:dataPoint3D>
+  <cs:dataPointLine>
+    <cs:lnRef idx="0">
+      <cs:styleClr val="auto"/>
+    </cs:lnRef>
+    <cs:fillRef idx="1"/>
+    <cs:effectRef idx="0"/>
+    <cs:fontRef idx="minor">
+      <a:schemeClr val="tx1"/>
+    </cs:fontRef>
+    <cs:spPr>
+      <a:ln w="28575" cap="rnd">
+        <a:solidFill>
+          <a:schemeClr val="phClr"/>
+        </a:solidFill>
+        <a:round/>
+      </a:ln>
+    </cs:spPr>
+  </cs:dataPointLine>
+  <cs:dataPointMarker>
+    <cs:lnRef idx="0">
+      <cs:styleClr val="auto"/>
+    </cs:lnRef>
+    <cs:fillRef idx="1">
+      <cs:styleClr val="auto"/>
+    </cs:fillRef>
+    <cs:effectRef idx="0"/>
+    <cs:fontRef idx="minor">
+      <a:schemeClr val="tx1"/>
+    </cs:fontRef>
+    <cs:spPr>
+      <a:solidFill>
+        <a:schemeClr val="phClr"/>
+      </a:solidFill>
+      <a:ln w="9525">
+        <a:solidFill>
+          <a:schemeClr val="phClr"/>
+        </a:solidFill>
+      </a:ln>
+    </cs:spPr>
+  </cs:dataPointMarker>
+  <cs:dataPointMarkerLayout symbol="circle" size="5"/>
+  <cs:dataPointWireframe>
+    <cs:lnRef idx="0">
+      <cs:styleClr val="auto"/>
+    </cs:lnRef>
+    <cs:fillRef idx="1"/>
+    <cs:effectRef idx="0"/>
+    <cs:fontRef idx="minor">
+      <a:schemeClr val="tx1"/>
+    </cs:fontRef>
+    <cs:spPr>
+      <a:ln w="9525" cap="rnd">
+        <a:solidFill>
+          <a:schemeClr val="phClr"/>
+        </a:solidFill>
+        <a:round/>
+      </a:ln>
+    </cs:spPr>
+  </cs:dataPointWireframe>
+  <cs:dataTable>
+    <cs:lnRef idx="0"/>
+    <cs:fillRef idx="0"/>
+    <cs:effectRef idx="0"/>
+    <cs:fontRef idx="minor">
+      <a:schemeClr val="tx1">
+        <a:lumMod val="65000"/>
+        <a:lumOff val="35000"/>
+      </a:schemeClr>
+    </cs:fontRef>
+    <cs:spPr>
+      <a:noFill/>
+      <a:ln w="9525" cap="flat" cmpd="sng" algn="ctr">
+        <a:solidFill>
+          <a:schemeClr val="tx1">
+            <a:lumMod val="15000"/>
+            <a:lumOff val="85000"/>
+          </a:schemeClr>
+        </a:solidFill>
+        <a:round/>
+      </a:ln>
+    </cs:spPr>
+    <cs:defRPr sz="900" kern="1200"/>
+  </cs:dataTable>
+  <cs:downBar>
+    <cs:lnRef idx="0"/>
+    <cs:fillRef idx="0"/>
+    <cs:effectRef idx="0"/>
+    <cs:fontRef idx="minor">
+      <a:schemeClr val="dk1"/>
+    </cs:fontRef>
+    <cs:spPr>
+      <a:solidFill>
+        <a:schemeClr val="dk1">
+          <a:lumMod val="65000"/>
+          <a:lumOff val="35000"/>
+        </a:schemeClr>
+      </a:solidFill>
+      <a:ln w="9525">
+        <a:solidFill>
+          <a:schemeClr val="tx1">
+            <a:lumMod val="65000"/>
+            <a:lumOff val="35000"/>
+          </a:schemeClr>
+        </a:solidFill>
+      </a:ln>
+    </cs:spPr>
+  </cs:downBar>
+  <cs:dropLine>
+    <cs:lnRef idx="0"/>
+    <cs:fillRef idx="0"/>
+    <cs:effectRef idx="0"/>
+    <cs:fontRef idx="minor">
+      <a:schemeClr val="tx1"/>
+    </cs:fontRef>
+    <cs:spPr>
+      <a:ln w="9525" cap="flat" cmpd="sng" algn="ctr">
+        <a:solidFill>
+          <a:schemeClr val="tx1">
+            <a:lumMod val="35000"/>
+            <a:lumOff val="65000"/>
+          </a:schemeClr>
+        </a:solidFill>
+        <a:round/>
+      </a:ln>
+    </cs:spPr>
+  </cs:dropLine>
+  <cs:errorBar>
+    <cs:lnRef idx="0"/>
+    <cs:fillRef idx="0"/>
+    <cs:effectRef idx="0"/>
+    <cs:fontRef idx="minor">
+      <a:schemeClr val="tx1"/>
+    </cs:fontRef>
+    <cs:spPr>
+      <a:ln w="9525" cap="flat" cmpd="sng" algn="ctr">
+        <a:solidFill>
+          <a:schemeClr val="tx1">
+            <a:lumMod val="65000"/>
+            <a:lumOff val="35000"/>
+          </a:schemeClr>
+        </a:solidFill>
+        <a:round/>
+      </a:ln>
+    </cs:spPr>
+  </cs:errorBar>
+  <cs:floor>
+    <cs:lnRef idx="0"/>
+    <cs:fillRef idx="0"/>
+    <cs:effectRef idx="0"/>
+    <cs:fontRef idx="minor">
+      <a:schemeClr val="tx1"/>
+    </cs:fontRef>
+    <cs:spPr>
+      <a:noFill/>
+      <a:ln>
+        <a:noFill/>
+      </a:ln>
+    </cs:spPr>
+  </cs:floor>
+  <cs:gridlineMajor>
+    <cs:lnRef idx="0"/>
+    <cs:fillRef idx="0"/>
+    <cs:effectRef idx="0"/>
+    <cs:fontRef idx="minor">
+      <a:schemeClr val="tx1"/>
+    </cs:fontRef>
+    <cs:spPr>
+      <a:ln w="9525" cap="flat" cmpd="sng" algn="ctr">
+        <a:solidFill>
+          <a:schemeClr val="tx1">
+            <a:lumMod val="15000"/>
+            <a:lumOff val="85000"/>
+          </a:schemeClr>
+        </a:solidFill>
+        <a:round/>
+      </a:ln>
+    </cs:spPr>
+  </cs:gridlineMajor>
+  <cs:gridlineMinor>
+    <cs:lnRef idx="0"/>
+    <cs:fillRef idx="0"/>
+    <cs:effectRef idx="0"/>
+    <cs:fontRef idx="minor">
+      <a:schemeClr val="tx1"/>
+    </cs:fontRef>
+    <cs:spPr>
+      <a:ln w="9525" cap="flat" cmpd="sng" algn="ctr">
+        <a:solidFill>
+          <a:schemeClr val="tx1">
+            <a:lumMod val="5000"/>
+            <a:lumOff val="95000"/>
+          </a:schemeClr>
+        </a:solidFill>
+        <a:round/>
+      </a:ln>
+    </cs:spPr>
+  </cs:gridlineMinor>
+  <cs:hiLoLine>
+    <cs:lnRef idx="0"/>
+    <cs:fillRef idx="0"/>
+    <cs:effectRef idx="0"/>
+    <cs:fontRef idx="minor">
+      <a:schemeClr val="tx1"/>
+    </cs:fontRef>
+    <cs:spPr>
+      <a:ln w="9525" cap="flat" cmpd="sng" algn="ctr">
+        <a:solidFill>
+          <a:schemeClr val="tx1">
+            <a:lumMod val="75000"/>
+            <a:lumOff val="25000"/>
+          </a:schemeClr>
+        </a:solidFill>
+        <a:round/>
+      </a:ln>
+    </cs:spPr>
+  </cs:hiLoLine>
+  <cs:leaderLine>
+    <cs:lnRef idx="0"/>
+    <cs:fillRef idx="0"/>
+    <cs:effectRef idx="0"/>
+    <cs:fontRef idx="minor">
+      <a:schemeClr val="tx1"/>
+    </cs:fontRef>
+    <cs:spPr>
+      <a:ln w="9525" cap="flat" cmpd="sng" algn="ctr">
+        <a:solidFill>
+          <a:schemeClr val="tx1">
+            <a:lumMod val="35000"/>
+            <a:lumOff val="65000"/>
+          </a:schemeClr>
+        </a:solidFill>
+        <a:round/>
+      </a:ln>
+    </cs:spPr>
+  </cs:leaderLine>
+  <cs:legend>
+    <cs:lnRef idx="0"/>
+    <cs:fillRef idx="0"/>
+    <cs:effectRef idx="0"/>
+    <cs:fontRef idx="minor">
+      <a:schemeClr val="tx1">
+        <a:lumMod val="65000"/>
+        <a:lumOff val="35000"/>
+      </a:schemeClr>
+    </cs:fontRef>
+    <cs:defRPr sz="900" kern="1200"/>
+  </cs:legend>
+  <cs:plotArea mods="allowNoFillOverride allowNoLineOverride">
+    <cs:lnRef idx="0"/>
+    <cs:fillRef idx="0"/>
+    <cs:effectRef idx="0"/>
+    <cs:fontRef idx="minor">
+      <a:schemeClr val="tx1"/>
+    </cs:fontRef>
+  </cs:plotArea>
+  <cs:plotArea3D mods="allowNoFillOverride allowNoLineOverride">
+    <cs:lnRef idx="0"/>
+    <cs:fillRef idx="0"/>
+    <cs:effectRef idx="0"/>
+    <cs:fontRef idx="minor">
+      <a:schemeClr val="tx1"/>
+    </cs:fontRef>
+  </cs:plotArea3D>
+  <cs:seriesAxis>
+    <cs:lnRef idx="0"/>
+    <cs:fillRef idx="0"/>
+    <cs:effectRef idx="0"/>
+    <cs:fontRef idx="minor">
+      <a:schemeClr val="tx1">
+        <a:lumMod val="65000"/>
+        <a:lumOff val="35000"/>
+      </a:schemeClr>
+    </cs:fontRef>
+    <cs:defRPr sz="900" kern="1200"/>
+  </cs:seriesAxis>
+  <cs:seriesLine>
+    <cs:lnRef idx="0"/>
+    <cs:fillRef idx="0"/>
+    <cs:effectRef idx="0"/>
+    <cs:fontRef idx="minor">
+      <a:schemeClr val="tx1"/>
+    </cs:fontRef>
+    <cs:spPr>
+      <a:ln w="9525" cap="flat" cmpd="sng" algn="ctr">
+        <a:solidFill>
+          <a:schemeClr val="tx1">
+            <a:lumMod val="35000"/>
+            <a:lumOff val="65000"/>
+          </a:schemeClr>
+        </a:solidFill>
+        <a:round/>
+      </a:ln>
+    </cs:spPr>
+  </cs:seriesLine>
+  <cs:title>
+    <cs:lnRef idx="0"/>
+    <cs:fillRef idx="0"/>
+    <cs:effectRef idx="0"/>
+    <cs:fontRef idx="minor">
+      <a:schemeClr val="tx1">
+        <a:lumMod val="65000"/>
+        <a:lumOff val="35000"/>
+      </a:schemeClr>
+    </cs:fontRef>
+    <cs:defRPr sz="1400" b="0" kern="1200" spc="0" baseline="0"/>
+  </cs:title>
+  <cs:trendline>
+    <cs:lnRef idx="0">
+      <cs:styleClr val="auto"/>
+    </cs:lnRef>
+    <cs:fillRef idx="0"/>
+    <cs:effectRef idx="0"/>
+    <cs:fontRef idx="minor">
+      <a:schemeClr val="tx1"/>
+    </cs:fontRef>
+    <cs:spPr>
+      <a:ln w="19050" cap="rnd">
+        <a:solidFill>
+          <a:schemeClr val="phClr"/>
+        </a:solidFill>
+        <a:prstDash val="sysDot"/>
+      </a:ln>
+    </cs:spPr>
+  </cs:trendline>
+  <cs:trendlineLabel>
+    <cs:lnRef idx="0"/>
+    <cs:fillRef idx="0"/>
+    <cs:effectRef idx="0"/>
+    <cs:fontRef idx="minor">
+      <a:schemeClr val="tx1">
+        <a:lumMod val="65000"/>
+        <a:lumOff val="35000"/>
+      </a:schemeClr>
+    </cs:fontRef>
+    <cs:defRPr sz="900" kern="1200"/>
+  </cs:trendlineLabel>
+  <cs:upBar>
+    <cs:lnRef idx="0"/>
+    <cs:fillRef idx="0"/>
+    <cs:effectRef idx="0"/>
+    <cs:fontRef idx="minor">
+      <a:schemeClr val="dk1"/>
+    </cs:fontRef>
+    <cs:spPr>
+      <a:solidFill>
+        <a:schemeClr val="lt1"/>
+      </a:solidFill>
+      <a:ln w="9525">
+        <a:solidFill>
+          <a:schemeClr val="tx1">
+            <a:lumMod val="15000"/>
+            <a:lumOff val="85000"/>
+          </a:schemeClr>
+        </a:solidFill>
+      </a:ln>
+    </cs:spPr>
+  </cs:upBar>
+  <cs:valueAxis>
+    <cs:lnRef idx="0"/>
+    <cs:fillRef idx="0"/>
+    <cs:effectRef idx="0"/>
+    <cs:fontRef idx="minor">
+      <a:schemeClr val="tx1">
+        <a:lumMod val="65000"/>
+        <a:lumOff val="35000"/>
+      </a:schemeClr>
+    </cs:fontRef>
+    <cs:defRPr sz="900" kern="1200"/>
+  </cs:valueAxis>
+  <cs:wall>
+    <cs:lnRef idx="0"/>
+    <cs:fillRef idx="0"/>
+    <cs:effectRef idx="0"/>
+    <cs:fontRef idx="minor">
+      <a:schemeClr val="tx1"/>
+    </cs:fontRef>
+    <cs:spPr>
+      <a:noFill/>
+      <a:ln>
+        <a:noFill/>
+      </a:ln>
+    </cs:spPr>
+  </cs:wall>
+</cs:chartStyle>
+</file>
+
 <file path=ppt/slideLayouts/slideLayout1.xml><?xml version="1.0" encoding="utf-8"?>
 <p:sldLayout xmlns:a="http://schemas.openxmlformats.org/drawingml/2006/main" xmlns:r="http://schemas.openxmlformats.org/officeDocument/2006/relationships" xmlns:p="http://schemas.openxmlformats.org/presentationml/2006/main" type="title" preserve="1">
   <p:cSld name="Title Slide">
@@ -2724,7 +4460,7 @@
           <a:p>
             <a:fld id="{218E6659-4E52-41AA-BAE0-215C54DE2D3C}" type="datetimeFigureOut">
               <a:rPr lang="en-US" smtClean="0"/>
-              <a:t>3/7/2015</a:t>
+              <a:t>3/8/2015</a:t>
             </a:fld>
             <a:endParaRPr lang="en-US"/>
           </a:p>
@@ -2894,7 +4630,7 @@
           <a:p>
             <a:fld id="{218E6659-4E52-41AA-BAE0-215C54DE2D3C}" type="datetimeFigureOut">
               <a:rPr lang="en-US" smtClean="0"/>
-              <a:t>3/7/2015</a:t>
+              <a:t>3/8/2015</a:t>
             </a:fld>
             <a:endParaRPr lang="en-US"/>
           </a:p>
@@ -3074,7 +4810,7 @@
           <a:p>
             <a:fld id="{218E6659-4E52-41AA-BAE0-215C54DE2D3C}" type="datetimeFigureOut">
               <a:rPr lang="en-US" smtClean="0"/>
-              <a:t>3/7/2015</a:t>
+              <a:t>3/8/2015</a:t>
             </a:fld>
             <a:endParaRPr lang="en-US"/>
           </a:p>
@@ -3244,7 +4980,7 @@
           <a:p>
             <a:fld id="{218E6659-4E52-41AA-BAE0-215C54DE2D3C}" type="datetimeFigureOut">
               <a:rPr lang="en-US" smtClean="0"/>
-              <a:t>3/7/2015</a:t>
+              <a:t>3/8/2015</a:t>
             </a:fld>
             <a:endParaRPr lang="en-US"/>
           </a:p>
@@ -3490,7 +5226,7 @@
           <a:p>
             <a:fld id="{218E6659-4E52-41AA-BAE0-215C54DE2D3C}" type="datetimeFigureOut">
               <a:rPr lang="en-US" smtClean="0"/>
-              <a:t>3/7/2015</a:t>
+              <a:t>3/8/2015</a:t>
             </a:fld>
             <a:endParaRPr lang="en-US"/>
           </a:p>
@@ -3722,7 +5458,7 @@
           <a:p>
             <a:fld id="{218E6659-4E52-41AA-BAE0-215C54DE2D3C}" type="datetimeFigureOut">
               <a:rPr lang="en-US" smtClean="0"/>
-              <a:t>3/7/2015</a:t>
+              <a:t>3/8/2015</a:t>
             </a:fld>
             <a:endParaRPr lang="en-US"/>
           </a:p>
@@ -4089,7 +5825,7 @@
           <a:p>
             <a:fld id="{218E6659-4E52-41AA-BAE0-215C54DE2D3C}" type="datetimeFigureOut">
               <a:rPr lang="en-US" smtClean="0"/>
-              <a:t>3/7/2015</a:t>
+              <a:t>3/8/2015</a:t>
             </a:fld>
             <a:endParaRPr lang="en-US"/>
           </a:p>
@@ -4207,7 +5943,7 @@
           <a:p>
             <a:fld id="{218E6659-4E52-41AA-BAE0-215C54DE2D3C}" type="datetimeFigureOut">
               <a:rPr lang="en-US" smtClean="0"/>
-              <a:t>3/7/2015</a:t>
+              <a:t>3/8/2015</a:t>
             </a:fld>
             <a:endParaRPr lang="en-US"/>
           </a:p>
@@ -4302,7 +6038,7 @@
           <a:p>
             <a:fld id="{218E6659-4E52-41AA-BAE0-215C54DE2D3C}" type="datetimeFigureOut">
               <a:rPr lang="en-US" smtClean="0"/>
-              <a:t>3/7/2015</a:t>
+              <a:t>3/8/2015</a:t>
             </a:fld>
             <a:endParaRPr lang="en-US"/>
           </a:p>
@@ -4579,7 +6315,7 @@
           <a:p>
             <a:fld id="{218E6659-4E52-41AA-BAE0-215C54DE2D3C}" type="datetimeFigureOut">
               <a:rPr lang="en-US" smtClean="0"/>
-              <a:t>3/7/2015</a:t>
+              <a:t>3/8/2015</a:t>
             </a:fld>
             <a:endParaRPr lang="en-US"/>
           </a:p>
@@ -4832,7 +6568,7 @@
           <a:p>
             <a:fld id="{218E6659-4E52-41AA-BAE0-215C54DE2D3C}" type="datetimeFigureOut">
               <a:rPr lang="en-US" smtClean="0"/>
-              <a:t>3/7/2015</a:t>
+              <a:t>3/8/2015</a:t>
             </a:fld>
             <a:endParaRPr lang="en-US"/>
           </a:p>
@@ -5045,7 +6781,7 @@
           <a:p>
             <a:fld id="{218E6659-4E52-41AA-BAE0-215C54DE2D3C}" type="datetimeFigureOut">
               <a:rPr lang="en-US" smtClean="0"/>
-              <a:t>3/7/2015</a:t>
+              <a:t>3/8/2015</a:t>
             </a:fld>
             <a:endParaRPr lang="en-US"/>
           </a:p>
@@ -5590,15 +7326,7 @@
             <a:pPr lvl="2"/>
             <a:r>
               <a:rPr lang="en-US" dirty="0" smtClean="0"/>
-              <a:t>Surprise </a:t>
-            </a:r>
-            <a:r>
-              <a:rPr lang="en-US" dirty="0" smtClean="0"/>
-              <a:t>(aka Entropy</a:t>
-            </a:r>
-            <a:r>
-              <a:rPr lang="en-US" dirty="0" smtClean="0"/>
-              <a:t>, Uncertainty)</a:t>
+              <a:t>Surprise (aka Entropy, Uncertainty)</a:t>
             </a:r>
           </a:p>
           <a:p>
@@ -5968,11 +7696,7 @@
             <a:pPr lvl="1"/>
             <a:r>
               <a:rPr lang="en-US" dirty="0" smtClean="0"/>
-              <a:t>Neutral </a:t>
-            </a:r>
-            <a:r>
-              <a:rPr lang="en-US" dirty="0" smtClean="0"/>
-              <a:t>is defined as within 1 standard deviation</a:t>
+              <a:t>Neutral is defined as within 1 standard deviation</a:t>
             </a:r>
           </a:p>
           <a:p>
@@ -7045,11 +8769,7 @@
             </a:br>
             <a:r>
               <a:rPr lang="en-US" sz="3600" dirty="0" smtClean="0"/>
-              <a:t>Long </a:t>
-            </a:r>
-            <a:r>
-              <a:rPr lang="en-US" sz="3600" dirty="0" smtClean="0"/>
-              <a:t>Term Changes in P(</a:t>
+              <a:t>Long Term Changes in P(</a:t>
             </a:r>
             <a:r>
               <a:rPr lang="en-US" sz="3600" dirty="0" err="1" smtClean="0"/>
@@ -7220,11 +8940,7 @@
           <a:p>
             <a:r>
               <a:rPr lang="en-US" dirty="0" smtClean="0"/>
-              <a:t>Marked Shift over Time of </a:t>
-            </a:r>
-            <a:r>
-              <a:rPr lang="en-US" dirty="0" smtClean="0"/>
-              <a:t>P(</a:t>
+              <a:t>Marked Shift over Time of P(</a:t>
             </a:r>
             <a:r>
               <a:rPr lang="en-US" dirty="0" err="1" smtClean="0"/>
@@ -7267,11 +8983,7 @@
             <a:pPr lvl="1"/>
             <a:r>
               <a:rPr lang="en-US" dirty="0" smtClean="0"/>
-              <a:t>from 5% in 1997 to 19% in </a:t>
-            </a:r>
-            <a:r>
-              <a:rPr lang="en-US" dirty="0" smtClean="0"/>
-              <a:t>2011</a:t>
+              <a:t>from 5% in 1997 to 19% in 2011 – random walk is more saw-toothed</a:t>
             </a:r>
           </a:p>
           <a:p>
@@ -7461,6 +9173,229 @@
   <p:clrMapOvr>
     <a:masterClrMapping/>
   </p:clrMapOvr>
+  <p:timing>
+    <p:tnLst>
+      <p:par>
+        <p:cTn id="1" dur="indefinite" restart="never" nodeType="tmRoot"/>
+      </p:par>
+    </p:tnLst>
+  </p:timing>
+</p:sld>
+</file>
+
+<file path=ppt/slides/slide8.xml><?xml version="1.0" encoding="utf-8"?>
+<p:sld xmlns:a="http://schemas.openxmlformats.org/drawingml/2006/main" xmlns:r="http://schemas.openxmlformats.org/officeDocument/2006/relationships" xmlns:p="http://schemas.openxmlformats.org/presentationml/2006/main">
+  <p:cSld>
+    <p:spTree>
+      <p:nvGrpSpPr>
+        <p:cNvPr id="1" name=""/>
+        <p:cNvGrpSpPr/>
+        <p:nvPr/>
+      </p:nvGrpSpPr>
+      <p:grpSpPr>
+        <a:xfrm>
+          <a:off x="0" y="0"/>
+          <a:ext cx="0" cy="0"/>
+          <a:chOff x="0" y="0"/>
+          <a:chExt cx="0" cy="0"/>
+        </a:xfrm>
+      </p:grpSpPr>
+      <p:sp>
+        <p:nvSpPr>
+          <p:cNvPr id="2" name="Title 1"/>
+          <p:cNvSpPr>
+            <a:spLocks noGrp="1"/>
+          </p:cNvSpPr>
+          <p:nvPr>
+            <p:ph type="title"/>
+          </p:nvPr>
+        </p:nvSpPr>
+        <p:spPr>
+          <a:xfrm>
+            <a:off x="838200" y="38545"/>
+            <a:ext cx="10515600" cy="1325563"/>
+          </a:xfrm>
+        </p:spPr>
+        <p:txBody>
+          <a:bodyPr/>
+          <a:lstStyle/>
+          <a:p>
+            <a:r>
+              <a:rPr lang="en-US" dirty="0" smtClean="0"/>
+              <a:t>Representing Outcome Distributions</a:t>
+            </a:r>
+            <a:endParaRPr lang="en-US" dirty="0"/>
+          </a:p>
+        </p:txBody>
+      </p:sp>
+      <p:sp>
+        <p:nvSpPr>
+          <p:cNvPr id="3" name="Content Placeholder 2"/>
+          <p:cNvSpPr>
+            <a:spLocks noGrp="1"/>
+          </p:cNvSpPr>
+          <p:nvPr>
+            <p:ph idx="1"/>
+          </p:nvPr>
+        </p:nvSpPr>
+        <p:spPr>
+          <a:xfrm>
+            <a:off x="838200" y="1286768"/>
+            <a:ext cx="10515600" cy="4351338"/>
+          </a:xfrm>
+        </p:spPr>
+        <p:txBody>
+          <a:bodyPr/>
+          <a:lstStyle/>
+          <a:p>
+            <a:r>
+              <a:rPr lang="en-US" dirty="0" smtClean="0"/>
+              <a:t>Daily activity must be summarized into discrete outcomes for comparison purposes, this choice has a big impact on analysis</a:t>
+            </a:r>
+          </a:p>
+          <a:p>
+            <a:r>
+              <a:rPr lang="en-US" dirty="0" smtClean="0"/>
+              <a:t>The fringe activity is the most interesting, but the rarity of occurrence makes our analysis of that activity less meaningful</a:t>
+            </a:r>
+          </a:p>
+          <a:p>
+            <a:r>
+              <a:rPr lang="en-US" dirty="0" smtClean="0"/>
+              <a:t> Example: Four major world indices, 2010-2014, summarized at 1/8 </a:t>
+            </a:r>
+            <a:r>
+              <a:rPr lang="el-GR" dirty="0"/>
+              <a:t>σ</a:t>
+            </a:r>
+            <a:r>
+              <a:rPr lang="en-US" dirty="0" smtClean="0"/>
+              <a:t>, show a range of different distributions (low outliers cut for display)</a:t>
+            </a:r>
+            <a:endParaRPr lang="en-US" dirty="0"/>
+          </a:p>
+        </p:txBody>
+      </p:sp>
+      <p:graphicFrame>
+        <p:nvGraphicFramePr>
+          <p:cNvPr id="5" name="Chart 4"/>
+          <p:cNvGraphicFramePr>
+            <a:graphicFrameLocks/>
+          </p:cNvGraphicFramePr>
+          <p:nvPr>
+            <p:extLst>
+              <p:ext uri="{D42A27DB-BD31-4B8C-83A1-F6EECF244321}">
+                <p14:modId xmlns:p14="http://schemas.microsoft.com/office/powerpoint/2010/main" val="3972829402"/>
+              </p:ext>
+            </p:extLst>
+          </p:nvPr>
+        </p:nvGraphicFramePr>
+        <p:xfrm>
+          <a:off x="522514" y="4114800"/>
+          <a:ext cx="11168743" cy="2743200"/>
+        </p:xfrm>
+        <a:graphic>
+          <a:graphicData uri="http://schemas.openxmlformats.org/drawingml/2006/chart">
+            <c:chart xmlns:c="http://schemas.openxmlformats.org/drawingml/2006/chart" xmlns:r="http://schemas.openxmlformats.org/officeDocument/2006/relationships" r:id="rId2"/>
+          </a:graphicData>
+        </a:graphic>
+      </p:graphicFrame>
+    </p:spTree>
+    <p:extLst>
+      <p:ext uri="{BB962C8B-B14F-4D97-AF65-F5344CB8AC3E}">
+        <p14:creationId xmlns:p14="http://schemas.microsoft.com/office/powerpoint/2010/main" val="1024432874"/>
+      </p:ext>
+    </p:extLst>
+  </p:cSld>
+  <p:clrMapOvr>
+    <a:masterClrMapping/>
+  </p:clrMapOvr>
+  <p:timing>
+    <p:tnLst>
+      <p:par>
+        <p:cTn id="1" dur="indefinite" restart="never" nodeType="tmRoot"/>
+      </p:par>
+    </p:tnLst>
+  </p:timing>
+</p:sld>
+</file>
+
+<file path=ppt/slides/slide9.xml><?xml version="1.0" encoding="utf-8"?>
+<p:sld xmlns:a="http://schemas.openxmlformats.org/drawingml/2006/main" xmlns:r="http://schemas.openxmlformats.org/officeDocument/2006/relationships" xmlns:p="http://schemas.openxmlformats.org/presentationml/2006/main">
+  <p:cSld>
+    <p:spTree>
+      <p:nvGrpSpPr>
+        <p:cNvPr id="1" name=""/>
+        <p:cNvGrpSpPr/>
+        <p:nvPr/>
+      </p:nvGrpSpPr>
+      <p:grpSpPr>
+        <a:xfrm>
+          <a:off x="0" y="0"/>
+          <a:ext cx="0" cy="0"/>
+          <a:chOff x="0" y="0"/>
+          <a:chExt cx="0" cy="0"/>
+        </a:xfrm>
+      </p:grpSpPr>
+      <p:sp>
+        <p:nvSpPr>
+          <p:cNvPr id="2" name="Title 1"/>
+          <p:cNvSpPr>
+            <a:spLocks noGrp="1"/>
+          </p:cNvSpPr>
+          <p:nvPr>
+            <p:ph type="title"/>
+          </p:nvPr>
+        </p:nvSpPr>
+        <p:spPr/>
+        <p:txBody>
+          <a:bodyPr/>
+          <a:lstStyle/>
+          <a:p>
+            <a:r>
+              <a:rPr lang="en-US" dirty="0" smtClean="0"/>
+              <a:t>Opportunities for Additional Work</a:t>
+            </a:r>
+            <a:endParaRPr lang="en-US" dirty="0"/>
+          </a:p>
+        </p:txBody>
+      </p:sp>
+      <p:sp>
+        <p:nvSpPr>
+          <p:cNvPr id="3" name="Content Placeholder 2"/>
+          <p:cNvSpPr>
+            <a:spLocks noGrp="1"/>
+          </p:cNvSpPr>
+          <p:nvPr>
+            <p:ph idx="1"/>
+          </p:nvPr>
+        </p:nvSpPr>
+        <p:spPr/>
+        <p:txBody>
+          <a:bodyPr/>
+          <a:lstStyle/>
+          <a:p>
+            <a:endParaRPr lang="en-US"/>
+          </a:p>
+        </p:txBody>
+      </p:sp>
+    </p:spTree>
+    <p:extLst>
+      <p:ext uri="{BB962C8B-B14F-4D97-AF65-F5344CB8AC3E}">
+        <p14:creationId xmlns:p14="http://schemas.microsoft.com/office/powerpoint/2010/main" val="2657590513"/>
+      </p:ext>
+    </p:extLst>
+  </p:cSld>
+  <p:clrMapOvr>
+    <a:masterClrMapping/>
+  </p:clrMapOvr>
+  <p:timing>
+    <p:tnLst>
+      <p:par>
+        <p:cTn id="1" dur="indefinite" restart="never" nodeType="tmRoot"/>
+      </p:par>
+    </p:tnLst>
+  </p:timing>
 </p:sld>
 </file>
 

</xml_diff>

<commit_message>
added conditional surprise calculations
blank slides as placeholders for conditional surprise and distance
</commit_message>
<xml_diff>
--- a/slides/hackathon.pptx
+++ b/slides/hackathon.pptx
@@ -13,7 +13,10 @@
     <p:sldId id="263" r:id="rId7"/>
     <p:sldId id="264" r:id="rId8"/>
     <p:sldId id="265" r:id="rId9"/>
-    <p:sldId id="266" r:id="rId10"/>
+    <p:sldId id="267" r:id="rId10"/>
+    <p:sldId id="268" r:id="rId11"/>
+    <p:sldId id="269" r:id="rId12"/>
+    <p:sldId id="266" r:id="rId13"/>
   </p:sldIdLst>
   <p:sldSz cx="12192000" cy="6858000"/>
   <p:notesSz cx="6858000" cy="9144000"/>
@@ -160,7 +163,6 @@
           </a:p>
         </c:rich>
       </c:tx>
-      <c:layout/>
       <c:overlay val="0"/>
       <c:spPr>
         <a:noFill/>
@@ -411,12 +413,12 @@
         </c:dLbls>
         <c:gapWidth val="65"/>
         <c:shape val="box"/>
-        <c:axId val="192617936"/>
-        <c:axId val="192618496"/>
+        <c:axId val="263834512"/>
+        <c:axId val="263835072"/>
         <c:axId val="0"/>
       </c:bar3DChart>
       <c:catAx>
-        <c:axId val="192617936"/>
+        <c:axId val="263834512"/>
         <c:scaling>
           <c:orientation val="minMax"/>
         </c:scaling>
@@ -459,7 +461,7 @@
             <a:endParaRPr lang="en-US"/>
           </a:p>
         </c:txPr>
-        <c:crossAx val="192618496"/>
+        <c:crossAx val="263835072"/>
         <c:crosses val="autoZero"/>
         <c:auto val="1"/>
         <c:lblAlgn val="ctr"/>
@@ -467,7 +469,7 @@
         <c:noMultiLvlLbl val="0"/>
       </c:catAx>
       <c:valAx>
-        <c:axId val="192618496"/>
+        <c:axId val="263835072"/>
         <c:scaling>
           <c:orientation val="minMax"/>
         </c:scaling>
@@ -518,7 +520,7 @@
             <a:endParaRPr lang="en-US"/>
           </a:p>
         </c:txPr>
-        <c:crossAx val="192617936"/>
+        <c:crossAx val="263834512"/>
         <c:crosses val="autoZero"/>
         <c:crossBetween val="between"/>
       </c:valAx>
@@ -532,7 +534,6 @@
     </c:plotArea>
     <c:legend>
       <c:legendPos val="b"/>
-      <c:layout/>
       <c:overlay val="0"/>
       <c:spPr>
         <a:solidFill>
@@ -658,7 +659,6 @@
           </a:p>
         </c:rich>
       </c:tx>
-      <c:layout/>
       <c:overlay val="0"/>
       <c:spPr>
         <a:noFill/>
@@ -1271,11 +1271,11 @@
           <c:showBubbleSize val="0"/>
         </c:dLbls>
         <c:smooth val="0"/>
-        <c:axId val="192621856"/>
-        <c:axId val="192622416"/>
+        <c:axId val="263838432"/>
+        <c:axId val="264876736"/>
       </c:lineChart>
       <c:catAx>
-        <c:axId val="192621856"/>
+        <c:axId val="263838432"/>
         <c:scaling>
           <c:orientation val="minMax"/>
         </c:scaling>
@@ -1318,7 +1318,7 @@
             <a:endParaRPr lang="en-US"/>
           </a:p>
         </c:txPr>
-        <c:crossAx val="192622416"/>
+        <c:crossAx val="264876736"/>
         <c:crosses val="autoZero"/>
         <c:auto val="1"/>
         <c:lblAlgn val="ctr"/>
@@ -1326,7 +1326,7 @@
         <c:noMultiLvlLbl val="0"/>
       </c:catAx>
       <c:valAx>
-        <c:axId val="192622416"/>
+        <c:axId val="264876736"/>
         <c:scaling>
           <c:orientation val="minMax"/>
         </c:scaling>
@@ -1377,7 +1377,7 @@
             <a:endParaRPr lang="en-US"/>
           </a:p>
         </c:txPr>
-        <c:crossAx val="192621856"/>
+        <c:crossAx val="263838432"/>
         <c:crosses val="autoZero"/>
         <c:crossBetween val="between"/>
       </c:valAx>
@@ -1391,7 +1391,6 @@
     </c:plotArea>
     <c:legend>
       <c:legendPos val="b"/>
-      <c:layout/>
       <c:overlay val="0"/>
       <c:spPr>
         <a:noFill/>
@@ -2449,11 +2448,11 @@
           <c:showBubbleSize val="0"/>
         </c:dLbls>
         <c:smooth val="0"/>
-        <c:axId val="302917808"/>
-        <c:axId val="302918368"/>
+        <c:axId val="265589600"/>
+        <c:axId val="265590160"/>
       </c:lineChart>
       <c:catAx>
-        <c:axId val="302917808"/>
+        <c:axId val="265589600"/>
         <c:scaling>
           <c:orientation val="minMax"/>
         </c:scaling>
@@ -2496,7 +2495,7 @@
             <a:endParaRPr lang="en-US"/>
           </a:p>
         </c:txPr>
-        <c:crossAx val="302918368"/>
+        <c:crossAx val="265590160"/>
         <c:crosses val="autoZero"/>
         <c:auto val="1"/>
         <c:lblAlgn val="ctr"/>
@@ -2504,7 +2503,7 @@
         <c:noMultiLvlLbl val="0"/>
       </c:catAx>
       <c:valAx>
-        <c:axId val="302918368"/>
+        <c:axId val="265590160"/>
         <c:scaling>
           <c:orientation val="minMax"/>
         </c:scaling>
@@ -2555,7 +2554,7 @@
             <a:endParaRPr lang="en-US"/>
           </a:p>
         </c:txPr>
-        <c:crossAx val="302917808"/>
+        <c:crossAx val="265589600"/>
         <c:crosses val="autoZero"/>
         <c:crossBetween val="between"/>
       </c:valAx>
@@ -7248,6 +7247,270 @@
 </p:sld>
 </file>
 
+<file path=ppt/slides/slide10.xml><?xml version="1.0" encoding="utf-8"?>
+<p:sld xmlns:a="http://schemas.openxmlformats.org/drawingml/2006/main" xmlns:r="http://schemas.openxmlformats.org/officeDocument/2006/relationships" xmlns:p="http://schemas.openxmlformats.org/presentationml/2006/main">
+  <p:cSld>
+    <p:spTree>
+      <p:nvGrpSpPr>
+        <p:cNvPr id="1" name=""/>
+        <p:cNvGrpSpPr/>
+        <p:nvPr/>
+      </p:nvGrpSpPr>
+      <p:grpSpPr>
+        <a:xfrm>
+          <a:off x="0" y="0"/>
+          <a:ext cx="0" cy="0"/>
+          <a:chOff x="0" y="0"/>
+          <a:chExt cx="0" cy="0"/>
+        </a:xfrm>
+      </p:grpSpPr>
+      <p:sp>
+        <p:nvSpPr>
+          <p:cNvPr id="2" name="Title 1"/>
+          <p:cNvSpPr>
+            <a:spLocks noGrp="1"/>
+          </p:cNvSpPr>
+          <p:nvPr>
+            <p:ph type="title"/>
+          </p:nvPr>
+        </p:nvSpPr>
+        <p:spPr/>
+        <p:txBody>
+          <a:bodyPr/>
+          <a:lstStyle/>
+          <a:p>
+            <a:r>
+              <a:rPr lang="en-US" dirty="0" smtClean="0"/>
+              <a:t>Conditional Surprise</a:t>
+            </a:r>
+            <a:endParaRPr lang="en-US" dirty="0"/>
+          </a:p>
+        </p:txBody>
+      </p:sp>
+      <p:sp>
+        <p:nvSpPr>
+          <p:cNvPr id="3" name="Content Placeholder 2"/>
+          <p:cNvSpPr>
+            <a:spLocks noGrp="1"/>
+          </p:cNvSpPr>
+          <p:nvPr>
+            <p:ph idx="1"/>
+          </p:nvPr>
+        </p:nvSpPr>
+        <p:spPr/>
+        <p:txBody>
+          <a:bodyPr/>
+          <a:lstStyle/>
+          <a:p>
+            <a:endParaRPr lang="en-US"/>
+          </a:p>
+        </p:txBody>
+      </p:sp>
+    </p:spTree>
+    <p:extLst>
+      <p:ext uri="{BB962C8B-B14F-4D97-AF65-F5344CB8AC3E}">
+        <p14:creationId xmlns:p14="http://schemas.microsoft.com/office/powerpoint/2010/main" val="3205762565"/>
+      </p:ext>
+    </p:extLst>
+  </p:cSld>
+  <p:clrMapOvr>
+    <a:masterClrMapping/>
+  </p:clrMapOvr>
+</p:sld>
+</file>
+
+<file path=ppt/slides/slide11.xml><?xml version="1.0" encoding="utf-8"?>
+<p:sld xmlns:a="http://schemas.openxmlformats.org/drawingml/2006/main" xmlns:r="http://schemas.openxmlformats.org/officeDocument/2006/relationships" xmlns:p="http://schemas.openxmlformats.org/presentationml/2006/main">
+  <p:cSld>
+    <p:spTree>
+      <p:nvGrpSpPr>
+        <p:cNvPr id="1" name=""/>
+        <p:cNvGrpSpPr/>
+        <p:nvPr/>
+      </p:nvGrpSpPr>
+      <p:grpSpPr>
+        <a:xfrm>
+          <a:off x="0" y="0"/>
+          <a:ext cx="0" cy="0"/>
+          <a:chOff x="0" y="0"/>
+          <a:chExt cx="0" cy="0"/>
+        </a:xfrm>
+      </p:grpSpPr>
+      <p:sp>
+        <p:nvSpPr>
+          <p:cNvPr id="2" name="Title 1"/>
+          <p:cNvSpPr>
+            <a:spLocks noGrp="1"/>
+          </p:cNvSpPr>
+          <p:nvPr>
+            <p:ph type="title"/>
+          </p:nvPr>
+        </p:nvSpPr>
+        <p:spPr/>
+        <p:txBody>
+          <a:bodyPr/>
+          <a:lstStyle/>
+          <a:p>
+            <a:r>
+              <a:rPr lang="en-US" dirty="0" smtClean="0"/>
+              <a:t>Distance</a:t>
+            </a:r>
+            <a:endParaRPr lang="en-US" dirty="0"/>
+          </a:p>
+        </p:txBody>
+      </p:sp>
+      <p:sp>
+        <p:nvSpPr>
+          <p:cNvPr id="3" name="Content Placeholder 2"/>
+          <p:cNvSpPr>
+            <a:spLocks noGrp="1"/>
+          </p:cNvSpPr>
+          <p:nvPr>
+            <p:ph idx="1"/>
+          </p:nvPr>
+        </p:nvSpPr>
+        <p:spPr/>
+        <p:txBody>
+          <a:bodyPr/>
+          <a:lstStyle/>
+          <a:p>
+            <a:endParaRPr lang="en-US"/>
+          </a:p>
+        </p:txBody>
+      </p:sp>
+    </p:spTree>
+    <p:extLst>
+      <p:ext uri="{BB962C8B-B14F-4D97-AF65-F5344CB8AC3E}">
+        <p14:creationId xmlns:p14="http://schemas.microsoft.com/office/powerpoint/2010/main" val="1267453989"/>
+      </p:ext>
+    </p:extLst>
+  </p:cSld>
+  <p:clrMapOvr>
+    <a:masterClrMapping/>
+  </p:clrMapOvr>
+</p:sld>
+</file>
+
+<file path=ppt/slides/slide12.xml><?xml version="1.0" encoding="utf-8"?>
+<p:sld xmlns:a="http://schemas.openxmlformats.org/drawingml/2006/main" xmlns:r="http://schemas.openxmlformats.org/officeDocument/2006/relationships" xmlns:p="http://schemas.openxmlformats.org/presentationml/2006/main">
+  <p:cSld>
+    <p:spTree>
+      <p:nvGrpSpPr>
+        <p:cNvPr id="1" name=""/>
+        <p:cNvGrpSpPr/>
+        <p:nvPr/>
+      </p:nvGrpSpPr>
+      <p:grpSpPr>
+        <a:xfrm>
+          <a:off x="0" y="0"/>
+          <a:ext cx="0" cy="0"/>
+          <a:chOff x="0" y="0"/>
+          <a:chExt cx="0" cy="0"/>
+        </a:xfrm>
+      </p:grpSpPr>
+      <p:sp>
+        <p:nvSpPr>
+          <p:cNvPr id="2" name="Title 1"/>
+          <p:cNvSpPr>
+            <a:spLocks noGrp="1"/>
+          </p:cNvSpPr>
+          <p:nvPr>
+            <p:ph type="title"/>
+          </p:nvPr>
+        </p:nvSpPr>
+        <p:spPr/>
+        <p:txBody>
+          <a:bodyPr/>
+          <a:lstStyle/>
+          <a:p>
+            <a:r>
+              <a:rPr lang="en-US" dirty="0" smtClean="0"/>
+              <a:t>Opportunities for Additional Work</a:t>
+            </a:r>
+            <a:endParaRPr lang="en-US" dirty="0"/>
+          </a:p>
+        </p:txBody>
+      </p:sp>
+      <p:sp>
+        <p:nvSpPr>
+          <p:cNvPr id="3" name="Content Placeholder 2"/>
+          <p:cNvSpPr>
+            <a:spLocks noGrp="1"/>
+          </p:cNvSpPr>
+          <p:nvPr>
+            <p:ph idx="1"/>
+          </p:nvPr>
+        </p:nvSpPr>
+        <p:spPr/>
+        <p:txBody>
+          <a:bodyPr/>
+          <a:lstStyle/>
+          <a:p>
+            <a:r>
+              <a:rPr lang="en-US" dirty="0" smtClean="0"/>
+              <a:t>Look at much shorter time frames</a:t>
+            </a:r>
+          </a:p>
+          <a:p>
+            <a:pPr lvl="1"/>
+            <a:r>
+              <a:rPr lang="en-US" dirty="0" smtClean="0"/>
+              <a:t>High frequency trading (positions held less than a second) make up more than half of all trading volume (as much as 73% in 2009).</a:t>
+            </a:r>
+          </a:p>
+          <a:p>
+            <a:r>
+              <a:rPr lang="en-US" dirty="0" smtClean="0"/>
+              <a:t>Large scale distance calculations among instruments, sectors, regions, time periods, market trends</a:t>
+            </a:r>
+          </a:p>
+          <a:p>
+            <a:r>
+              <a:rPr lang="en-US" dirty="0" smtClean="0"/>
+              <a:t>Challenges:</a:t>
+            </a:r>
+          </a:p>
+          <a:p>
+            <a:pPr lvl="1"/>
+            <a:r>
+              <a:rPr lang="en-US" dirty="0" smtClean="0"/>
+              <a:t>More finely tuned data, more timely data is not freely available</a:t>
+            </a:r>
+          </a:p>
+          <a:p>
+            <a:pPr lvl="1"/>
+            <a:r>
+              <a:rPr lang="en-US" dirty="0" smtClean="0"/>
+              <a:t>To approach an interesting level of granularity in both time periods and outcomes, data volume, computation requirements become quite </a:t>
+            </a:r>
+            <a:r>
+              <a:rPr lang="en-US" smtClean="0"/>
+              <a:t>a barrier</a:t>
+            </a:r>
+            <a:endParaRPr lang="en-US" dirty="0"/>
+          </a:p>
+        </p:txBody>
+      </p:sp>
+    </p:spTree>
+    <p:extLst>
+      <p:ext uri="{BB962C8B-B14F-4D97-AF65-F5344CB8AC3E}">
+        <p14:creationId xmlns:p14="http://schemas.microsoft.com/office/powerpoint/2010/main" val="2657590513"/>
+      </p:ext>
+    </p:extLst>
+  </p:cSld>
+  <p:clrMapOvr>
+    <a:masterClrMapping/>
+  </p:clrMapOvr>
+  <p:timing>
+    <p:tnLst>
+      <p:par>
+        <p:cTn id="1" dur="indefinite" restart="never" nodeType="tmRoot"/>
+      </p:par>
+    </p:tnLst>
+  </p:timing>
+</p:sld>
+</file>
+
 <file path=ppt/slides/slide2.xml><?xml version="1.0" encoding="utf-8"?>
 <p:sld xmlns:a="http://schemas.openxmlformats.org/drawingml/2006/main" xmlns:r="http://schemas.openxmlformats.org/officeDocument/2006/relationships" xmlns:p="http://schemas.openxmlformats.org/presentationml/2006/main">
   <p:cSld>
@@ -9347,14 +9610,19 @@
             <p:ph type="title"/>
           </p:nvPr>
         </p:nvSpPr>
-        <p:spPr/>
+        <p:spPr>
+          <a:xfrm>
+            <a:off x="838200" y="250822"/>
+            <a:ext cx="11353800" cy="1325563"/>
+          </a:xfrm>
+        </p:spPr>
         <p:txBody>
           <a:bodyPr/>
           <a:lstStyle/>
           <a:p>
             <a:r>
               <a:rPr lang="en-US" dirty="0" smtClean="0"/>
-              <a:t>Opportunities for Additional Work</a:t>
+              <a:t>Calculating Surprise</a:t>
             </a:r>
             <a:endParaRPr lang="en-US" dirty="0"/>
           </a:p>
@@ -9362,7 +9630,7 @@
       </p:sp>
       <p:sp>
         <p:nvSpPr>
-          <p:cNvPr id="3" name="Content Placeholder 2"/>
+          <p:cNvPr id="9" name="Content Placeholder 8"/>
           <p:cNvSpPr>
             <a:spLocks noGrp="1"/>
           </p:cNvSpPr>
@@ -9375,27 +9643,237 @@
           <a:bodyPr/>
           <a:lstStyle/>
           <a:p>
-            <a:endParaRPr lang="en-US"/>
+            <a:r>
+              <a:rPr lang="en-US" dirty="0" smtClean="0"/>
+              <a:t>Same data as previous example, 5 years data for 4 indices, bands = standard deviation/8</a:t>
+            </a:r>
+          </a:p>
+          <a:p>
+            <a:r>
+              <a:rPr lang="en-US" dirty="0" smtClean="0"/>
+              <a:t>Not using conditional probabilities for this example, simply using probabilities for each index of each of 40 possible outcomes</a:t>
+            </a:r>
+          </a:p>
+          <a:p>
+            <a:r>
+              <a:rPr lang="en-US" dirty="0" smtClean="0"/>
+              <a:t>Calculated using Shannon entropy formula:</a:t>
+            </a:r>
+          </a:p>
+          <a:p>
+            <a:endParaRPr lang="en-US" dirty="0"/>
           </a:p>
         </p:txBody>
       </p:sp>
+      <p:graphicFrame>
+        <p:nvGraphicFramePr>
+          <p:cNvPr id="10" name="Table 9"/>
+          <p:cNvGraphicFramePr>
+            <a:graphicFrameLocks noGrp="1"/>
+          </p:cNvGraphicFramePr>
+          <p:nvPr>
+            <p:extLst>
+              <p:ext uri="{D42A27DB-BD31-4B8C-83A1-F6EECF244321}">
+                <p14:modId xmlns:p14="http://schemas.microsoft.com/office/powerpoint/2010/main" val="150098591"/>
+              </p:ext>
+            </p:extLst>
+          </p:nvPr>
+        </p:nvGraphicFramePr>
+        <p:xfrm>
+          <a:off x="2032000" y="5112064"/>
+          <a:ext cx="8128000" cy="914400"/>
+        </p:xfrm>
+        <a:graphic>
+          <a:graphicData uri="http://schemas.openxmlformats.org/drawingml/2006/table">
+            <a:tbl>
+              <a:tblPr firstRow="1" bandRow="1">
+                <a:tableStyleId>{5C22544A-7EE6-4342-B048-85BDC9FD1C3A}</a:tableStyleId>
+              </a:tblPr>
+              <a:tblGrid>
+                <a:gridCol w="2032000"/>
+                <a:gridCol w="2032000"/>
+                <a:gridCol w="2032000"/>
+                <a:gridCol w="2032000"/>
+              </a:tblGrid>
+              <a:tr h="370840">
+                <a:tc>
+                  <a:txBody>
+                    <a:bodyPr/>
+                    <a:lstStyle/>
+                    <a:p>
+                      <a:pPr algn="ctr"/>
+                      <a:r>
+                        <a:rPr lang="en-US" sz="2400" dirty="0" smtClean="0"/>
+                        <a:t>BVSP</a:t>
+                      </a:r>
+                      <a:endParaRPr lang="en-US" sz="2400" dirty="0"/>
+                    </a:p>
+                  </a:txBody>
+                  <a:tcPr/>
+                </a:tc>
+                <a:tc>
+                  <a:txBody>
+                    <a:bodyPr/>
+                    <a:lstStyle/>
+                    <a:p>
+                      <a:pPr algn="ctr"/>
+                      <a:r>
+                        <a:rPr lang="en-US" sz="2400" dirty="0" smtClean="0"/>
+                        <a:t>FTSE</a:t>
+                      </a:r>
+                      <a:endParaRPr lang="en-US" sz="2400" dirty="0"/>
+                    </a:p>
+                  </a:txBody>
+                  <a:tcPr/>
+                </a:tc>
+                <a:tc>
+                  <a:txBody>
+                    <a:bodyPr/>
+                    <a:lstStyle/>
+                    <a:p>
+                      <a:pPr algn="ctr"/>
+                      <a:r>
+                        <a:rPr lang="en-US" sz="2400" dirty="0" smtClean="0"/>
+                        <a:t>NASDAQ</a:t>
+                      </a:r>
+                      <a:endParaRPr lang="en-US" sz="2400" dirty="0"/>
+                    </a:p>
+                  </a:txBody>
+                  <a:tcPr/>
+                </a:tc>
+                <a:tc>
+                  <a:txBody>
+                    <a:bodyPr/>
+                    <a:lstStyle/>
+                    <a:p>
+                      <a:pPr algn="ctr"/>
+                      <a:r>
+                        <a:rPr lang="en-US" sz="2400" dirty="0" smtClean="0"/>
+                        <a:t>NIKKEI</a:t>
+                      </a:r>
+                      <a:endParaRPr lang="en-US" sz="2400" dirty="0"/>
+                    </a:p>
+                  </a:txBody>
+                  <a:tcPr/>
+                </a:tc>
+              </a:tr>
+              <a:tr h="370840">
+                <a:tc>
+                  <a:txBody>
+                    <a:bodyPr/>
+                    <a:lstStyle/>
+                    <a:p>
+                      <a:pPr algn="ctr"/>
+                      <a:r>
+                        <a:rPr lang="en-US" sz="2400" dirty="0" smtClean="0"/>
+                        <a:t>3.99</a:t>
+                      </a:r>
+                      <a:endParaRPr lang="en-US" sz="2400" dirty="0"/>
+                    </a:p>
+                  </a:txBody>
+                  <a:tcPr/>
+                </a:tc>
+                <a:tc>
+                  <a:txBody>
+                    <a:bodyPr/>
+                    <a:lstStyle/>
+                    <a:p>
+                      <a:pPr algn="ctr"/>
+                      <a:r>
+                        <a:rPr lang="en-US" sz="2400" dirty="0" smtClean="0"/>
+                        <a:t>3.28</a:t>
+                      </a:r>
+                      <a:endParaRPr lang="en-US" sz="2400" dirty="0"/>
+                    </a:p>
+                  </a:txBody>
+                  <a:tcPr/>
+                </a:tc>
+                <a:tc>
+                  <a:txBody>
+                    <a:bodyPr/>
+                    <a:lstStyle/>
+                    <a:p>
+                      <a:pPr algn="ctr"/>
+                      <a:r>
+                        <a:rPr lang="en-US" sz="2400" dirty="0" smtClean="0"/>
+                        <a:t>3.50</a:t>
+                      </a:r>
+                      <a:endParaRPr lang="en-US" sz="2400" dirty="0"/>
+                    </a:p>
+                  </a:txBody>
+                  <a:tcPr/>
+                </a:tc>
+                <a:tc>
+                  <a:txBody>
+                    <a:bodyPr/>
+                    <a:lstStyle/>
+                    <a:p>
+                      <a:pPr algn="ctr"/>
+                      <a:r>
+                        <a:rPr lang="en-US" sz="2400" dirty="0" smtClean="0"/>
+                        <a:t>3.87</a:t>
+                      </a:r>
+                      <a:endParaRPr lang="en-US" sz="2400" dirty="0"/>
+                    </a:p>
+                  </a:txBody>
+                  <a:tcPr/>
+                </a:tc>
+              </a:tr>
+            </a:tbl>
+          </a:graphicData>
+        </a:graphic>
+      </p:graphicFrame>
+      <p:pic>
+        <p:nvPicPr>
+          <p:cNvPr id="1026" name="Picture 2" descr="http://www.bearcave.com/misl/misl_tech/wavelets/compression/shannon2.jpg"/>
+          <p:cNvPicPr>
+            <a:picLocks noChangeAspect="1" noChangeArrowheads="1"/>
+          </p:cNvPicPr>
+          <p:nvPr/>
+        </p:nvPicPr>
+        <p:blipFill>
+          <a:blip r:embed="rId2">
+            <a:extLst>
+              <a:ext uri="{28A0092B-C50C-407E-A947-70E740481C1C}">
+                <a14:useLocalDpi xmlns:a14="http://schemas.microsoft.com/office/drawing/2010/main" val="0"/>
+              </a:ext>
+            </a:extLst>
+          </a:blip>
+          <a:srcRect/>
+          <a:stretch>
+            <a:fillRect/>
+          </a:stretch>
+        </p:blipFill>
+        <p:spPr bwMode="auto">
+          <a:xfrm>
+            <a:off x="7781018" y="3670982"/>
+            <a:ext cx="2190750" cy="857251"/>
+          </a:xfrm>
+          <a:prstGeom prst="rect">
+            <a:avLst/>
+          </a:prstGeom>
+          <a:noFill/>
+          <a:extLst>
+            <a:ext uri="{909E8E84-426E-40DD-AFC4-6F175D3DCCD1}">
+              <a14:hiddenFill xmlns:a14="http://schemas.microsoft.com/office/drawing/2010/main">
+                <a:solidFill>
+                  <a:srgbClr val="FFFFFF"/>
+                </a:solidFill>
+              </a14:hiddenFill>
+            </a:ext>
+          </a:extLst>
+        </p:spPr>
+      </p:pic>
     </p:spTree>
     <p:extLst>
       <p:ext uri="{BB962C8B-B14F-4D97-AF65-F5344CB8AC3E}">
-        <p14:creationId xmlns:p14="http://schemas.microsoft.com/office/powerpoint/2010/main" val="2657590513"/>
+        <p14:creationId xmlns:p14="http://schemas.microsoft.com/office/powerpoint/2010/main" val="4097884025"/>
       </p:ext>
     </p:extLst>
   </p:cSld>
   <p:clrMapOvr>
     <a:masterClrMapping/>
   </p:clrMapOvr>
-  <p:timing>
-    <p:tnLst>
-      <p:par>
-        <p:cTn id="1" dur="indefinite" restart="never" nodeType="tmRoot"/>
-      </p:par>
-    </p:tnLst>
-  </p:timing>
 </p:sld>
 </file>
 

</xml_diff>

<commit_message>
finished conditional surprise slide
could add additional results if available, but this is probably enough
to present
</commit_message>
<xml_diff>
--- a/slides/hackathon.pptx
+++ b/slides/hackathon.pptx
@@ -163,6 +163,7 @@
           </a:p>
         </c:rich>
       </c:tx>
+      <c:layout/>
       <c:overlay val="0"/>
       <c:spPr>
         <a:noFill/>
@@ -413,12 +414,12 @@
         </c:dLbls>
         <c:gapWidth val="65"/>
         <c:shape val="box"/>
-        <c:axId val="263834512"/>
-        <c:axId val="263835072"/>
+        <c:axId val="61330080"/>
+        <c:axId val="138414304"/>
         <c:axId val="0"/>
       </c:bar3DChart>
       <c:catAx>
-        <c:axId val="263834512"/>
+        <c:axId val="61330080"/>
         <c:scaling>
           <c:orientation val="minMax"/>
         </c:scaling>
@@ -461,7 +462,7 @@
             <a:endParaRPr lang="en-US"/>
           </a:p>
         </c:txPr>
-        <c:crossAx val="263835072"/>
+        <c:crossAx val="138414304"/>
         <c:crosses val="autoZero"/>
         <c:auto val="1"/>
         <c:lblAlgn val="ctr"/>
@@ -469,7 +470,7 @@
         <c:noMultiLvlLbl val="0"/>
       </c:catAx>
       <c:valAx>
-        <c:axId val="263835072"/>
+        <c:axId val="138414304"/>
         <c:scaling>
           <c:orientation val="minMax"/>
         </c:scaling>
@@ -520,7 +521,7 @@
             <a:endParaRPr lang="en-US"/>
           </a:p>
         </c:txPr>
-        <c:crossAx val="263834512"/>
+        <c:crossAx val="61330080"/>
         <c:crosses val="autoZero"/>
         <c:crossBetween val="between"/>
       </c:valAx>
@@ -534,6 +535,7 @@
     </c:plotArea>
     <c:legend>
       <c:legendPos val="b"/>
+      <c:layout/>
       <c:overlay val="0"/>
       <c:spPr>
         <a:solidFill>
@@ -659,6 +661,7 @@
           </a:p>
         </c:rich>
       </c:tx>
+      <c:layout/>
       <c:overlay val="0"/>
       <c:spPr>
         <a:noFill/>
@@ -1271,11 +1274,11 @@
           <c:showBubbleSize val="0"/>
         </c:dLbls>
         <c:smooth val="0"/>
-        <c:axId val="263838432"/>
-        <c:axId val="264876736"/>
+        <c:axId val="138417104"/>
+        <c:axId val="138417664"/>
       </c:lineChart>
       <c:catAx>
-        <c:axId val="263838432"/>
+        <c:axId val="138417104"/>
         <c:scaling>
           <c:orientation val="minMax"/>
         </c:scaling>
@@ -1318,7 +1321,7 @@
             <a:endParaRPr lang="en-US"/>
           </a:p>
         </c:txPr>
-        <c:crossAx val="264876736"/>
+        <c:crossAx val="138417664"/>
         <c:crosses val="autoZero"/>
         <c:auto val="1"/>
         <c:lblAlgn val="ctr"/>
@@ -1326,7 +1329,7 @@
         <c:noMultiLvlLbl val="0"/>
       </c:catAx>
       <c:valAx>
-        <c:axId val="264876736"/>
+        <c:axId val="138417664"/>
         <c:scaling>
           <c:orientation val="minMax"/>
         </c:scaling>
@@ -1377,7 +1380,7 @@
             <a:endParaRPr lang="en-US"/>
           </a:p>
         </c:txPr>
-        <c:crossAx val="263838432"/>
+        <c:crossAx val="138417104"/>
         <c:crosses val="autoZero"/>
         <c:crossBetween val="between"/>
       </c:valAx>
@@ -1391,6 +1394,7 @@
     </c:plotArea>
     <c:legend>
       <c:legendPos val="b"/>
+      <c:layout/>
       <c:overlay val="0"/>
       <c:spPr>
         <a:noFill/>
@@ -2448,11 +2452,11 @@
           <c:showBubbleSize val="0"/>
         </c:dLbls>
         <c:smooth val="0"/>
-        <c:axId val="265589600"/>
-        <c:axId val="265590160"/>
+        <c:axId val="138537376"/>
+        <c:axId val="138537936"/>
       </c:lineChart>
       <c:catAx>
-        <c:axId val="265589600"/>
+        <c:axId val="138537376"/>
         <c:scaling>
           <c:orientation val="minMax"/>
         </c:scaling>
@@ -2495,7 +2499,7 @@
             <a:endParaRPr lang="en-US"/>
           </a:p>
         </c:txPr>
-        <c:crossAx val="265590160"/>
+        <c:crossAx val="138537936"/>
         <c:crosses val="autoZero"/>
         <c:auto val="1"/>
         <c:lblAlgn val="ctr"/>
@@ -2503,7 +2507,7 @@
         <c:noMultiLvlLbl val="0"/>
       </c:catAx>
       <c:valAx>
-        <c:axId val="265590160"/>
+        <c:axId val="138537936"/>
         <c:scaling>
           <c:orientation val="minMax"/>
         </c:scaling>
@@ -2554,9 +2558,818 @@
             <a:endParaRPr lang="en-US"/>
           </a:p>
         </c:txPr>
-        <c:crossAx val="265589600"/>
+        <c:crossAx val="138537376"/>
         <c:crosses val="autoZero"/>
         <c:crossBetween val="between"/>
+      </c:valAx>
+      <c:spPr>
+        <a:noFill/>
+        <a:ln>
+          <a:noFill/>
+        </a:ln>
+        <a:effectLst/>
+      </c:spPr>
+    </c:plotArea>
+    <c:legend>
+      <c:legendPos val="b"/>
+      <c:layout/>
+      <c:overlay val="0"/>
+      <c:spPr>
+        <a:noFill/>
+        <a:ln>
+          <a:noFill/>
+        </a:ln>
+        <a:effectLst/>
+      </c:spPr>
+      <c:txPr>
+        <a:bodyPr rot="0" spcFirstLastPara="1" vertOverflow="ellipsis" vert="horz" wrap="square" anchor="ctr" anchorCtr="1"/>
+        <a:lstStyle/>
+        <a:p>
+          <a:pPr>
+            <a:defRPr sz="900" b="0" i="0" u="none" strike="noStrike" kern="1200" baseline="0">
+              <a:solidFill>
+                <a:schemeClr val="tx1">
+                  <a:lumMod val="65000"/>
+                  <a:lumOff val="35000"/>
+                </a:schemeClr>
+              </a:solidFill>
+              <a:latin typeface="+mn-lt"/>
+              <a:ea typeface="+mn-ea"/>
+              <a:cs typeface="+mn-cs"/>
+            </a:defRPr>
+          </a:pPr>
+          <a:endParaRPr lang="en-US"/>
+        </a:p>
+      </c:txPr>
+    </c:legend>
+    <c:plotVisOnly val="1"/>
+    <c:dispBlanksAs val="gap"/>
+    <c:showDLblsOverMax val="0"/>
+  </c:chart>
+  <c:spPr>
+    <a:noFill/>
+    <a:ln>
+      <a:noFill/>
+    </a:ln>
+    <a:effectLst/>
+  </c:spPr>
+  <c:txPr>
+    <a:bodyPr/>
+    <a:lstStyle/>
+    <a:p>
+      <a:pPr>
+        <a:defRPr/>
+      </a:pPr>
+      <a:endParaRPr lang="en-US"/>
+    </a:p>
+  </c:txPr>
+  <c:externalData r:id="rId3">
+    <c:autoUpdate val="0"/>
+  </c:externalData>
+</c:chartSpace>
+</file>
+
+<file path=ppt/charts/chart4.xml><?xml version="1.0" encoding="utf-8"?>
+<c:chartSpace xmlns:c="http://schemas.openxmlformats.org/drawingml/2006/chart" xmlns:a="http://schemas.openxmlformats.org/drawingml/2006/main" xmlns:r="http://schemas.openxmlformats.org/officeDocument/2006/relationships">
+  <c:date1904 val="0"/>
+  <c:lang val="en-US"/>
+  <c:roundedCorners val="0"/>
+  <mc:AlternateContent xmlns:mc="http://schemas.openxmlformats.org/markup-compatibility/2006">
+    <mc:Choice xmlns:c14="http://schemas.microsoft.com/office/drawing/2007/8/2/chart" Requires="c14">
+      <c14:style val="102"/>
+    </mc:Choice>
+    <mc:Fallback>
+      <c:style val="2"/>
+    </mc:Fallback>
+  </mc:AlternateContent>
+  <c:chart>
+    <c:title>
+      <c:tx>
+        <c:rich>
+          <a:bodyPr rot="0" spcFirstLastPara="1" vertOverflow="ellipsis" vert="horz" wrap="square" anchor="ctr" anchorCtr="1"/>
+          <a:lstStyle/>
+          <a:p>
+            <a:pPr>
+              <a:defRPr sz="1400" b="0" i="0" u="none" strike="noStrike" kern="1200" spc="0" baseline="0">
+                <a:solidFill>
+                  <a:schemeClr val="tx1">
+                    <a:lumMod val="65000"/>
+                    <a:lumOff val="35000"/>
+                  </a:schemeClr>
+                </a:solidFill>
+                <a:latin typeface="+mn-lt"/>
+                <a:ea typeface="+mn-ea"/>
+                <a:cs typeface="+mn-cs"/>
+              </a:defRPr>
+            </a:pPr>
+            <a:r>
+              <a:rPr lang="en-US"/>
+              <a:t>Conditional Surprise Given Prior Outcome </a:t>
+            </a:r>
+          </a:p>
+        </c:rich>
+      </c:tx>
+      <c:layout/>
+      <c:overlay val="0"/>
+      <c:spPr>
+        <a:noFill/>
+        <a:ln>
+          <a:noFill/>
+        </a:ln>
+        <a:effectLst/>
+      </c:spPr>
+      <c:txPr>
+        <a:bodyPr rot="0" spcFirstLastPara="1" vertOverflow="ellipsis" vert="horz" wrap="square" anchor="ctr" anchorCtr="1"/>
+        <a:lstStyle/>
+        <a:p>
+          <a:pPr>
+            <a:defRPr sz="1400" b="0" i="0" u="none" strike="noStrike" kern="1200" spc="0" baseline="0">
+              <a:solidFill>
+                <a:schemeClr val="tx1">
+                  <a:lumMod val="65000"/>
+                  <a:lumOff val="35000"/>
+                </a:schemeClr>
+              </a:solidFill>
+              <a:latin typeface="+mn-lt"/>
+              <a:ea typeface="+mn-ea"/>
+              <a:cs typeface="+mn-cs"/>
+            </a:defRPr>
+          </a:pPr>
+          <a:endParaRPr lang="en-US"/>
+        </a:p>
+      </c:txPr>
+    </c:title>
+    <c:autoTitleDeleted val="0"/>
+    <c:plotArea>
+      <c:layout/>
+      <c:lineChart>
+        <c:grouping val="standard"/>
+        <c:varyColors val="0"/>
+        <c:ser>
+          <c:idx val="0"/>
+          <c:order val="0"/>
+          <c:tx>
+            <c:strRef>
+              <c:f>calc!$U$38</c:f>
+              <c:strCache>
+                <c:ptCount val="1"/>
+                <c:pt idx="0">
+                  <c:v>BVSP</c:v>
+                </c:pt>
+              </c:strCache>
+            </c:strRef>
+          </c:tx>
+          <c:spPr>
+            <a:ln w="28575" cap="rnd">
+              <a:solidFill>
+                <a:schemeClr val="accent1"/>
+              </a:solidFill>
+              <a:round/>
+            </a:ln>
+            <a:effectLst/>
+          </c:spPr>
+          <c:marker>
+            <c:symbol val="none"/>
+          </c:marker>
+          <c:cat>
+            <c:numRef>
+              <c:f>calc!$R$39:$R$53</c:f>
+              <c:numCache>
+                <c:formatCode>_(* #,##0_);_(* \(#,##0\);_(* "-"??_);_(@_)</c:formatCode>
+                <c:ptCount val="15"/>
+                <c:pt idx="0">
+                  <c:v>-7</c:v>
+                </c:pt>
+                <c:pt idx="1">
+                  <c:v>-6</c:v>
+                </c:pt>
+                <c:pt idx="2">
+                  <c:v>-5</c:v>
+                </c:pt>
+                <c:pt idx="3">
+                  <c:v>-4</c:v>
+                </c:pt>
+                <c:pt idx="4">
+                  <c:v>-3</c:v>
+                </c:pt>
+                <c:pt idx="5">
+                  <c:v>-2</c:v>
+                </c:pt>
+                <c:pt idx="6">
+                  <c:v>-1</c:v>
+                </c:pt>
+                <c:pt idx="7">
+                  <c:v>0</c:v>
+                </c:pt>
+                <c:pt idx="8">
+                  <c:v>1</c:v>
+                </c:pt>
+                <c:pt idx="9">
+                  <c:v>2</c:v>
+                </c:pt>
+                <c:pt idx="10">
+                  <c:v>3</c:v>
+                </c:pt>
+                <c:pt idx="11">
+                  <c:v>4</c:v>
+                </c:pt>
+                <c:pt idx="12">
+                  <c:v>5</c:v>
+                </c:pt>
+                <c:pt idx="13">
+                  <c:v>6</c:v>
+                </c:pt>
+                <c:pt idx="14">
+                  <c:v>7</c:v>
+                </c:pt>
+              </c:numCache>
+            </c:numRef>
+          </c:cat>
+          <c:val>
+            <c:numRef>
+              <c:f>calc!$U$39:$U$53</c:f>
+              <c:numCache>
+                <c:formatCode>General</c:formatCode>
+                <c:ptCount val="15"/>
+                <c:pt idx="0">
+                  <c:v>3.2998963911678905</c:v>
+                </c:pt>
+                <c:pt idx="1">
+                  <c:v>3.533206219346495</c:v>
+                </c:pt>
+                <c:pt idx="2">
+                  <c:v>3.3960509927870328</c:v>
+                </c:pt>
+                <c:pt idx="3">
+                  <c:v>3.3694346546587504</c:v>
+                </c:pt>
+                <c:pt idx="4" formatCode="_(* #,##0.000_);_(* \(#,##0.000\);_(* &quot;-&quot;??_);_(@_)">
+                  <c:v>3.7093852686993536</c:v>
+                </c:pt>
+                <c:pt idx="5" formatCode="_(* #,##0.000_);_(* \(#,##0.000\);_(* &quot;-&quot;??_);_(@_)">
+                  <c:v>3.8190390779508272</c:v>
+                </c:pt>
+                <c:pt idx="6" formatCode="_(* #,##0.000_);_(* \(#,##0.000\);_(* &quot;-&quot;??_);_(@_)">
+                  <c:v>3.8990459273930513</c:v>
+                </c:pt>
+                <c:pt idx="7" formatCode="_(* #,##0.000_);_(* \(#,##0.000\);_(* &quot;-&quot;??_);_(@_)">
+                  <c:v>4.0140060431844873</c:v>
+                </c:pt>
+                <c:pt idx="8" formatCode="_(* #,##0.000_);_(* \(#,##0.000\);_(* &quot;-&quot;??_);_(@_)">
+                  <c:v>3.7085918764524073</c:v>
+                </c:pt>
+                <c:pt idx="9" formatCode="_(* #,##0.000_);_(* \(#,##0.000\);_(* &quot;-&quot;??_);_(@_)">
+                  <c:v>3.7621020925776025</c:v>
+                </c:pt>
+                <c:pt idx="10" formatCode="_(* #,##0.000_);_(* \(#,##0.000\);_(* &quot;-&quot;??_);_(@_)">
+                  <c:v>3.5050500760216794</c:v>
+                </c:pt>
+                <c:pt idx="11" formatCode="_(* #,##0.00_);_(* \(#,##0.00\);_(* &quot;-&quot;??_);_(@_)">
+                  <c:v>3.4863341223876048</c:v>
+                </c:pt>
+                <c:pt idx="12">
+                  <c:v>3.5802739302713666</c:v>
+                </c:pt>
+                <c:pt idx="13">
+                  <c:v>3.6312929881819</c:v>
+                </c:pt>
+                <c:pt idx="14">
+                  <c:v>3.057476076289932</c:v>
+                </c:pt>
+              </c:numCache>
+            </c:numRef>
+          </c:val>
+          <c:smooth val="0"/>
+        </c:ser>
+        <c:ser>
+          <c:idx val="1"/>
+          <c:order val="1"/>
+          <c:tx>
+            <c:strRef>
+              <c:f>calc!$V$38</c:f>
+              <c:strCache>
+                <c:ptCount val="1"/>
+                <c:pt idx="0">
+                  <c:v>FTSE</c:v>
+                </c:pt>
+              </c:strCache>
+            </c:strRef>
+          </c:tx>
+          <c:spPr>
+            <a:ln w="28575" cap="rnd">
+              <a:solidFill>
+                <a:schemeClr val="accent2"/>
+              </a:solidFill>
+              <a:round/>
+            </a:ln>
+            <a:effectLst/>
+          </c:spPr>
+          <c:marker>
+            <c:symbol val="none"/>
+          </c:marker>
+          <c:cat>
+            <c:numRef>
+              <c:f>calc!$R$39:$R$53</c:f>
+              <c:numCache>
+                <c:formatCode>_(* #,##0_);_(* \(#,##0\);_(* "-"??_);_(@_)</c:formatCode>
+                <c:ptCount val="15"/>
+                <c:pt idx="0">
+                  <c:v>-7</c:v>
+                </c:pt>
+                <c:pt idx="1">
+                  <c:v>-6</c:v>
+                </c:pt>
+                <c:pt idx="2">
+                  <c:v>-5</c:v>
+                </c:pt>
+                <c:pt idx="3">
+                  <c:v>-4</c:v>
+                </c:pt>
+                <c:pt idx="4">
+                  <c:v>-3</c:v>
+                </c:pt>
+                <c:pt idx="5">
+                  <c:v>-2</c:v>
+                </c:pt>
+                <c:pt idx="6">
+                  <c:v>-1</c:v>
+                </c:pt>
+                <c:pt idx="7">
+                  <c:v>0</c:v>
+                </c:pt>
+                <c:pt idx="8">
+                  <c:v>1</c:v>
+                </c:pt>
+                <c:pt idx="9">
+                  <c:v>2</c:v>
+                </c:pt>
+                <c:pt idx="10">
+                  <c:v>3</c:v>
+                </c:pt>
+                <c:pt idx="11">
+                  <c:v>4</c:v>
+                </c:pt>
+                <c:pt idx="12">
+                  <c:v>5</c:v>
+                </c:pt>
+                <c:pt idx="13">
+                  <c:v>6</c:v>
+                </c:pt>
+                <c:pt idx="14">
+                  <c:v>7</c:v>
+                </c:pt>
+              </c:numCache>
+            </c:numRef>
+          </c:cat>
+          <c:val>
+            <c:numRef>
+              <c:f>calc!$V$39:$V$53</c:f>
+              <c:numCache>
+                <c:formatCode>General</c:formatCode>
+                <c:ptCount val="15"/>
+                <c:pt idx="0">
+                  <c:v>2.6635327548042551</c:v>
+                </c:pt>
+                <c:pt idx="1">
+                  <c:v>2.6105772433316412</c:v>
+                </c:pt>
+                <c:pt idx="2">
+                  <c:v>2.9024425973114871</c:v>
+                </c:pt>
+                <c:pt idx="3">
+                  <c:v>3.2138617852864639</c:v>
+                </c:pt>
+                <c:pt idx="4" formatCode="_(* #,##0.000_);_(* \(#,##0.000\);_(* &quot;-&quot;??_);_(@_)">
+                  <c:v>3.5113741946738091</c:v>
+                </c:pt>
+                <c:pt idx="5" formatCode="_(* #,##0.000_);_(* \(#,##0.000\);_(* &quot;-&quot;??_);_(@_)">
+                  <c:v>3.2675616595366068</c:v>
+                </c:pt>
+                <c:pt idx="6" formatCode="_(* #,##0.000_);_(* \(#,##0.000\);_(* &quot;-&quot;??_);_(@_)">
+                  <c:v>3.0501267852167442</c:v>
+                </c:pt>
+                <c:pt idx="7" formatCode="_(* #,##0.000_);_(* \(#,##0.000\);_(* &quot;-&quot;??_);_(@_)">
+                  <c:v>3.0159512056592241</c:v>
+                </c:pt>
+                <c:pt idx="8" formatCode="_(* #,##0.000_);_(* \(#,##0.000\);_(* &quot;-&quot;??_);_(@_)">
+                  <c:v>3.2296562780035796</c:v>
+                </c:pt>
+                <c:pt idx="9" formatCode="_(* #,##0.000_);_(* \(#,##0.000\);_(* &quot;-&quot;??_);_(@_)">
+                  <c:v>2.8711437562777324</c:v>
+                </c:pt>
+                <c:pt idx="10" formatCode="_(* #,##0.000_);_(* \(#,##0.000\);_(* &quot;-&quot;??_);_(@_)">
+                  <c:v>3.1083757757484873</c:v>
+                </c:pt>
+                <c:pt idx="11" formatCode="_(* #,##0.00_);_(* \(#,##0.00\);_(* &quot;-&quot;??_);_(@_)">
+                  <c:v>2.9718042926943316</c:v>
+                </c:pt>
+                <c:pt idx="12">
+                  <c:v>2.6100635408770723</c:v>
+                </c:pt>
+                <c:pt idx="13">
+                  <c:v>2.8895494308620879</c:v>
+                </c:pt>
+                <c:pt idx="14">
+                  <c:v>1.9056390622295662</c:v>
+                </c:pt>
+              </c:numCache>
+            </c:numRef>
+          </c:val>
+          <c:smooth val="0"/>
+        </c:ser>
+        <c:ser>
+          <c:idx val="2"/>
+          <c:order val="2"/>
+          <c:tx>
+            <c:strRef>
+              <c:f>calc!$W$38</c:f>
+              <c:strCache>
+                <c:ptCount val="1"/>
+                <c:pt idx="0">
+                  <c:v>N225</c:v>
+                </c:pt>
+              </c:strCache>
+            </c:strRef>
+          </c:tx>
+          <c:spPr>
+            <a:ln w="28575" cap="rnd">
+              <a:solidFill>
+                <a:schemeClr val="accent3"/>
+              </a:solidFill>
+              <a:round/>
+            </a:ln>
+            <a:effectLst/>
+          </c:spPr>
+          <c:marker>
+            <c:symbol val="none"/>
+          </c:marker>
+          <c:cat>
+            <c:numRef>
+              <c:f>calc!$R$39:$R$53</c:f>
+              <c:numCache>
+                <c:formatCode>_(* #,##0_);_(* \(#,##0\);_(* "-"??_);_(@_)</c:formatCode>
+                <c:ptCount val="15"/>
+                <c:pt idx="0">
+                  <c:v>-7</c:v>
+                </c:pt>
+                <c:pt idx="1">
+                  <c:v>-6</c:v>
+                </c:pt>
+                <c:pt idx="2">
+                  <c:v>-5</c:v>
+                </c:pt>
+                <c:pt idx="3">
+                  <c:v>-4</c:v>
+                </c:pt>
+                <c:pt idx="4">
+                  <c:v>-3</c:v>
+                </c:pt>
+                <c:pt idx="5">
+                  <c:v>-2</c:v>
+                </c:pt>
+                <c:pt idx="6">
+                  <c:v>-1</c:v>
+                </c:pt>
+                <c:pt idx="7">
+                  <c:v>0</c:v>
+                </c:pt>
+                <c:pt idx="8">
+                  <c:v>1</c:v>
+                </c:pt>
+                <c:pt idx="9">
+                  <c:v>2</c:v>
+                </c:pt>
+                <c:pt idx="10">
+                  <c:v>3</c:v>
+                </c:pt>
+                <c:pt idx="11">
+                  <c:v>4</c:v>
+                </c:pt>
+                <c:pt idx="12">
+                  <c:v>5</c:v>
+                </c:pt>
+                <c:pt idx="13">
+                  <c:v>6</c:v>
+                </c:pt>
+                <c:pt idx="14">
+                  <c:v>7</c:v>
+                </c:pt>
+              </c:numCache>
+            </c:numRef>
+          </c:cat>
+          <c:val>
+            <c:numRef>
+              <c:f>calc!$W$39:$W$53</c:f>
+              <c:numCache>
+                <c:formatCode>General</c:formatCode>
+                <c:ptCount val="15"/>
+                <c:pt idx="0">
+                  <c:v>3.170950594454669</c:v>
+                </c:pt>
+                <c:pt idx="1">
+                  <c:v>3.4013264559540484</c:v>
+                </c:pt>
+                <c:pt idx="2">
+                  <c:v>3.2138617852864635</c:v>
+                </c:pt>
+                <c:pt idx="3">
+                  <c:v>3.6449725887115418</c:v>
+                </c:pt>
+                <c:pt idx="4" formatCode="_(* #,##0.000_);_(* \(#,##0.000\);_(* &quot;-&quot;??_);_(@_)">
+                  <c:v>3.5998152818015283</c:v>
+                </c:pt>
+                <c:pt idx="5" formatCode="_(* #,##0.000_);_(* \(#,##0.000\);_(* &quot;-&quot;??_);_(@_)">
+                  <c:v>3.6927427616422506</c:v>
+                </c:pt>
+                <c:pt idx="6" formatCode="_(* #,##0.000_);_(* \(#,##0.000\);_(* &quot;-&quot;??_);_(@_)">
+                  <c:v>3.5166197475567356</c:v>
+                </c:pt>
+                <c:pt idx="7" formatCode="_(* #,##0.000_);_(* \(#,##0.000\);_(* &quot;-&quot;??_);_(@_)">
+                  <c:v>3.7567692913428532</c:v>
+                </c:pt>
+                <c:pt idx="8" formatCode="_(* #,##0.000_);_(* \(#,##0.000\);_(* &quot;-&quot;??_);_(@_)">
+                  <c:v>3.6888929369868459</c:v>
+                </c:pt>
+                <c:pt idx="9" formatCode="_(* #,##0.000_);_(* \(#,##0.000\);_(* &quot;-&quot;??_);_(@_)">
+                  <c:v>3.7324792121717483</c:v>
+                </c:pt>
+                <c:pt idx="10" formatCode="_(* #,##0.000_);_(* \(#,##0.000\);_(* &quot;-&quot;??_);_(@_)">
+                  <c:v>3.5541520728533915</c:v>
+                </c:pt>
+                <c:pt idx="11" formatCode="_(* #,##0.00_);_(* \(#,##0.00\);_(* &quot;-&quot;??_);_(@_)">
+                  <c:v>3.5763728156574062</c:v>
+                </c:pt>
+                <c:pt idx="12">
+                  <c:v>3.474370736584572</c:v>
+                </c:pt>
+                <c:pt idx="13">
+                  <c:v>3.3564746537994155</c:v>
+                </c:pt>
+                <c:pt idx="14">
+                  <c:v>3.2884504573082887</c:v>
+                </c:pt>
+              </c:numCache>
+            </c:numRef>
+          </c:val>
+          <c:smooth val="0"/>
+        </c:ser>
+        <c:ser>
+          <c:idx val="3"/>
+          <c:order val="3"/>
+          <c:tx>
+            <c:strRef>
+              <c:f>calc!$X$38</c:f>
+              <c:strCache>
+                <c:ptCount val="1"/>
+                <c:pt idx="0">
+                  <c:v>NASDAQ</c:v>
+                </c:pt>
+              </c:strCache>
+            </c:strRef>
+          </c:tx>
+          <c:spPr>
+            <a:ln w="28575" cap="rnd">
+              <a:solidFill>
+                <a:schemeClr val="accent4"/>
+              </a:solidFill>
+              <a:round/>
+            </a:ln>
+            <a:effectLst/>
+          </c:spPr>
+          <c:marker>
+            <c:symbol val="none"/>
+          </c:marker>
+          <c:cat>
+            <c:numRef>
+              <c:f>calc!$R$39:$R$53</c:f>
+              <c:numCache>
+                <c:formatCode>_(* #,##0_);_(* \(#,##0\);_(* "-"??_);_(@_)</c:formatCode>
+                <c:ptCount val="15"/>
+                <c:pt idx="0">
+                  <c:v>-7</c:v>
+                </c:pt>
+                <c:pt idx="1">
+                  <c:v>-6</c:v>
+                </c:pt>
+                <c:pt idx="2">
+                  <c:v>-5</c:v>
+                </c:pt>
+                <c:pt idx="3">
+                  <c:v>-4</c:v>
+                </c:pt>
+                <c:pt idx="4">
+                  <c:v>-3</c:v>
+                </c:pt>
+                <c:pt idx="5">
+                  <c:v>-2</c:v>
+                </c:pt>
+                <c:pt idx="6">
+                  <c:v>-1</c:v>
+                </c:pt>
+                <c:pt idx="7">
+                  <c:v>0</c:v>
+                </c:pt>
+                <c:pt idx="8">
+                  <c:v>1</c:v>
+                </c:pt>
+                <c:pt idx="9">
+                  <c:v>2</c:v>
+                </c:pt>
+                <c:pt idx="10">
+                  <c:v>3</c:v>
+                </c:pt>
+                <c:pt idx="11">
+                  <c:v>4</c:v>
+                </c:pt>
+                <c:pt idx="12">
+                  <c:v>5</c:v>
+                </c:pt>
+                <c:pt idx="13">
+                  <c:v>6</c:v>
+                </c:pt>
+                <c:pt idx="14">
+                  <c:v>7</c:v>
+                </c:pt>
+              </c:numCache>
+            </c:numRef>
+          </c:cat>
+          <c:val>
+            <c:numRef>
+              <c:f>calc!$X$39:$X$53</c:f>
+              <c:numCache>
+                <c:formatCode>General</c:formatCode>
+                <c:ptCount val="15"/>
+                <c:pt idx="0">
+                  <c:v>2.8150724101159437</c:v>
+                </c:pt>
+                <c:pt idx="1">
+                  <c:v>3.708132064658602</c:v>
+                </c:pt>
+                <c:pt idx="2">
+                  <c:v>2.6031490503321062</c:v>
+                </c:pt>
+                <c:pt idx="3">
+                  <c:v>3.8464403968887959</c:v>
+                </c:pt>
+                <c:pt idx="4" formatCode="_(* #,##0.000_);_(* \(#,##0.000\);_(* &quot;-&quot;??_);_(@_)">
+                  <c:v>3.5932897392845717</c:v>
+                </c:pt>
+                <c:pt idx="5" formatCode="_(* #,##0.000_);_(* \(#,##0.000\);_(* &quot;-&quot;??_);_(@_)">
+                  <c:v>3.7899538603457401</c:v>
+                </c:pt>
+                <c:pt idx="6" formatCode="_(* #,##0.000_);_(* \(#,##0.000\);_(* &quot;-&quot;??_);_(@_)">
+                  <c:v>3.4385740729562118</c:v>
+                </c:pt>
+                <c:pt idx="7" formatCode="_(* #,##0.000_);_(* \(#,##0.000\);_(* &quot;-&quot;??_);_(@_)">
+                  <c:v>3.2874644128075761</c:v>
+                </c:pt>
+                <c:pt idx="8" formatCode="_(* #,##0.000_);_(* \(#,##0.000\);_(* &quot;-&quot;??_);_(@_)">
+                  <c:v>3.185591717354975</c:v>
+                </c:pt>
+                <c:pt idx="9" formatCode="_(* #,##0.000_);_(* \(#,##0.000\);_(* &quot;-&quot;??_);_(@_)">
+                  <c:v>2.90596883747686</c:v>
+                </c:pt>
+                <c:pt idx="10" formatCode="_(* #,##0.000_);_(* \(#,##0.000\);_(* &quot;-&quot;??_);_(@_)">
+                  <c:v>3.0065385157015299</c:v>
+                </c:pt>
+                <c:pt idx="11" formatCode="_(* #,##0.00_);_(* \(#,##0.00\);_(* &quot;-&quot;??_);_(@_)">
+                  <c:v>3.3344778187830753</c:v>
+                </c:pt>
+                <c:pt idx="12">
+                  <c:v>2.4261195735376941</c:v>
+                </c:pt>
+                <c:pt idx="13">
+                  <c:v>3.2806390622295662</c:v>
+                </c:pt>
+                <c:pt idx="14">
+                  <c:v>2.5550365325772657</c:v>
+                </c:pt>
+              </c:numCache>
+            </c:numRef>
+          </c:val>
+          <c:smooth val="0"/>
+        </c:ser>
+        <c:dLbls>
+          <c:showLegendKey val="0"/>
+          <c:showVal val="0"/>
+          <c:showCatName val="0"/>
+          <c:showSerName val="0"/>
+          <c:showPercent val="0"/>
+          <c:showBubbleSize val="0"/>
+        </c:dLbls>
+        <c:smooth val="0"/>
+        <c:axId val="243280944"/>
+        <c:axId val="243278144"/>
+      </c:lineChart>
+      <c:catAx>
+        <c:axId val="243280944"/>
+        <c:scaling>
+          <c:orientation val="minMax"/>
+        </c:scaling>
+        <c:delete val="0"/>
+        <c:axPos val="b"/>
+        <c:numFmt formatCode="_(* #,##0_);_(* \(#,##0\);_(* &quot;-&quot;??_);_(@_)" sourceLinked="1"/>
+        <c:majorTickMark val="none"/>
+        <c:minorTickMark val="none"/>
+        <c:tickLblPos val="nextTo"/>
+        <c:spPr>
+          <a:noFill/>
+          <a:ln w="9525" cap="flat" cmpd="sng" algn="ctr">
+            <a:solidFill>
+              <a:schemeClr val="tx1">
+                <a:lumMod val="15000"/>
+                <a:lumOff val="85000"/>
+              </a:schemeClr>
+            </a:solidFill>
+            <a:round/>
+          </a:ln>
+          <a:effectLst/>
+        </c:spPr>
+        <c:txPr>
+          <a:bodyPr rot="-60000000" spcFirstLastPara="1" vertOverflow="ellipsis" vert="horz" wrap="square" anchor="ctr" anchorCtr="1"/>
+          <a:lstStyle/>
+          <a:p>
+            <a:pPr>
+              <a:defRPr sz="900" b="0" i="0" u="none" strike="noStrike" kern="1200" baseline="0">
+                <a:solidFill>
+                  <a:schemeClr val="tx1">
+                    <a:lumMod val="65000"/>
+                    <a:lumOff val="35000"/>
+                  </a:schemeClr>
+                </a:solidFill>
+                <a:latin typeface="+mn-lt"/>
+                <a:ea typeface="+mn-ea"/>
+                <a:cs typeface="+mn-cs"/>
+              </a:defRPr>
+            </a:pPr>
+            <a:endParaRPr lang="en-US"/>
+          </a:p>
+        </c:txPr>
+        <c:crossAx val="243278144"/>
+        <c:crosses val="autoZero"/>
+        <c:auto val="1"/>
+        <c:lblAlgn val="ctr"/>
+        <c:lblOffset val="100"/>
+        <c:noMultiLvlLbl val="0"/>
+      </c:catAx>
+      <c:valAx>
+        <c:axId val="243278144"/>
+        <c:scaling>
+          <c:orientation val="minMax"/>
+          <c:max val="5"/>
+          <c:min val="1"/>
+        </c:scaling>
+        <c:delete val="0"/>
+        <c:axPos val="l"/>
+        <c:majorGridlines>
+          <c:spPr>
+            <a:ln w="9525" cap="flat" cmpd="sng" algn="ctr">
+              <a:solidFill>
+                <a:schemeClr val="tx1">
+                  <a:lumMod val="15000"/>
+                  <a:lumOff val="85000"/>
+                </a:schemeClr>
+              </a:solidFill>
+              <a:round/>
+            </a:ln>
+            <a:effectLst/>
+          </c:spPr>
+        </c:majorGridlines>
+        <c:numFmt formatCode="General" sourceLinked="1"/>
+        <c:majorTickMark val="none"/>
+        <c:minorTickMark val="none"/>
+        <c:tickLblPos val="nextTo"/>
+        <c:spPr>
+          <a:noFill/>
+          <a:ln>
+            <a:noFill/>
+          </a:ln>
+          <a:effectLst/>
+        </c:spPr>
+        <c:txPr>
+          <a:bodyPr rot="-60000000" spcFirstLastPara="1" vertOverflow="ellipsis" vert="horz" wrap="square" anchor="ctr" anchorCtr="1"/>
+          <a:lstStyle/>
+          <a:p>
+            <a:pPr>
+              <a:defRPr sz="900" b="0" i="0" u="none" strike="noStrike" kern="1200" baseline="0">
+                <a:solidFill>
+                  <a:schemeClr val="tx1">
+                    <a:lumMod val="65000"/>
+                    <a:lumOff val="35000"/>
+                  </a:schemeClr>
+                </a:solidFill>
+                <a:latin typeface="+mn-lt"/>
+                <a:ea typeface="+mn-ea"/>
+                <a:cs typeface="+mn-cs"/>
+              </a:defRPr>
+            </a:pPr>
+            <a:endParaRPr lang="en-US"/>
+          </a:p>
+        </c:txPr>
+        <c:crossAx val="243280944"/>
+        <c:crosses val="autoZero"/>
+        <c:crossBetween val="between"/>
+        <c:majorUnit val="1"/>
       </c:valAx>
       <c:spPr>
         <a:noFill/>
@@ -2742,6 +3555,46 @@
 </cs:colorStyle>
 </file>
 
+<file path=ppt/charts/colors4.xml><?xml version="1.0" encoding="utf-8"?>
+<cs:colorStyle xmlns:cs="http://schemas.microsoft.com/office/drawing/2012/chartStyle" xmlns:a="http://schemas.openxmlformats.org/drawingml/2006/main" meth="cycle" id="10">
+  <a:schemeClr val="accent1"/>
+  <a:schemeClr val="accent2"/>
+  <a:schemeClr val="accent3"/>
+  <a:schemeClr val="accent4"/>
+  <a:schemeClr val="accent5"/>
+  <a:schemeClr val="accent6"/>
+  <cs:variation/>
+  <cs:variation>
+    <a:lumMod val="60000"/>
+  </cs:variation>
+  <cs:variation>
+    <a:lumMod val="80000"/>
+    <a:lumOff val="20000"/>
+  </cs:variation>
+  <cs:variation>
+    <a:lumMod val="80000"/>
+  </cs:variation>
+  <cs:variation>
+    <a:lumMod val="60000"/>
+    <a:lumOff val="40000"/>
+  </cs:variation>
+  <cs:variation>
+    <a:lumMod val="50000"/>
+  </cs:variation>
+  <cs:variation>
+    <a:lumMod val="70000"/>
+    <a:lumOff val="30000"/>
+  </cs:variation>
+  <cs:variation>
+    <a:lumMod val="70000"/>
+  </cs:variation>
+  <cs:variation>
+    <a:lumMod val="50000"/>
+    <a:lumOff val="50000"/>
+  </cs:variation>
+</cs:colorStyle>
+</file>
+
 <file path=ppt/charts/style1.xml><?xml version="1.0" encoding="utf-8"?>
 <cs:chartStyle xmlns:cs="http://schemas.microsoft.com/office/drawing/2012/chartStyle" xmlns:a="http://schemas.openxmlformats.org/drawingml/2006/main" id="288">
   <cs:axisTitle>
@@ -3813,6 +4666,522 @@
 </file>
 
 <file path=ppt/charts/style3.xml><?xml version="1.0" encoding="utf-8"?>
+<cs:chartStyle xmlns:cs="http://schemas.microsoft.com/office/drawing/2012/chartStyle" xmlns:a="http://schemas.openxmlformats.org/drawingml/2006/main" id="227">
+  <cs:axisTitle>
+    <cs:lnRef idx="0"/>
+    <cs:fillRef idx="0"/>
+    <cs:effectRef idx="0"/>
+    <cs:fontRef idx="minor">
+      <a:schemeClr val="tx1">
+        <a:lumMod val="65000"/>
+        <a:lumOff val="35000"/>
+      </a:schemeClr>
+    </cs:fontRef>
+    <cs:defRPr sz="1000" kern="1200"/>
+  </cs:axisTitle>
+  <cs:categoryAxis>
+    <cs:lnRef idx="0"/>
+    <cs:fillRef idx="0"/>
+    <cs:effectRef idx="0"/>
+    <cs:fontRef idx="minor">
+      <a:schemeClr val="tx1">
+        <a:lumMod val="65000"/>
+        <a:lumOff val="35000"/>
+      </a:schemeClr>
+    </cs:fontRef>
+    <cs:spPr>
+      <a:ln w="9525" cap="flat" cmpd="sng" algn="ctr">
+        <a:solidFill>
+          <a:schemeClr val="tx1">
+            <a:lumMod val="15000"/>
+            <a:lumOff val="85000"/>
+          </a:schemeClr>
+        </a:solidFill>
+        <a:round/>
+      </a:ln>
+    </cs:spPr>
+    <cs:defRPr sz="900" kern="1200"/>
+  </cs:categoryAxis>
+  <cs:chartArea mods="allowNoFillOverride allowNoLineOverride">
+    <cs:lnRef idx="0"/>
+    <cs:fillRef idx="0"/>
+    <cs:effectRef idx="0"/>
+    <cs:fontRef idx="minor">
+      <a:schemeClr val="tx1"/>
+    </cs:fontRef>
+    <cs:spPr>
+      <a:solidFill>
+        <a:schemeClr val="bg1"/>
+      </a:solidFill>
+      <a:ln w="9525" cap="flat" cmpd="sng" algn="ctr">
+        <a:solidFill>
+          <a:schemeClr val="tx1">
+            <a:lumMod val="15000"/>
+            <a:lumOff val="85000"/>
+          </a:schemeClr>
+        </a:solidFill>
+        <a:round/>
+      </a:ln>
+    </cs:spPr>
+    <cs:defRPr sz="1000" kern="1200"/>
+  </cs:chartArea>
+  <cs:dataLabel>
+    <cs:lnRef idx="0"/>
+    <cs:fillRef idx="0"/>
+    <cs:effectRef idx="0"/>
+    <cs:fontRef idx="minor">
+      <a:schemeClr val="tx1">
+        <a:lumMod val="75000"/>
+        <a:lumOff val="25000"/>
+      </a:schemeClr>
+    </cs:fontRef>
+    <cs:defRPr sz="900" kern="1200"/>
+  </cs:dataLabel>
+  <cs:dataLabelCallout>
+    <cs:lnRef idx="0"/>
+    <cs:fillRef idx="0"/>
+    <cs:effectRef idx="0"/>
+    <cs:fontRef idx="minor">
+      <a:schemeClr val="dk1">
+        <a:lumMod val="65000"/>
+        <a:lumOff val="35000"/>
+      </a:schemeClr>
+    </cs:fontRef>
+    <cs:spPr>
+      <a:solidFill>
+        <a:schemeClr val="lt1"/>
+      </a:solidFill>
+      <a:ln>
+        <a:solidFill>
+          <a:schemeClr val="dk1">
+            <a:lumMod val="25000"/>
+            <a:lumOff val="75000"/>
+          </a:schemeClr>
+        </a:solidFill>
+      </a:ln>
+    </cs:spPr>
+    <cs:defRPr sz="900" kern="1200"/>
+    <cs:bodyPr rot="0" spcFirstLastPara="1" vertOverflow="clip" horzOverflow="clip" vert="horz" wrap="square" lIns="36576" tIns="18288" rIns="36576" bIns="18288" anchor="ctr" anchorCtr="1">
+      <a:spAutoFit/>
+    </cs:bodyPr>
+  </cs:dataLabelCallout>
+  <cs:dataPoint>
+    <cs:lnRef idx="0"/>
+    <cs:fillRef idx="1">
+      <cs:styleClr val="auto"/>
+    </cs:fillRef>
+    <cs:effectRef idx="0"/>
+    <cs:fontRef idx="minor">
+      <a:schemeClr val="tx1"/>
+    </cs:fontRef>
+    <cs:spPr>
+      <a:solidFill>
+        <a:schemeClr val="phClr"/>
+      </a:solidFill>
+    </cs:spPr>
+  </cs:dataPoint>
+  <cs:dataPoint3D>
+    <cs:lnRef idx="0"/>
+    <cs:fillRef idx="1">
+      <cs:styleClr val="auto"/>
+    </cs:fillRef>
+    <cs:effectRef idx="0"/>
+    <cs:fontRef idx="minor">
+      <a:schemeClr val="tx1"/>
+    </cs:fontRef>
+    <cs:spPr>
+      <a:solidFill>
+        <a:schemeClr val="phClr"/>
+      </a:solidFill>
+    </cs:spPr>
+  </cs:dataPoint3D>
+  <cs:dataPointLine>
+    <cs:lnRef idx="0">
+      <cs:styleClr val="auto"/>
+    </cs:lnRef>
+    <cs:fillRef idx="1"/>
+    <cs:effectRef idx="0"/>
+    <cs:fontRef idx="minor">
+      <a:schemeClr val="tx1"/>
+    </cs:fontRef>
+    <cs:spPr>
+      <a:ln w="28575" cap="rnd">
+        <a:solidFill>
+          <a:schemeClr val="phClr"/>
+        </a:solidFill>
+        <a:round/>
+      </a:ln>
+    </cs:spPr>
+  </cs:dataPointLine>
+  <cs:dataPointMarker>
+    <cs:lnRef idx="0">
+      <cs:styleClr val="auto"/>
+    </cs:lnRef>
+    <cs:fillRef idx="1">
+      <cs:styleClr val="auto"/>
+    </cs:fillRef>
+    <cs:effectRef idx="0"/>
+    <cs:fontRef idx="minor">
+      <a:schemeClr val="tx1"/>
+    </cs:fontRef>
+    <cs:spPr>
+      <a:solidFill>
+        <a:schemeClr val="phClr"/>
+      </a:solidFill>
+      <a:ln w="9525">
+        <a:solidFill>
+          <a:schemeClr val="phClr"/>
+        </a:solidFill>
+      </a:ln>
+    </cs:spPr>
+  </cs:dataPointMarker>
+  <cs:dataPointMarkerLayout symbol="circle" size="5"/>
+  <cs:dataPointWireframe>
+    <cs:lnRef idx="0">
+      <cs:styleClr val="auto"/>
+    </cs:lnRef>
+    <cs:fillRef idx="1"/>
+    <cs:effectRef idx="0"/>
+    <cs:fontRef idx="minor">
+      <a:schemeClr val="tx1"/>
+    </cs:fontRef>
+    <cs:spPr>
+      <a:ln w="9525" cap="rnd">
+        <a:solidFill>
+          <a:schemeClr val="phClr"/>
+        </a:solidFill>
+        <a:round/>
+      </a:ln>
+    </cs:spPr>
+  </cs:dataPointWireframe>
+  <cs:dataTable>
+    <cs:lnRef idx="0"/>
+    <cs:fillRef idx="0"/>
+    <cs:effectRef idx="0"/>
+    <cs:fontRef idx="minor">
+      <a:schemeClr val="tx1">
+        <a:lumMod val="65000"/>
+        <a:lumOff val="35000"/>
+      </a:schemeClr>
+    </cs:fontRef>
+    <cs:spPr>
+      <a:noFill/>
+      <a:ln w="9525" cap="flat" cmpd="sng" algn="ctr">
+        <a:solidFill>
+          <a:schemeClr val="tx1">
+            <a:lumMod val="15000"/>
+            <a:lumOff val="85000"/>
+          </a:schemeClr>
+        </a:solidFill>
+        <a:round/>
+      </a:ln>
+    </cs:spPr>
+    <cs:defRPr sz="900" kern="1200"/>
+  </cs:dataTable>
+  <cs:downBar>
+    <cs:lnRef idx="0"/>
+    <cs:fillRef idx="0"/>
+    <cs:effectRef idx="0"/>
+    <cs:fontRef idx="minor">
+      <a:schemeClr val="dk1"/>
+    </cs:fontRef>
+    <cs:spPr>
+      <a:solidFill>
+        <a:schemeClr val="dk1">
+          <a:lumMod val="65000"/>
+          <a:lumOff val="35000"/>
+        </a:schemeClr>
+      </a:solidFill>
+      <a:ln w="9525">
+        <a:solidFill>
+          <a:schemeClr val="tx1">
+            <a:lumMod val="65000"/>
+            <a:lumOff val="35000"/>
+          </a:schemeClr>
+        </a:solidFill>
+      </a:ln>
+    </cs:spPr>
+  </cs:downBar>
+  <cs:dropLine>
+    <cs:lnRef idx="0"/>
+    <cs:fillRef idx="0"/>
+    <cs:effectRef idx="0"/>
+    <cs:fontRef idx="minor">
+      <a:schemeClr val="tx1"/>
+    </cs:fontRef>
+    <cs:spPr>
+      <a:ln w="9525" cap="flat" cmpd="sng" algn="ctr">
+        <a:solidFill>
+          <a:schemeClr val="tx1">
+            <a:lumMod val="35000"/>
+            <a:lumOff val="65000"/>
+          </a:schemeClr>
+        </a:solidFill>
+        <a:round/>
+      </a:ln>
+    </cs:spPr>
+  </cs:dropLine>
+  <cs:errorBar>
+    <cs:lnRef idx="0"/>
+    <cs:fillRef idx="0"/>
+    <cs:effectRef idx="0"/>
+    <cs:fontRef idx="minor">
+      <a:schemeClr val="tx1"/>
+    </cs:fontRef>
+    <cs:spPr>
+      <a:ln w="9525" cap="flat" cmpd="sng" algn="ctr">
+        <a:solidFill>
+          <a:schemeClr val="tx1">
+            <a:lumMod val="65000"/>
+            <a:lumOff val="35000"/>
+          </a:schemeClr>
+        </a:solidFill>
+        <a:round/>
+      </a:ln>
+    </cs:spPr>
+  </cs:errorBar>
+  <cs:floor>
+    <cs:lnRef idx="0"/>
+    <cs:fillRef idx="0"/>
+    <cs:effectRef idx="0"/>
+    <cs:fontRef idx="minor">
+      <a:schemeClr val="tx1"/>
+    </cs:fontRef>
+    <cs:spPr>
+      <a:noFill/>
+      <a:ln>
+        <a:noFill/>
+      </a:ln>
+    </cs:spPr>
+  </cs:floor>
+  <cs:gridlineMajor>
+    <cs:lnRef idx="0"/>
+    <cs:fillRef idx="0"/>
+    <cs:effectRef idx="0"/>
+    <cs:fontRef idx="minor">
+      <a:schemeClr val="tx1"/>
+    </cs:fontRef>
+    <cs:spPr>
+      <a:ln w="9525" cap="flat" cmpd="sng" algn="ctr">
+        <a:solidFill>
+          <a:schemeClr val="tx1">
+            <a:lumMod val="15000"/>
+            <a:lumOff val="85000"/>
+          </a:schemeClr>
+        </a:solidFill>
+        <a:round/>
+      </a:ln>
+    </cs:spPr>
+  </cs:gridlineMajor>
+  <cs:gridlineMinor>
+    <cs:lnRef idx="0"/>
+    <cs:fillRef idx="0"/>
+    <cs:effectRef idx="0"/>
+    <cs:fontRef idx="minor">
+      <a:schemeClr val="tx1"/>
+    </cs:fontRef>
+    <cs:spPr>
+      <a:ln w="9525" cap="flat" cmpd="sng" algn="ctr">
+        <a:solidFill>
+          <a:schemeClr val="tx1">
+            <a:lumMod val="5000"/>
+            <a:lumOff val="95000"/>
+          </a:schemeClr>
+        </a:solidFill>
+        <a:round/>
+      </a:ln>
+    </cs:spPr>
+  </cs:gridlineMinor>
+  <cs:hiLoLine>
+    <cs:lnRef idx="0"/>
+    <cs:fillRef idx="0"/>
+    <cs:effectRef idx="0"/>
+    <cs:fontRef idx="minor">
+      <a:schemeClr val="tx1"/>
+    </cs:fontRef>
+    <cs:spPr>
+      <a:ln w="9525" cap="flat" cmpd="sng" algn="ctr">
+        <a:solidFill>
+          <a:schemeClr val="tx1">
+            <a:lumMod val="75000"/>
+            <a:lumOff val="25000"/>
+          </a:schemeClr>
+        </a:solidFill>
+        <a:round/>
+      </a:ln>
+    </cs:spPr>
+  </cs:hiLoLine>
+  <cs:leaderLine>
+    <cs:lnRef idx="0"/>
+    <cs:fillRef idx="0"/>
+    <cs:effectRef idx="0"/>
+    <cs:fontRef idx="minor">
+      <a:schemeClr val="tx1"/>
+    </cs:fontRef>
+    <cs:spPr>
+      <a:ln w="9525" cap="flat" cmpd="sng" algn="ctr">
+        <a:solidFill>
+          <a:schemeClr val="tx1">
+            <a:lumMod val="35000"/>
+            <a:lumOff val="65000"/>
+          </a:schemeClr>
+        </a:solidFill>
+        <a:round/>
+      </a:ln>
+    </cs:spPr>
+  </cs:leaderLine>
+  <cs:legend>
+    <cs:lnRef idx="0"/>
+    <cs:fillRef idx="0"/>
+    <cs:effectRef idx="0"/>
+    <cs:fontRef idx="minor">
+      <a:schemeClr val="tx1">
+        <a:lumMod val="65000"/>
+        <a:lumOff val="35000"/>
+      </a:schemeClr>
+    </cs:fontRef>
+    <cs:defRPr sz="900" kern="1200"/>
+  </cs:legend>
+  <cs:plotArea mods="allowNoFillOverride allowNoLineOverride">
+    <cs:lnRef idx="0"/>
+    <cs:fillRef idx="0"/>
+    <cs:effectRef idx="0"/>
+    <cs:fontRef idx="minor">
+      <a:schemeClr val="tx1"/>
+    </cs:fontRef>
+  </cs:plotArea>
+  <cs:plotArea3D mods="allowNoFillOverride allowNoLineOverride">
+    <cs:lnRef idx="0"/>
+    <cs:fillRef idx="0"/>
+    <cs:effectRef idx="0"/>
+    <cs:fontRef idx="minor">
+      <a:schemeClr val="tx1"/>
+    </cs:fontRef>
+  </cs:plotArea3D>
+  <cs:seriesAxis>
+    <cs:lnRef idx="0"/>
+    <cs:fillRef idx="0"/>
+    <cs:effectRef idx="0"/>
+    <cs:fontRef idx="minor">
+      <a:schemeClr val="tx1">
+        <a:lumMod val="65000"/>
+        <a:lumOff val="35000"/>
+      </a:schemeClr>
+    </cs:fontRef>
+    <cs:defRPr sz="900" kern="1200"/>
+  </cs:seriesAxis>
+  <cs:seriesLine>
+    <cs:lnRef idx="0"/>
+    <cs:fillRef idx="0"/>
+    <cs:effectRef idx="0"/>
+    <cs:fontRef idx="minor">
+      <a:schemeClr val="tx1"/>
+    </cs:fontRef>
+    <cs:spPr>
+      <a:ln w="9525" cap="flat" cmpd="sng" algn="ctr">
+        <a:solidFill>
+          <a:schemeClr val="tx1">
+            <a:lumMod val="35000"/>
+            <a:lumOff val="65000"/>
+          </a:schemeClr>
+        </a:solidFill>
+        <a:round/>
+      </a:ln>
+    </cs:spPr>
+  </cs:seriesLine>
+  <cs:title>
+    <cs:lnRef idx="0"/>
+    <cs:fillRef idx="0"/>
+    <cs:effectRef idx="0"/>
+    <cs:fontRef idx="minor">
+      <a:schemeClr val="tx1">
+        <a:lumMod val="65000"/>
+        <a:lumOff val="35000"/>
+      </a:schemeClr>
+    </cs:fontRef>
+    <cs:defRPr sz="1400" b="0" kern="1200" spc="0" baseline="0"/>
+  </cs:title>
+  <cs:trendline>
+    <cs:lnRef idx="0">
+      <cs:styleClr val="auto"/>
+    </cs:lnRef>
+    <cs:fillRef idx="0"/>
+    <cs:effectRef idx="0"/>
+    <cs:fontRef idx="minor">
+      <a:schemeClr val="tx1"/>
+    </cs:fontRef>
+    <cs:spPr>
+      <a:ln w="19050" cap="rnd">
+        <a:solidFill>
+          <a:schemeClr val="phClr"/>
+        </a:solidFill>
+        <a:prstDash val="sysDot"/>
+      </a:ln>
+    </cs:spPr>
+  </cs:trendline>
+  <cs:trendlineLabel>
+    <cs:lnRef idx="0"/>
+    <cs:fillRef idx="0"/>
+    <cs:effectRef idx="0"/>
+    <cs:fontRef idx="minor">
+      <a:schemeClr val="tx1">
+        <a:lumMod val="65000"/>
+        <a:lumOff val="35000"/>
+      </a:schemeClr>
+    </cs:fontRef>
+    <cs:defRPr sz="900" kern="1200"/>
+  </cs:trendlineLabel>
+  <cs:upBar>
+    <cs:lnRef idx="0"/>
+    <cs:fillRef idx="0"/>
+    <cs:effectRef idx="0"/>
+    <cs:fontRef idx="minor">
+      <a:schemeClr val="dk1"/>
+    </cs:fontRef>
+    <cs:spPr>
+      <a:solidFill>
+        <a:schemeClr val="lt1"/>
+      </a:solidFill>
+      <a:ln w="9525">
+        <a:solidFill>
+          <a:schemeClr val="tx1">
+            <a:lumMod val="15000"/>
+            <a:lumOff val="85000"/>
+          </a:schemeClr>
+        </a:solidFill>
+      </a:ln>
+    </cs:spPr>
+  </cs:upBar>
+  <cs:valueAxis>
+    <cs:lnRef idx="0"/>
+    <cs:fillRef idx="0"/>
+    <cs:effectRef idx="0"/>
+    <cs:fontRef idx="minor">
+      <a:schemeClr val="tx1">
+        <a:lumMod val="65000"/>
+        <a:lumOff val="35000"/>
+      </a:schemeClr>
+    </cs:fontRef>
+    <cs:defRPr sz="900" kern="1200"/>
+  </cs:valueAxis>
+  <cs:wall>
+    <cs:lnRef idx="0"/>
+    <cs:fillRef idx="0"/>
+    <cs:effectRef idx="0"/>
+    <cs:fontRef idx="minor">
+      <a:schemeClr val="tx1"/>
+    </cs:fontRef>
+    <cs:spPr>
+      <a:noFill/>
+      <a:ln>
+        <a:noFill/>
+      </a:ln>
+    </cs:spPr>
+  </cs:wall>
+</cs:chartStyle>
+</file>
+
+<file path=ppt/charts/style4.xml><?xml version="1.0" encoding="utf-8"?>
 <cs:chartStyle xmlns:cs="http://schemas.microsoft.com/office/drawing/2012/chartStyle" xmlns:a="http://schemas.openxmlformats.org/drawingml/2006/main" id="227">
   <cs:axisTitle>
     <cs:lnRef idx="0"/>
@@ -7197,12 +8566,18 @@
         </p:nvSpPr>
         <p:spPr/>
         <p:txBody>
-          <a:bodyPr/>
+          <a:bodyPr>
+            <a:normAutofit/>
+          </a:bodyPr>
           <a:lstStyle/>
           <a:p>
             <a:r>
               <a:rPr lang="en-US" dirty="0" smtClean="0"/>
-              <a:t>Surprise and Distance in the Financial Markets</a:t>
+              <a:t>Information Theory Concepts in the </a:t>
+            </a:r>
+            <a:r>
+              <a:rPr lang="en-US" dirty="0" smtClean="0"/>
+              <a:t>Financial Markets</a:t>
             </a:r>
             <a:endParaRPr lang="en-US" dirty="0"/>
           </a:p>
@@ -7223,6 +8598,20 @@
           <a:bodyPr/>
           <a:lstStyle/>
           <a:p>
+            <a:r>
+              <a:rPr lang="en-US" dirty="0"/>
+              <a:t>Bo-chiuan </a:t>
+            </a:r>
+            <a:r>
+              <a:rPr lang="en-US" dirty="0" smtClean="0"/>
+              <a:t>Chen</a:t>
+            </a:r>
+          </a:p>
+          <a:p>
+            <a:r>
+              <a:rPr lang="en-US" dirty="0" smtClean="0"/>
+              <a:t>Scott McCaulay</a:t>
+            </a:r>
             <a:endParaRPr lang="en-US" dirty="0"/>
           </a:p>
         </p:txBody>
@@ -7274,7 +8663,12 @@
             <p:ph type="title"/>
           </p:nvPr>
         </p:nvSpPr>
-        <p:spPr/>
+        <p:spPr>
+          <a:xfrm>
+            <a:off x="838200" y="38545"/>
+            <a:ext cx="10515600" cy="1325563"/>
+          </a:xfrm>
+        </p:spPr>
         <p:txBody>
           <a:bodyPr/>
           <a:lstStyle/>
@@ -7297,15 +8691,115 @@
             <p:ph idx="1"/>
           </p:nvPr>
         </p:nvSpPr>
-        <p:spPr/>
+        <p:spPr>
+          <a:xfrm>
+            <a:off x="838200" y="1090832"/>
+            <a:ext cx="10515600" cy="4351338"/>
+          </a:xfrm>
+        </p:spPr>
         <p:txBody>
           <a:bodyPr/>
           <a:lstStyle/>
           <a:p>
-            <a:endParaRPr lang="en-US"/>
+            <a:r>
+              <a:rPr lang="en-US" dirty="0" smtClean="0"/>
+              <a:t>Same example</a:t>
+            </a:r>
+            <a:r>
+              <a:rPr lang="en-US" dirty="0" smtClean="0"/>
+              <a:t>, </a:t>
+            </a:r>
+            <a:r>
+              <a:rPr lang="en-US" dirty="0" smtClean="0"/>
+              <a:t>incorporating </a:t>
+            </a:r>
+            <a:r>
+              <a:rPr lang="en-US" dirty="0" smtClean="0"/>
+              <a:t>prior </a:t>
+            </a:r>
+            <a:r>
+              <a:rPr lang="en-US" dirty="0" smtClean="0"/>
+              <a:t>outcome (bins are </a:t>
+            </a:r>
+            <a:r>
+              <a:rPr lang="el-GR" dirty="0" smtClean="0"/>
+              <a:t>σ</a:t>
+            </a:r>
+            <a:r>
+              <a:rPr lang="en-US" dirty="0" smtClean="0"/>
+              <a:t>/4)</a:t>
+            </a:r>
+            <a:endParaRPr lang="en-US" dirty="0" smtClean="0"/>
+          </a:p>
+          <a:p>
+            <a:r>
+              <a:rPr lang="en-US" dirty="0" smtClean="0"/>
+              <a:t>1,600 </a:t>
+            </a:r>
+            <a:r>
+              <a:rPr lang="en-US" dirty="0" smtClean="0"/>
+              <a:t>possible combinations of prior-&gt;</a:t>
+            </a:r>
+            <a:r>
+              <a:rPr lang="en-US" dirty="0" smtClean="0"/>
+              <a:t>current</a:t>
+            </a:r>
+          </a:p>
+          <a:p>
+            <a:pPr lvl="1"/>
+            <a:r>
+              <a:rPr lang="en-US" dirty="0" smtClean="0"/>
+              <a:t>Many combinations are empty, most common combinations graphed below</a:t>
+            </a:r>
+            <a:endParaRPr lang="en-US" dirty="0" smtClean="0"/>
+          </a:p>
+          <a:p>
+            <a:r>
+              <a:rPr lang="en-US" dirty="0" smtClean="0"/>
+              <a:t>Caveats: </a:t>
+            </a:r>
+          </a:p>
+          <a:p>
+            <a:pPr lvl="1"/>
+            <a:r>
+              <a:rPr lang="en-US" dirty="0" smtClean="0"/>
+              <a:t>Less likely outcomes have less data</a:t>
+            </a:r>
+          </a:p>
+          <a:p>
+            <a:pPr lvl="1"/>
+            <a:r>
+              <a:rPr lang="en-US" dirty="0" smtClean="0"/>
+              <a:t>No attempt to assign costs to various right or wrong guesses</a:t>
+            </a:r>
+            <a:endParaRPr lang="en-US" dirty="0"/>
           </a:p>
         </p:txBody>
       </p:sp>
+      <p:graphicFrame>
+        <p:nvGraphicFramePr>
+          <p:cNvPr id="4" name="Chart 3"/>
+          <p:cNvGraphicFramePr>
+            <a:graphicFrameLocks/>
+          </p:cNvGraphicFramePr>
+          <p:nvPr>
+            <p:extLst>
+              <p:ext uri="{D42A27DB-BD31-4B8C-83A1-F6EECF244321}">
+                <p14:modId xmlns:p14="http://schemas.microsoft.com/office/powerpoint/2010/main" val="2522019913"/>
+              </p:ext>
+            </p:extLst>
+          </p:nvPr>
+        </p:nvGraphicFramePr>
+        <p:xfrm>
+          <a:off x="3728358" y="3748088"/>
+          <a:ext cx="4572000" cy="3109912"/>
+        </p:xfrm>
+        <a:graphic>
+          <a:graphicData uri="http://schemas.openxmlformats.org/drawingml/2006/chart">
+            <c:chart xmlns:c="http://schemas.openxmlformats.org/drawingml/2006/chart" xmlns:r="http://schemas.openxmlformats.org/officeDocument/2006/relationships" r:id="rId2"/>
+          </a:graphicData>
+        </a:graphic>
+      </p:graphicFrame>
     </p:spTree>
     <p:extLst>
       <p:ext uri="{BB962C8B-B14F-4D97-AF65-F5344CB8AC3E}">
@@ -7418,7 +8912,12 @@
             <p:ph type="title"/>
           </p:nvPr>
         </p:nvSpPr>
-        <p:spPr/>
+        <p:spPr>
+          <a:xfrm>
+            <a:off x="838200" y="54874"/>
+            <a:ext cx="10515600" cy="1325563"/>
+          </a:xfrm>
+        </p:spPr>
         <p:txBody>
           <a:bodyPr/>
           <a:lstStyle/>
@@ -7441,7 +8940,12 @@
             <p:ph idx="1"/>
           </p:nvPr>
         </p:nvSpPr>
-        <p:spPr/>
+        <p:spPr>
+          <a:xfrm>
+            <a:off x="838200" y="1303117"/>
+            <a:ext cx="10515600" cy="5358939"/>
+          </a:xfrm>
+        </p:spPr>
         <p:txBody>
           <a:bodyPr/>
           <a:lstStyle/>
@@ -7481,11 +8985,20 @@
             <a:pPr lvl="1"/>
             <a:r>
               <a:rPr lang="en-US" dirty="0" smtClean="0"/>
-              <a:t>To approach an interesting level of granularity in both time periods and outcomes, data volume, computation requirements become quite </a:t>
-            </a:r>
-            <a:r>
-              <a:rPr lang="en-US" smtClean="0"/>
-              <a:t>a barrier</a:t>
+              <a:t>To approach an interesting level of granularity in both time periods and outcomes, data volume, computation requirements become quite a barrier</a:t>
+            </a:r>
+          </a:p>
+          <a:p>
+            <a:r>
+              <a:rPr lang="en-US" dirty="0" smtClean="0"/>
+              <a:t>Observations:</a:t>
+            </a:r>
+          </a:p>
+          <a:p>
+            <a:pPr lvl="1"/>
+            <a:r>
+              <a:rPr lang="en-US" dirty="0" smtClean="0"/>
+              <a:t>Extremity of these markets (NYSE alone = 16.6 trillion in 2014), one days trading can mean the creation or destruction of trillions of $ worldwide</a:t>
             </a:r>
             <a:endParaRPr lang="en-US" dirty="0"/>
           </a:p>
@@ -9024,24 +10537,24 @@
           <a:lstStyle/>
           <a:p>
             <a:r>
+              <a:rPr lang="en-US" dirty="0"/>
+              <a:t>Long Term Changes in P(</a:t>
+            </a:r>
+            <a:r>
+              <a:rPr lang="en-US" dirty="0" err="1"/>
+              <a:t>current|prev</a:t>
+            </a:r>
+            <a:r>
+              <a:rPr lang="en-US" dirty="0"/>
+              <a:t>)</a:t>
+            </a:r>
+            <a:r>
               <a:rPr lang="en-US" dirty="0" smtClean="0"/>
-              <a:t>Interesting Phenomenon I:</a:t>
+              <a:t/>
             </a:r>
             <a:br>
               <a:rPr lang="en-US" dirty="0" smtClean="0"/>
             </a:br>
-            <a:r>
-              <a:rPr lang="en-US" sz="3600" dirty="0" smtClean="0"/>
-              <a:t>Long Term Changes in P(</a:t>
-            </a:r>
-            <a:r>
-              <a:rPr lang="en-US" sz="3600" dirty="0" err="1" smtClean="0"/>
-              <a:t>current|prev</a:t>
-            </a:r>
-            <a:r>
-              <a:rPr lang="en-US" sz="3600" dirty="0" smtClean="0"/>
-              <a:t>)</a:t>
-            </a:r>
             <a:endParaRPr lang="en-US" dirty="0"/>
           </a:p>
         </p:txBody>
@@ -9058,7 +10571,7 @@
         </p:nvSpPr>
         <p:spPr>
           <a:xfrm>
-            <a:off x="838200" y="1348178"/>
+            <a:off x="838200" y="1054256"/>
             <a:ext cx="10515600" cy="4351338"/>
           </a:xfrm>
         </p:spPr>
@@ -9134,13 +10647,13 @@
           <p:nvPr>
             <p:extLst>
               <p:ext uri="{D42A27DB-BD31-4B8C-83A1-F6EECF244321}">
-                <p14:modId xmlns:p14="http://schemas.microsoft.com/office/powerpoint/2010/main" val="3322696404"/>
+                <p14:modId xmlns:p14="http://schemas.microsoft.com/office/powerpoint/2010/main" val="1193159048"/>
               </p:ext>
             </p:extLst>
           </p:nvPr>
         </p:nvGraphicFramePr>
         <p:xfrm>
-          <a:off x="2952784" y="3289423"/>
+          <a:off x="2920126" y="3109809"/>
           <a:ext cx="5715000" cy="3429000"/>
         </p:xfrm>
         <a:graphic>
@@ -9196,14 +10709,23 @@
             <p:ph type="title"/>
           </p:nvPr>
         </p:nvSpPr>
-        <p:spPr/>
+        <p:spPr>
+          <a:xfrm>
+            <a:off x="838200" y="120190"/>
+            <a:ext cx="10515600" cy="1325563"/>
+          </a:xfrm>
+        </p:spPr>
         <p:txBody>
           <a:bodyPr/>
           <a:lstStyle/>
           <a:p>
             <a:r>
               <a:rPr lang="en-US" dirty="0" smtClean="0"/>
-              <a:t>Marked Shift over Time of P(</a:t>
+              <a:t>Shift by Year of </a:t>
+            </a:r>
+            <a:r>
+              <a:rPr lang="en-US" dirty="0" smtClean="0"/>
+              <a:t>P(</a:t>
             </a:r>
             <a:r>
               <a:rPr lang="en-US" dirty="0" err="1" smtClean="0"/>
@@ -9229,7 +10751,7 @@
         </p:nvSpPr>
         <p:spPr>
           <a:xfrm>
-            <a:off x="838200" y="1714115"/>
+            <a:off x="838200" y="1338548"/>
             <a:ext cx="10515600" cy="4351338"/>
           </a:xfrm>
         </p:spPr>
@@ -9264,8 +10786,20 @@
             </a:r>
             <a:r>
               <a:rPr lang="en-US" dirty="0"/>
-              <a:t>shows 10 year moving average</a:t>
-            </a:r>
+              <a:t>shows 10 year moving </a:t>
+            </a:r>
+            <a:r>
+              <a:rPr lang="en-US" dirty="0" smtClean="0"/>
+              <a:t>average</a:t>
+            </a:r>
+          </a:p>
+          <a:p>
+            <a:pPr lvl="1"/>
+            <a:r>
+              <a:rPr lang="en-US" dirty="0" smtClean="0"/>
+              <a:t>Thoughts on what could be driving this change?</a:t>
+            </a:r>
+            <a:endParaRPr lang="en-US" dirty="0"/>
           </a:p>
           <a:p>
             <a:pPr marL="457200" lvl="1" indent="0">
@@ -9284,13 +10818,13 @@
           <p:nvPr>
             <p:extLst>
               <p:ext uri="{D42A27DB-BD31-4B8C-83A1-F6EECF244321}">
-                <p14:modId xmlns:p14="http://schemas.microsoft.com/office/powerpoint/2010/main" val="1764096006"/>
+                <p14:modId xmlns:p14="http://schemas.microsoft.com/office/powerpoint/2010/main" val="2170936091"/>
               </p:ext>
             </p:extLst>
           </p:nvPr>
         </p:nvGraphicFramePr>
         <p:xfrm>
-          <a:off x="2873298" y="3926026"/>
+          <a:off x="2856970" y="3991340"/>
           <a:ext cx="4572000" cy="2743200"/>
         </p:xfrm>
         <a:graphic>
@@ -9416,11 +10950,7 @@
             <a:pPr lvl="1"/>
             <a:r>
               <a:rPr lang="en-US" dirty="0" smtClean="0"/>
-              <a:t>What are we really measuring</a:t>
-            </a:r>
-            <a:r>
-              <a:rPr lang="en-US" smtClean="0"/>
-              <a:t>?  </a:t>
+              <a:t>What are we really measuring?  </a:t>
             </a:r>
             <a:endParaRPr lang="en-US" dirty="0"/>
           </a:p>
@@ -9645,8 +11175,13 @@
           <a:p>
             <a:r>
               <a:rPr lang="en-US" dirty="0" smtClean="0"/>
-              <a:t>Same data as previous example, 5 years data for 4 indices, bands = standard deviation/8</a:t>
-            </a:r>
+              <a:t>Same data as previous example, 5 years data for 4 indices, bands = </a:t>
+            </a:r>
+            <a:r>
+              <a:rPr lang="en-US" smtClean="0"/>
+              <a:t>standard deviation/4</a:t>
+            </a:r>
+            <a:endParaRPr lang="en-US" dirty="0" smtClean="0"/>
           </a:p>
           <a:p>
             <a:r>

</xml_diff>